<commit_message>
workshop preparation day 1
</commit_message>
<xml_diff>
--- a/Presentatie/Microservices 101.pptx
+++ b/Presentatie/Microservices 101.pptx
@@ -230,7 +230,7 @@
           <a:p>
             <a:fld id="{4FDA5BBF-9A9E-E34C-87D2-CD6D1CA60245}" type="datetime1">
               <a:rPr lang="en-US" smtClean="0"/>
-              <a:t>9/13/2017</a:t>
+              <a:t>10/31/2017</a:t>
             </a:fld>
             <a:endParaRPr lang="en-US" dirty="0"/>
           </a:p>
@@ -396,7 +396,7 @@
           <a:p>
             <a:fld id="{FE5FB5CF-D153-1544-8329-2FC1F4ABF24D}" type="datetime1">
               <a:rPr lang="en-US" smtClean="0"/>
-              <a:t>9/13/2017</a:t>
+              <a:t>10/31/2017</a:t>
             </a:fld>
             <a:endParaRPr lang="nl-NL" dirty="0"/>
           </a:p>
@@ -987,9 +987,20 @@
             </a:r>
           </a:p>
           <a:p>
+            <a:endParaRPr lang="en-US" dirty="0" smtClean="0"/>
+          </a:p>
+          <a:p>
+            <a:r>
+              <a:rPr lang="en-US" dirty="0" err="1" smtClean="0"/>
+              <a:t>Losse</a:t>
+            </a:r>
             <a:r>
               <a:rPr lang="en-US" dirty="0" smtClean="0"/>
-              <a:t>Losse applicatiefuncties, kies de omvang</a:t>
+              <a:t> </a:t>
+            </a:r>
+            <a:r>
+              <a:rPr lang="en-US" dirty="0" smtClean="0"/>
+              <a:t>applicatiefuncties, kies de omvang</a:t>
             </a:r>
             <a:r>
               <a:rPr lang="en-US" baseline="0" dirty="0" smtClean="0"/>
@@ -998,19 +1009,94 @@
             <a:endParaRPr lang="en-US" dirty="0" smtClean="0"/>
           </a:p>
           <a:p>
-            <a:r>
-              <a:rPr lang="en-US" dirty="0" smtClean="0"/>
+            <a:endParaRPr lang="en-US" dirty="0" smtClean="0"/>
+          </a:p>
+          <a:p>
+            <a:r>
+              <a:rPr lang="en-US" dirty="0" err="1" smtClean="0"/>
               <a:t>Temporeel</a:t>
             </a:r>
             <a:r>
               <a:rPr lang="en-US" baseline="0" dirty="0" smtClean="0"/>
-              <a:t> onafhankelijk van elkaar</a:t>
-            </a:r>
-          </a:p>
-          <a:p>
+              <a:t> </a:t>
+            </a:r>
             <a:r>
               <a:rPr lang="en-US" baseline="0" dirty="0" smtClean="0"/>
-              <a:t>Inter-service communicatie obv REST of MQ</a:t>
+              <a:t>onafhankelijk van elkaar</a:t>
+            </a:r>
+          </a:p>
+          <a:p>
+            <a:endParaRPr lang="en-US" baseline="0" dirty="0" smtClean="0"/>
+          </a:p>
+          <a:p>
+            <a:r>
+              <a:rPr lang="en-US" baseline="0" dirty="0" smtClean="0"/>
+              <a:t>Inter-service </a:t>
+            </a:r>
+            <a:r>
+              <a:rPr lang="en-US" baseline="0" dirty="0" smtClean="0"/>
+              <a:t>communicatie obv REST of message bus (</a:t>
+            </a:r>
+            <a:r>
+              <a:rPr lang="en-US" baseline="0" dirty="0" err="1" smtClean="0"/>
+              <a:t>bijv</a:t>
+            </a:r>
+            <a:r>
+              <a:rPr lang="en-US" baseline="0" dirty="0" smtClean="0"/>
+              <a:t>. </a:t>
+            </a:r>
+            <a:r>
+              <a:rPr lang="en-US" baseline="0" dirty="0" smtClean="0"/>
+              <a:t>MQ-</a:t>
+            </a:r>
+            <a:r>
+              <a:rPr lang="en-US" baseline="0" dirty="0" err="1" smtClean="0"/>
+              <a:t>gebaseerd</a:t>
+            </a:r>
+            <a:r>
+              <a:rPr lang="en-US" baseline="0" dirty="0" smtClean="0"/>
+              <a:t>)</a:t>
+            </a:r>
+          </a:p>
+          <a:p>
+            <a:endParaRPr lang="en-US" baseline="0" dirty="0" smtClean="0"/>
+          </a:p>
+          <a:p>
+            <a:r>
+              <a:rPr lang="en-US" baseline="0" dirty="0" smtClean="0"/>
+              <a:t>Elke service </a:t>
+            </a:r>
+            <a:r>
+              <a:rPr lang="en-US" baseline="0" dirty="0" err="1" smtClean="0"/>
+              <a:t>een</a:t>
+            </a:r>
+            <a:r>
+              <a:rPr lang="en-US" baseline="0" dirty="0" smtClean="0"/>
+              <a:t> </a:t>
+            </a:r>
+            <a:r>
+              <a:rPr lang="en-US" baseline="0" dirty="0" err="1" smtClean="0"/>
+              <a:t>eigen</a:t>
+            </a:r>
+            <a:r>
+              <a:rPr lang="en-US" baseline="0" dirty="0" smtClean="0"/>
+              <a:t> database, of </a:t>
+            </a:r>
+            <a:r>
+              <a:rPr lang="en-US" baseline="0" dirty="0" err="1" smtClean="0"/>
+              <a:t>alle</a:t>
+            </a:r>
+            <a:r>
+              <a:rPr lang="en-US" baseline="0" dirty="0" smtClean="0"/>
+              <a:t> instances van </a:t>
+            </a:r>
+            <a:r>
+              <a:rPr lang="en-US" baseline="0" dirty="0" err="1" smtClean="0"/>
+              <a:t>een</a:t>
+            </a:r>
+            <a:r>
+              <a:rPr lang="en-US" baseline="0" dirty="0" smtClean="0"/>
+              <a:t> service op 1 database??</a:t>
             </a:r>
             <a:endParaRPr lang="nl-NL" dirty="0"/>
           </a:p>
@@ -1098,8 +1184,37 @@
           <a:p>
             <a:r>
               <a:rPr lang="en-US" dirty="0" smtClean="0"/>
-              <a:t>Verschillende OS-en, runtimes, DBMS’en</a:t>
-            </a:r>
+              <a:t>Verschillende OS-en, runtimes, </a:t>
+            </a:r>
+            <a:r>
+              <a:rPr lang="en-US" dirty="0" err="1" smtClean="0"/>
+              <a:t>DBMS’en</a:t>
+            </a:r>
+            <a:r>
+              <a:rPr lang="en-US" dirty="0" smtClean="0"/>
+              <a:t> </a:t>
+            </a:r>
+            <a:r>
+              <a:rPr lang="en-US" dirty="0" err="1" smtClean="0"/>
+              <a:t>mogelijk</a:t>
+            </a:r>
+            <a:r>
+              <a:rPr lang="en-US" dirty="0" smtClean="0"/>
+              <a:t>. </a:t>
+            </a:r>
+            <a:r>
+              <a:rPr lang="en-US" b="1" dirty="0" smtClean="0"/>
+              <a:t>DAT WIL NIET ZEGGEN DAT </a:t>
+            </a:r>
+            <a:r>
+              <a:rPr lang="en-US" b="1" dirty="0" err="1" smtClean="0"/>
+              <a:t>DAT</a:t>
+            </a:r>
+            <a:r>
+              <a:rPr lang="en-US" b="1" baseline="0" smtClean="0"/>
+              <a:t> DAAROM ALTIJD DE BESTE KEUZE IS!</a:t>
+            </a:r>
+            <a:endParaRPr lang="en-US" dirty="0" smtClean="0"/>
           </a:p>
           <a:p>
             <a:endParaRPr lang="en-US" dirty="0" smtClean="0"/>
@@ -1715,7 +1830,7 @@
           <a:p>
             <a:fld id="{69E2E37C-AA1E-43B2-B213-E688D587CE49}" type="datetime4">
               <a:rPr lang="nl-NL" smtClean="0"/>
-              <a:t>13 september 2017</a:t>
+              <a:t>31 oktober 2017</a:t>
             </a:fld>
             <a:endParaRPr lang="nl-NL" dirty="0"/>
           </a:p>
@@ -1840,7 +1955,7 @@
           <a:p>
             <a:fld id="{96BF97C2-7262-427C-9F3E-B0D6D33F54E2}" type="datetime4">
               <a:rPr lang="nl-NL" smtClean="0"/>
-              <a:t>13 september 2017</a:t>
+              <a:t>31 oktober 2017</a:t>
             </a:fld>
             <a:endParaRPr lang="nl-NL" dirty="0"/>
           </a:p>
@@ -2071,7 +2186,7 @@
           <a:p>
             <a:fld id="{AB63B3A2-628B-479E-BF05-5959017C6A02}" type="datetime4">
               <a:rPr lang="nl-NL" smtClean="0"/>
-              <a:t>13 september 2017</a:t>
+              <a:t>31 oktober 2017</a:t>
             </a:fld>
             <a:endParaRPr lang="nl-NL" dirty="0"/>
           </a:p>
@@ -2347,7 +2462,7 @@
             <a:fld id="{249B52C1-75DC-496B-AF3F-4978B95BB865}" type="datetime4">
               <a:rPr lang="nl-NL" smtClean="0"/>
               <a:pPr/>
-              <a:t>13 september 2017</a:t>
+              <a:t>31 oktober 2017</a:t>
             </a:fld>
             <a:endParaRPr lang="nl-NL" dirty="0"/>
           </a:p>
@@ -2450,7 +2565,7 @@
           <a:p>
             <a:fld id="{8D31B592-DB5E-43FC-B016-67E26C01643F}" type="datetime4">
               <a:rPr lang="nl-NL" smtClean="0"/>
-              <a:t>13 september 2017</a:t>
+              <a:t>31 oktober 2017</a:t>
             </a:fld>
             <a:endParaRPr lang="nl-NL" dirty="0"/>
           </a:p>
@@ -2669,7 +2784,7 @@
           <a:p>
             <a:fld id="{92E94904-3BB7-4874-AB8B-F31F00F8A078}" type="datetime4">
               <a:rPr lang="nl-NL" smtClean="0"/>
-              <a:t>13 september 2017</a:t>
+              <a:t>31 oktober 2017</a:t>
             </a:fld>
             <a:endParaRPr lang="nl-NL" dirty="0"/>
           </a:p>
@@ -2858,7 +2973,7 @@
           <a:p>
             <a:fld id="{A9642D5E-8E53-4D94-8479-CCF9387ED904}" type="datetime4">
               <a:rPr lang="nl-NL" smtClean="0"/>
-              <a:t>13 september 2017</a:t>
+              <a:t>31 oktober 2017</a:t>
             </a:fld>
             <a:endParaRPr lang="nl-NL" dirty="0"/>
           </a:p>
@@ -3082,7 +3197,7 @@
           <a:p>
             <a:fld id="{87D76D0B-AA25-481F-9FCE-BD155C5A6085}" type="datetime4">
               <a:rPr lang="nl-NL" smtClean="0"/>
-              <a:t>13 september 2017</a:t>
+              <a:t>31 oktober 2017</a:t>
             </a:fld>
             <a:endParaRPr lang="nl-NL" dirty="0"/>
           </a:p>
@@ -3302,7 +3417,7 @@
           <a:p>
             <a:fld id="{88C11819-B839-4C27-8B45-7170CEF46D62}" type="datetime4">
               <a:rPr lang="nl-NL" smtClean="0"/>
-              <a:t>13 september 2017</a:t>
+              <a:t>31 oktober 2017</a:t>
             </a:fld>
             <a:endParaRPr lang="nl-NL" dirty="0"/>
           </a:p>
@@ -3525,7 +3640,7 @@
           <a:p>
             <a:fld id="{174613E7-29CA-4C1D-88BD-FA51696C19FE}" type="datetime4">
               <a:rPr lang="nl-NL" smtClean="0"/>
-              <a:t>13 september 2017</a:t>
+              <a:t>31 oktober 2017</a:t>
             </a:fld>
             <a:endParaRPr lang="nl-NL" dirty="0"/>
           </a:p>
@@ -3725,7 +3840,7 @@
           <a:p>
             <a:fld id="{9F389A9C-5452-4AF4-8D69-2209042ED2AB}" type="datetime4">
               <a:rPr lang="nl-NL" smtClean="0"/>
-              <a:t>13 september 2017</a:t>
+              <a:t>31 oktober 2017</a:t>
             </a:fld>
             <a:endParaRPr lang="nl-NL" dirty="0"/>
           </a:p>
@@ -3936,7 +4051,7 @@
           <a:p>
             <a:fld id="{59ABBC3E-A20C-4DEE-9D7A-437B797B148A}" type="datetime4">
               <a:rPr lang="nl-NL" smtClean="0"/>
-              <a:t>13 september 2017</a:t>
+              <a:t>31 oktober 2017</a:t>
             </a:fld>
             <a:r>
               <a:rPr lang="en-US" smtClean="0"/>
@@ -4442,7 +4557,7 @@
           <a:p>
             <a:fld id="{E8809DAD-F941-4A15-ABB1-44FA32742BE9}" type="datetime4">
               <a:rPr lang="nl-NL" smtClean="0"/>
-              <a:t>13 september 2017</a:t>
+              <a:t>31 oktober 2017</a:t>
             </a:fld>
             <a:endParaRPr lang="nl-NL" dirty="0"/>
           </a:p>
@@ -4913,7 +5028,6 @@
               <a:rPr lang="nl-NL" dirty="0" smtClean="0"/>
               <a:t>Microservices-architectuur</a:t>
             </a:r>
-            <a:endParaRPr lang="nl-NL" dirty="0" smtClean="0"/>
           </a:p>
           <a:p>
             <a:pPr>
@@ -5039,7 +5153,7 @@
                   <a:srgbClr val="009036"/>
                 </a:solidFill>
               </a:rPr>
-              <a:t>13 september 2017</a:t>
+              <a:t>31 oktober 2017</a:t>
             </a:fld>
             <a:endParaRPr lang="nl-NL" sz="900" cap="all" dirty="0">
               <a:solidFill>
@@ -5537,7 +5651,7 @@
                   <a:srgbClr val="009036"/>
                 </a:solidFill>
               </a:rPr>
-              <a:t>13 september 2017</a:t>
+              <a:t>31 oktober 2017</a:t>
             </a:fld>
             <a:endParaRPr lang="nl-NL" sz="900" cap="all" dirty="0">
               <a:solidFill>
@@ -8490,7 +8604,7 @@
                   <a:srgbClr val="009036"/>
                 </a:solidFill>
               </a:rPr>
-              <a:t>13 september 2017</a:t>
+              <a:t>31 oktober 2017</a:t>
             </a:fld>
             <a:endParaRPr lang="nl-NL" sz="900" cap="all" dirty="0">
               <a:solidFill>
@@ -8813,7 +8927,7 @@
                   <a:srgbClr val="009036"/>
                 </a:solidFill>
               </a:rPr>
-              <a:t>13 september 2017</a:t>
+              <a:t>31 oktober 2017</a:t>
             </a:fld>
             <a:endParaRPr lang="nl-NL" sz="900" cap="all" dirty="0">
               <a:solidFill>
@@ -9222,7 +9336,7 @@
                   <a:srgbClr val="009036"/>
                 </a:solidFill>
               </a:rPr>
-              <a:t>13 september 2017</a:t>
+              <a:t>31 oktober 2017</a:t>
             </a:fld>
             <a:endParaRPr lang="nl-NL" sz="900" cap="all" dirty="0">
               <a:solidFill>
@@ -9517,7 +9631,7 @@
           <a:p>
             <a:fld id="{6C8F2B54-89D2-4D0B-81B9-EBE704C6250E}" type="datetime4">
               <a:rPr lang="nl-NL" smtClean="0"/>
-              <a:t>13 september 2017</a:t>
+              <a:t>31 oktober 2017</a:t>
             </a:fld>
             <a:endParaRPr lang="nl-NL" dirty="0"/>
           </a:p>
@@ -10467,12 +10581,6 @@
 </file>
 
 <file path=customXml/item1.xml><?xml version="1.0" encoding="utf-8"?>
-<p:properties xmlns:p="http://schemas.microsoft.com/office/2006/metadata/properties" xmlns:xsi="http://www.w3.org/2001/XMLSchema-instance" xmlns:pc="http://schemas.microsoft.com/office/infopath/2007/PartnerControls">
-  <documentManagement/>
-</p:properties>
-</file>
-
-<file path=customXml/item2.xml><?xml version="1.0" encoding="utf-8"?>
 <?mso-contentType ?>
 <FormTemplates xmlns="http://schemas.microsoft.com/sharepoint/v3/contenttype/forms">
   <Display>DocumentLibraryForm</Display>
@@ -10481,7 +10589,7 @@
 </FormTemplates>
 </file>
 
-<file path=customXml/item3.xml><?xml version="1.0" encoding="utf-8"?>
+<file path=customXml/item2.xml><?xml version="1.0" encoding="utf-8"?>
 <ct:contentTypeSchema xmlns:ct="http://schemas.microsoft.com/office/2006/metadata/contentType" xmlns:ma="http://schemas.microsoft.com/office/2006/metadata/properties/metaAttributes" ct:_="" ma:_="" ma:contentTypeName="Document" ma:contentTypeID="0x0101009843F10021B1B74BA5DD583B6999787F" ma:contentTypeVersion="1" ma:contentTypeDescription="Een nieuw document maken." ma:contentTypeScope="" ma:versionID="9f7dad7ca3b37095ed9229a6a072267d">
   <xsd:schema xmlns:xsd="http://www.w3.org/2001/XMLSchema" xmlns:xs="http://www.w3.org/2001/XMLSchema" xmlns:p="http://schemas.microsoft.com/office/2006/metadata/properties" targetNamespace="http://schemas.microsoft.com/office/2006/metadata/properties" ma:root="true" ma:fieldsID="a17e5968c79d9fe2fc9f8835eee23f58">
     <xsd:element name="properties">
@@ -10595,22 +10703,13 @@
 </ct:contentTypeSchema>
 </file>
 
-<file path=customXml/itemProps1.xml><?xml version="1.0" encoding="utf-8"?>
-<ds:datastoreItem xmlns:ds="http://schemas.openxmlformats.org/officeDocument/2006/customXml" ds:itemID="{DE0A3E1F-B2EC-4B36-9F71-3169FFDE4AE0}">
-  <ds:schemaRefs>
-    <ds:schemaRef ds:uri="http://purl.org/dc/elements/1.1/"/>
-    <ds:schemaRef ds:uri="http://schemas.microsoft.com/office/2006/metadata/properties"/>
-    <ds:schemaRef ds:uri="http://schemas.microsoft.com/office/2006/documentManagement/types"/>
-    <ds:schemaRef ds:uri="http://purl.org/dc/terms/"/>
-    <ds:schemaRef ds:uri="http://schemas.openxmlformats.org/package/2006/metadata/core-properties"/>
-    <ds:schemaRef ds:uri="http://purl.org/dc/dcmitype/"/>
-    <ds:schemaRef ds:uri="http://schemas.microsoft.com/office/infopath/2007/PartnerControls"/>
-    <ds:schemaRef ds:uri="http://www.w3.org/XML/1998/namespace"/>
-  </ds:schemaRefs>
-</ds:datastoreItem>
+<file path=customXml/item3.xml><?xml version="1.0" encoding="utf-8"?>
+<p:properties xmlns:p="http://schemas.microsoft.com/office/2006/metadata/properties" xmlns:xsi="http://www.w3.org/2001/XMLSchema-instance" xmlns:pc="http://schemas.microsoft.com/office/infopath/2007/PartnerControls">
+  <documentManagement/>
+</p:properties>
 </file>
 
-<file path=customXml/itemProps2.xml><?xml version="1.0" encoding="utf-8"?>
+<file path=customXml/itemProps1.xml><?xml version="1.0" encoding="utf-8"?>
 <ds:datastoreItem xmlns:ds="http://schemas.openxmlformats.org/officeDocument/2006/customXml" ds:itemID="{4A752D92-0ACC-48D2-A658-AB744FE70ECE}">
   <ds:schemaRefs>
     <ds:schemaRef ds:uri="http://schemas.microsoft.com/sharepoint/v3/contenttype/forms"/>
@@ -10618,7 +10717,7 @@
 </ds:datastoreItem>
 </file>
 
-<file path=customXml/itemProps3.xml><?xml version="1.0" encoding="utf-8"?>
+<file path=customXml/itemProps2.xml><?xml version="1.0" encoding="utf-8"?>
 <ds:datastoreItem xmlns:ds="http://schemas.openxmlformats.org/officeDocument/2006/customXml" ds:itemID="{3175F035-B069-4F0E-ADC8-454931FDE34D}">
   <ds:schemaRefs>
     <ds:schemaRef ds:uri="http://schemas.microsoft.com/office/2006/metadata/contentType"/>
@@ -10632,4 +10731,19 @@
     <ds:schemaRef ds:uri="http://schemas.microsoft.com/office/infopath/2007/PartnerControls"/>
   </ds:schemaRefs>
 </ds:datastoreItem>
+</file>
+
+<file path=customXml/itemProps3.xml><?xml version="1.0" encoding="utf-8"?>
+<ds:datastoreItem xmlns:ds="http://schemas.openxmlformats.org/officeDocument/2006/customXml" ds:itemID="{DE0A3E1F-B2EC-4B36-9F71-3169FFDE4AE0}">
+  <ds:schemaRefs>
+    <ds:schemaRef ds:uri="http://purl.org/dc/elements/1.1/"/>
+    <ds:schemaRef ds:uri="http://schemas.microsoft.com/office/2006/metadata/properties"/>
+    <ds:schemaRef ds:uri="http://schemas.microsoft.com/office/2006/documentManagement/types"/>
+    <ds:schemaRef ds:uri="http://purl.org/dc/terms/"/>
+    <ds:schemaRef ds:uri="http://schemas.openxmlformats.org/package/2006/metadata/core-properties"/>
+    <ds:schemaRef ds:uri="http://purl.org/dc/dcmitype/"/>
+    <ds:schemaRef ds:uri="http://schemas.microsoft.com/office/infopath/2007/PartnerControls"/>
+    <ds:schemaRef ds:uri="http://www.w3.org/XML/1998/namespace"/>
+  </ds:schemaRefs>
+</ds:datastoreItem>
 </file>
</xml_diff>

<commit_message>
powerpoints up2date; added working example voting app
</commit_message>
<xml_diff>
--- a/Presentatie/Microservices 101.pptx
+++ b/Presentatie/Microservices 101.pptx
@@ -232,7 +232,7 @@
           <a:p>
             <a:fld id="{4FDA5BBF-9A9E-E34C-87D2-CD6D1CA60245}" type="datetime1">
               <a:rPr lang="en-US" smtClean="0"/>
-              <a:t>10/5/2018</a:t>
+              <a:t>10/17/2018</a:t>
             </a:fld>
             <a:endParaRPr lang="en-US" dirty="0"/>
           </a:p>
@@ -398,7 +398,7 @@
           <a:p>
             <a:fld id="{FE5FB5CF-D153-1544-8329-2FC1F4ABF24D}" type="datetime1">
               <a:rPr lang="en-US" smtClean="0"/>
-              <a:t>10/5/2018</a:t>
+              <a:t>10/17/2018</a:t>
             </a:fld>
             <a:endParaRPr lang="nl-NL" dirty="0"/>
           </a:p>
@@ -1814,7 +1814,7 @@
           <a:p>
             <a:fld id="{69E2E37C-AA1E-43B2-B213-E688D587CE49}" type="datetime4">
               <a:rPr lang="nl-NL" smtClean="0"/>
-              <a:t>5 oktober 2018</a:t>
+              <a:t>17 oktober 2018</a:t>
             </a:fld>
             <a:endParaRPr lang="nl-NL" dirty="0"/>
           </a:p>
@@ -1931,7 +1931,7 @@
           <a:p>
             <a:fld id="{96BF97C2-7262-427C-9F3E-B0D6D33F54E2}" type="datetime4">
               <a:rPr lang="nl-NL" smtClean="0"/>
-              <a:t>5 oktober 2018</a:t>
+              <a:t>17 oktober 2018</a:t>
             </a:fld>
             <a:endParaRPr lang="nl-NL" dirty="0"/>
           </a:p>
@@ -2155,7 +2155,7 @@
           <a:p>
             <a:fld id="{AB63B3A2-628B-479E-BF05-5959017C6A02}" type="datetime4">
               <a:rPr lang="nl-NL" smtClean="0"/>
-              <a:t>5 oktober 2018</a:t>
+              <a:t>17 oktober 2018</a:t>
             </a:fld>
             <a:endParaRPr lang="nl-NL" dirty="0"/>
           </a:p>
@@ -2422,7 +2422,7 @@
             <a:fld id="{249B52C1-75DC-496B-AF3F-4978B95BB865}" type="datetime4">
               <a:rPr lang="nl-NL" smtClean="0"/>
               <a:pPr/>
-              <a:t>5 oktober 2018</a:t>
+              <a:t>17 oktober 2018</a:t>
             </a:fld>
             <a:endParaRPr lang="nl-NL" dirty="0"/>
           </a:p>
@@ -2518,7 +2518,7 @@
           <a:p>
             <a:fld id="{8D31B592-DB5E-43FC-B016-67E26C01643F}" type="datetime4">
               <a:rPr lang="nl-NL" smtClean="0"/>
-              <a:t>5 oktober 2018</a:t>
+              <a:t>17 oktober 2018</a:t>
             </a:fld>
             <a:endParaRPr lang="nl-NL" dirty="0"/>
           </a:p>
@@ -2728,7 +2728,7 @@
           <a:p>
             <a:fld id="{92E94904-3BB7-4874-AB8B-F31F00F8A078}" type="datetime4">
               <a:rPr lang="nl-NL" smtClean="0"/>
-              <a:t>5 oktober 2018</a:t>
+              <a:t>17 oktober 2018</a:t>
             </a:fld>
             <a:endParaRPr lang="nl-NL" dirty="0"/>
           </a:p>
@@ -2909,7 +2909,7 @@
           <a:p>
             <a:fld id="{A9642D5E-8E53-4D94-8479-CCF9387ED904}" type="datetime4">
               <a:rPr lang="nl-NL" smtClean="0"/>
-              <a:t>5 oktober 2018</a:t>
+              <a:t>17 oktober 2018</a:t>
             </a:fld>
             <a:endParaRPr lang="nl-NL" dirty="0"/>
           </a:p>
@@ -3124,7 +3124,7 @@
           <a:p>
             <a:fld id="{87D76D0B-AA25-481F-9FCE-BD155C5A6085}" type="datetime4">
               <a:rPr lang="nl-NL" smtClean="0"/>
-              <a:t>5 oktober 2018</a:t>
+              <a:t>17 oktober 2018</a:t>
             </a:fld>
             <a:endParaRPr lang="nl-NL" dirty="0"/>
           </a:p>
@@ -3336,7 +3336,7 @@
           <a:p>
             <a:fld id="{88C11819-B839-4C27-8B45-7170CEF46D62}" type="datetime4">
               <a:rPr lang="nl-NL" smtClean="0"/>
-              <a:t>5 oktober 2018</a:t>
+              <a:t>17 oktober 2018</a:t>
             </a:fld>
             <a:endParaRPr lang="nl-NL" dirty="0"/>
           </a:p>
@@ -3551,7 +3551,7 @@
           <a:p>
             <a:fld id="{174613E7-29CA-4C1D-88BD-FA51696C19FE}" type="datetime4">
               <a:rPr lang="nl-NL" smtClean="0"/>
-              <a:t>5 oktober 2018</a:t>
+              <a:t>17 oktober 2018</a:t>
             </a:fld>
             <a:endParaRPr lang="nl-NL" dirty="0"/>
           </a:p>
@@ -3744,7 +3744,7 @@
           <a:p>
             <a:fld id="{9F389A9C-5452-4AF4-8D69-2209042ED2AB}" type="datetime4">
               <a:rPr lang="nl-NL" smtClean="0"/>
-              <a:t>5 oktober 2018</a:t>
+              <a:t>17 oktober 2018</a:t>
             </a:fld>
             <a:endParaRPr lang="nl-NL" dirty="0"/>
           </a:p>
@@ -3948,7 +3948,7 @@
           <a:p>
             <a:fld id="{59ABBC3E-A20C-4DEE-9D7A-437B797B148A}" type="datetime4">
               <a:rPr lang="nl-NL" smtClean="0"/>
-              <a:t>5 oktober 2018</a:t>
+              <a:t>17 oktober 2018</a:t>
             </a:fld>
             <a:r>
               <a:rPr lang="en-US"/>
@@ -4445,7 +4445,7 @@
           <a:p>
             <a:fld id="{E8809DAD-F941-4A15-ABB1-44FA32742BE9}" type="datetime4">
               <a:rPr lang="nl-NL" smtClean="0"/>
-              <a:t>5 oktober 2018</a:t>
+              <a:t>17 oktober 2018</a:t>
             </a:fld>
             <a:endParaRPr lang="nl-NL" dirty="0"/>
           </a:p>
@@ -5025,7 +5025,7 @@
                   <a:srgbClr val="009036"/>
                 </a:solidFill>
               </a:rPr>
-              <a:t>5 oktober 2018</a:t>
+              <a:t>17 oktober 2018</a:t>
             </a:fld>
             <a:endParaRPr lang="nl-NL" sz="900" cap="all" dirty="0">
               <a:solidFill>
@@ -5508,7 +5508,7 @@
                   <a:srgbClr val="009036"/>
                 </a:solidFill>
               </a:rPr>
-              <a:t>5 oktober 2018</a:t>
+              <a:t>17 oktober 2018</a:t>
             </a:fld>
             <a:endParaRPr lang="nl-NL" sz="900" cap="all" dirty="0">
               <a:solidFill>
@@ -8439,7 +8439,7 @@
                   <a:srgbClr val="009036"/>
                 </a:solidFill>
               </a:rPr>
-              <a:t>5 oktober 2018</a:t>
+              <a:t>17 oktober 2018</a:t>
             </a:fld>
             <a:endParaRPr lang="nl-NL" sz="900" cap="all" dirty="0">
               <a:solidFill>
@@ -8748,7 +8748,7 @@
                   <a:srgbClr val="009036"/>
                 </a:solidFill>
               </a:rPr>
-              <a:t>5 oktober 2018</a:t>
+              <a:t>17 oktober 2018</a:t>
             </a:fld>
             <a:endParaRPr lang="nl-NL" sz="900" cap="all" dirty="0">
               <a:solidFill>
@@ -9056,7 +9056,7 @@
             <a:fld id="{249B52C1-75DC-496B-AF3F-4978B95BB865}" type="datetime4">
               <a:rPr lang="nl-NL" smtClean="0"/>
               <a:pPr/>
-              <a:t>5 oktober 2018</a:t>
+              <a:t>17 oktober 2018</a:t>
             </a:fld>
             <a:endParaRPr lang="nl-NL" dirty="0"/>
           </a:p>
@@ -9808,7 +9808,7 @@
             <a:fld id="{249B52C1-75DC-496B-AF3F-4978B95BB865}" type="datetime4">
               <a:rPr lang="nl-NL" smtClean="0"/>
               <a:pPr/>
-              <a:t>5 oktober 2018</a:t>
+              <a:t>17 oktober 2018</a:t>
             </a:fld>
             <a:endParaRPr lang="nl-NL" dirty="0"/>
           </a:p>
@@ -10798,7 +10798,7 @@
                   <a:srgbClr val="009036"/>
                 </a:solidFill>
               </a:rPr>
-              <a:t>5 oktober 2018</a:t>
+              <a:t>17 oktober 2018</a:t>
             </a:fld>
             <a:endParaRPr lang="nl-NL" sz="900" cap="all" dirty="0">
               <a:solidFill>
@@ -11078,7 +11078,7 @@
           <a:p>
             <a:fld id="{6C8F2B54-89D2-4D0B-81B9-EBE704C6250E}" type="datetime4">
               <a:rPr lang="nl-NL" smtClean="0"/>
-              <a:t>5 oktober 2018</a:t>
+              <a:t>17 oktober 2018</a:t>
             </a:fld>
             <a:endParaRPr lang="nl-NL" dirty="0"/>
           </a:p>
@@ -12064,9 +12064,12 @@
 </file>
 
 <file path=customXml/item1.xml><?xml version="1.0" encoding="utf-8"?>
-<p:properties xmlns:p="http://schemas.microsoft.com/office/2006/metadata/properties" xmlns:xsi="http://www.w3.org/2001/XMLSchema-instance" xmlns:pc="http://schemas.microsoft.com/office/infopath/2007/PartnerControls">
-  <documentManagement/>
-</p:properties>
+<?mso-contentType ?>
+<FormTemplates xmlns="http://schemas.microsoft.com/sharepoint/v3/contenttype/forms">
+  <Display>DocumentLibraryForm</Display>
+  <Edit>DocumentLibraryForm</Edit>
+  <New>DocumentLibraryForm</New>
+</FormTemplates>
 </file>
 
 <file path=customXml/item2.xml><?xml version="1.0" encoding="utf-8"?>
@@ -12184,25 +12187,15 @@
 </file>
 
 <file path=customXml/item3.xml><?xml version="1.0" encoding="utf-8"?>
-<?mso-contentType ?>
-<FormTemplates xmlns="http://schemas.microsoft.com/sharepoint/v3/contenttype/forms">
-  <Display>DocumentLibraryForm</Display>
-  <Edit>DocumentLibraryForm</Edit>
-  <New>DocumentLibraryForm</New>
-</FormTemplates>
+<p:properties xmlns:p="http://schemas.microsoft.com/office/2006/metadata/properties" xmlns:xsi="http://www.w3.org/2001/XMLSchema-instance" xmlns:pc="http://schemas.microsoft.com/office/infopath/2007/PartnerControls">
+  <documentManagement/>
+</p:properties>
 </file>
 
 <file path=customXml/itemProps1.xml><?xml version="1.0" encoding="utf-8"?>
-<ds:datastoreItem xmlns:ds="http://schemas.openxmlformats.org/officeDocument/2006/customXml" ds:itemID="{DE0A3E1F-B2EC-4B36-9F71-3169FFDE4AE0}">
+<ds:datastoreItem xmlns:ds="http://schemas.openxmlformats.org/officeDocument/2006/customXml" ds:itemID="{4A752D92-0ACC-48D2-A658-AB744FE70ECE}">
   <ds:schemaRefs>
-    <ds:schemaRef ds:uri="http://purl.org/dc/elements/1.1/"/>
-    <ds:schemaRef ds:uri="http://schemas.microsoft.com/office/2006/metadata/properties"/>
-    <ds:schemaRef ds:uri="http://schemas.microsoft.com/office/2006/documentManagement/types"/>
-    <ds:schemaRef ds:uri="http://purl.org/dc/terms/"/>
-    <ds:schemaRef ds:uri="http://schemas.openxmlformats.org/package/2006/metadata/core-properties"/>
-    <ds:schemaRef ds:uri="http://purl.org/dc/dcmitype/"/>
-    <ds:schemaRef ds:uri="http://schemas.microsoft.com/office/infopath/2007/PartnerControls"/>
-    <ds:schemaRef ds:uri="http://www.w3.org/XML/1998/namespace"/>
+    <ds:schemaRef ds:uri="http://schemas.microsoft.com/sharepoint/v3/contenttype/forms"/>
   </ds:schemaRefs>
 </ds:datastoreItem>
 </file>
@@ -12224,9 +12217,16 @@
 </file>
 
 <file path=customXml/itemProps3.xml><?xml version="1.0" encoding="utf-8"?>
-<ds:datastoreItem xmlns:ds="http://schemas.openxmlformats.org/officeDocument/2006/customXml" ds:itemID="{4A752D92-0ACC-48D2-A658-AB744FE70ECE}">
+<ds:datastoreItem xmlns:ds="http://schemas.openxmlformats.org/officeDocument/2006/customXml" ds:itemID="{DE0A3E1F-B2EC-4B36-9F71-3169FFDE4AE0}">
   <ds:schemaRefs>
-    <ds:schemaRef ds:uri="http://schemas.microsoft.com/sharepoint/v3/contenttype/forms"/>
+    <ds:schemaRef ds:uri="http://purl.org/dc/elements/1.1/"/>
+    <ds:schemaRef ds:uri="http://schemas.microsoft.com/office/2006/metadata/properties"/>
+    <ds:schemaRef ds:uri="http://schemas.microsoft.com/office/2006/documentManagement/types"/>
+    <ds:schemaRef ds:uri="http://purl.org/dc/terms/"/>
+    <ds:schemaRef ds:uri="http://schemas.openxmlformats.org/package/2006/metadata/core-properties"/>
+    <ds:schemaRef ds:uri="http://purl.org/dc/dcmitype/"/>
+    <ds:schemaRef ds:uri="http://schemas.microsoft.com/office/infopath/2007/PartnerControls"/>
+    <ds:schemaRef ds:uri="http://www.w3.org/XML/1998/namespace"/>
   </ds:schemaRefs>
 </ds:datastoreItem>
 </file>
</xml_diff>

<commit_message>
organise presentations and lists
</commit_message>
<xml_diff>
--- a/Presentatie/Microservices 101.pptx
+++ b/Presentatie/Microservices 101.pptx
@@ -5,21 +5,22 @@
     <p:sldMasterId id="2147483648" r:id="rId4"/>
   </p:sldMasterIdLst>
   <p:notesMasterIdLst>
-    <p:notesMasterId r:id="rId14"/>
+    <p:notesMasterId r:id="rId15"/>
   </p:notesMasterIdLst>
   <p:handoutMasterIdLst>
-    <p:handoutMasterId r:id="rId15"/>
+    <p:handoutMasterId r:id="rId16"/>
   </p:handoutMasterIdLst>
   <p:sldIdLst>
     <p:sldId id="257" r:id="rId5"/>
-    <p:sldId id="259" r:id="rId6"/>
-    <p:sldId id="266" r:id="rId7"/>
-    <p:sldId id="270" r:id="rId8"/>
-    <p:sldId id="274" r:id="rId9"/>
-    <p:sldId id="278" r:id="rId10"/>
-    <p:sldId id="279" r:id="rId11"/>
-    <p:sldId id="271" r:id="rId12"/>
-    <p:sldId id="277" r:id="rId13"/>
+    <p:sldId id="280" r:id="rId6"/>
+    <p:sldId id="259" r:id="rId7"/>
+    <p:sldId id="266" r:id="rId8"/>
+    <p:sldId id="270" r:id="rId9"/>
+    <p:sldId id="274" r:id="rId10"/>
+    <p:sldId id="278" r:id="rId11"/>
+    <p:sldId id="279" r:id="rId12"/>
+    <p:sldId id="271" r:id="rId13"/>
+    <p:sldId id="277" r:id="rId14"/>
   </p:sldIdLst>
   <p:sldSz cx="9144000" cy="6858000" type="screen4x3"/>
   <p:notesSz cx="6858000" cy="9144000"/>
@@ -232,7 +233,7 @@
           <a:p>
             <a:fld id="{4FDA5BBF-9A9E-E34C-87D2-CD6D1CA60245}" type="datetime1">
               <a:rPr lang="en-US" smtClean="0"/>
-              <a:t>10/17/2018</a:t>
+              <a:t>11/2/2018</a:t>
             </a:fld>
             <a:endParaRPr lang="en-US" dirty="0"/>
           </a:p>
@@ -398,7 +399,7 @@
           <a:p>
             <a:fld id="{FE5FB5CF-D153-1544-8329-2FC1F4ABF24D}" type="datetime1">
               <a:rPr lang="en-US" smtClean="0"/>
-              <a:t>10/17/2018</a:t>
+              <a:t>11/2/2018</a:t>
             </a:fld>
             <a:endParaRPr lang="nl-NL" dirty="0"/>
           </a:p>
@@ -919,7 +920,7 @@
           <a:p>
             <a:fld id="{2DB1139D-5AC7-4B0B-A715-E40E0591EF82}" type="slidenum">
               <a:rPr lang="nl-NL" smtClean="0"/>
-              <a:t>2</a:t>
+              <a:t>3</a:t>
             </a:fld>
             <a:endParaRPr lang="nl-NL" dirty="0"/>
           </a:p>
@@ -1104,7 +1105,7 @@
           <a:p>
             <a:fld id="{2DB1139D-5AC7-4B0B-A715-E40E0591EF82}" type="slidenum">
               <a:rPr lang="nl-NL" smtClean="0"/>
-              <a:t>3</a:t>
+              <a:t>4</a:t>
             </a:fld>
             <a:endParaRPr lang="nl-NL" dirty="0"/>
           </a:p>
@@ -1323,7 +1324,7 @@
           <a:p>
             <a:fld id="{2DB1139D-5AC7-4B0B-A715-E40E0591EF82}" type="slidenum">
               <a:rPr lang="nl-NL" smtClean="0"/>
-              <a:t>4</a:t>
+              <a:t>5</a:t>
             </a:fld>
             <a:endParaRPr lang="nl-NL" dirty="0"/>
           </a:p>
@@ -1449,7 +1450,7 @@
           <a:p>
             <a:fld id="{2DB1139D-5AC7-4B0B-A715-E40E0591EF82}" type="slidenum">
               <a:rPr lang="nl-NL" smtClean="0"/>
-              <a:t>5</a:t>
+              <a:t>6</a:t>
             </a:fld>
             <a:endParaRPr lang="nl-NL" dirty="0"/>
           </a:p>
@@ -1644,7 +1645,7 @@
           <a:p>
             <a:fld id="{2DB1139D-5AC7-4B0B-A715-E40E0591EF82}" type="slidenum">
               <a:rPr lang="nl-NL" smtClean="0"/>
-              <a:t>8</a:t>
+              <a:t>9</a:t>
             </a:fld>
             <a:endParaRPr lang="nl-NL" dirty="0"/>
           </a:p>
@@ -1814,7 +1815,7 @@
           <a:p>
             <a:fld id="{69E2E37C-AA1E-43B2-B213-E688D587CE49}" type="datetime4">
               <a:rPr lang="nl-NL" smtClean="0"/>
-              <a:t>17 oktober 2018</a:t>
+              <a:t>2 november 2018</a:t>
             </a:fld>
             <a:endParaRPr lang="nl-NL" dirty="0"/>
           </a:p>
@@ -1931,7 +1932,7 @@
           <a:p>
             <a:fld id="{96BF97C2-7262-427C-9F3E-B0D6D33F54E2}" type="datetime4">
               <a:rPr lang="nl-NL" smtClean="0"/>
-              <a:t>17 oktober 2018</a:t>
+              <a:t>2 november 2018</a:t>
             </a:fld>
             <a:endParaRPr lang="nl-NL" dirty="0"/>
           </a:p>
@@ -2155,7 +2156,7 @@
           <a:p>
             <a:fld id="{AB63B3A2-628B-479E-BF05-5959017C6A02}" type="datetime4">
               <a:rPr lang="nl-NL" smtClean="0"/>
-              <a:t>17 oktober 2018</a:t>
+              <a:t>2 november 2018</a:t>
             </a:fld>
             <a:endParaRPr lang="nl-NL" dirty="0"/>
           </a:p>
@@ -2422,7 +2423,7 @@
             <a:fld id="{249B52C1-75DC-496B-AF3F-4978B95BB865}" type="datetime4">
               <a:rPr lang="nl-NL" smtClean="0"/>
               <a:pPr/>
-              <a:t>17 oktober 2018</a:t>
+              <a:t>2 november 2018</a:t>
             </a:fld>
             <a:endParaRPr lang="nl-NL" dirty="0"/>
           </a:p>
@@ -2518,7 +2519,7 @@
           <a:p>
             <a:fld id="{8D31B592-DB5E-43FC-B016-67E26C01643F}" type="datetime4">
               <a:rPr lang="nl-NL" smtClean="0"/>
-              <a:t>17 oktober 2018</a:t>
+              <a:t>2 november 2018</a:t>
             </a:fld>
             <a:endParaRPr lang="nl-NL" dirty="0"/>
           </a:p>
@@ -2728,7 +2729,7 @@
           <a:p>
             <a:fld id="{92E94904-3BB7-4874-AB8B-F31F00F8A078}" type="datetime4">
               <a:rPr lang="nl-NL" smtClean="0"/>
-              <a:t>17 oktober 2018</a:t>
+              <a:t>2 november 2018</a:t>
             </a:fld>
             <a:endParaRPr lang="nl-NL" dirty="0"/>
           </a:p>
@@ -2909,7 +2910,7 @@
           <a:p>
             <a:fld id="{A9642D5E-8E53-4D94-8479-CCF9387ED904}" type="datetime4">
               <a:rPr lang="nl-NL" smtClean="0"/>
-              <a:t>17 oktober 2018</a:t>
+              <a:t>2 november 2018</a:t>
             </a:fld>
             <a:endParaRPr lang="nl-NL" dirty="0"/>
           </a:p>
@@ -3124,7 +3125,7 @@
           <a:p>
             <a:fld id="{87D76D0B-AA25-481F-9FCE-BD155C5A6085}" type="datetime4">
               <a:rPr lang="nl-NL" smtClean="0"/>
-              <a:t>17 oktober 2018</a:t>
+              <a:t>2 november 2018</a:t>
             </a:fld>
             <a:endParaRPr lang="nl-NL" dirty="0"/>
           </a:p>
@@ -3336,7 +3337,7 @@
           <a:p>
             <a:fld id="{88C11819-B839-4C27-8B45-7170CEF46D62}" type="datetime4">
               <a:rPr lang="nl-NL" smtClean="0"/>
-              <a:t>17 oktober 2018</a:t>
+              <a:t>2 november 2018</a:t>
             </a:fld>
             <a:endParaRPr lang="nl-NL" dirty="0"/>
           </a:p>
@@ -3551,7 +3552,7 @@
           <a:p>
             <a:fld id="{174613E7-29CA-4C1D-88BD-FA51696C19FE}" type="datetime4">
               <a:rPr lang="nl-NL" smtClean="0"/>
-              <a:t>17 oktober 2018</a:t>
+              <a:t>2 november 2018</a:t>
             </a:fld>
             <a:endParaRPr lang="nl-NL" dirty="0"/>
           </a:p>
@@ -3744,7 +3745,7 @@
           <a:p>
             <a:fld id="{9F389A9C-5452-4AF4-8D69-2209042ED2AB}" type="datetime4">
               <a:rPr lang="nl-NL" smtClean="0"/>
-              <a:t>17 oktober 2018</a:t>
+              <a:t>2 november 2018</a:t>
             </a:fld>
             <a:endParaRPr lang="nl-NL" dirty="0"/>
           </a:p>
@@ -3948,7 +3949,7 @@
           <a:p>
             <a:fld id="{59ABBC3E-A20C-4DEE-9D7A-437B797B148A}" type="datetime4">
               <a:rPr lang="nl-NL" smtClean="0"/>
-              <a:t>17 oktober 2018</a:t>
+              <a:t>2 november 2018</a:t>
             </a:fld>
             <a:r>
               <a:rPr lang="en-US"/>
@@ -4445,7 +4446,7 @@
           <a:p>
             <a:fld id="{E8809DAD-F941-4A15-ABB1-44FA32742BE9}" type="datetime4">
               <a:rPr lang="nl-NL" smtClean="0"/>
-              <a:t>17 oktober 2018</a:t>
+              <a:t>2 november 2018</a:t>
             </a:fld>
             <a:endParaRPr lang="nl-NL" dirty="0"/>
           </a:p>
@@ -4829,6 +4830,194 @@
     <p:extLst>
       <p:ext uri="{BB962C8B-B14F-4D97-AF65-F5344CB8AC3E}">
         <p14:creationId xmlns:p14="http://schemas.microsoft.com/office/powerpoint/2010/main" val="4283019955"/>
+      </p:ext>
+    </p:extLst>
+  </p:cSld>
+  <p:clrMapOvr>
+    <a:masterClrMapping/>
+  </p:clrMapOvr>
+</p:sld>
+</file>
+
+<file path=ppt/slides/slide10.xml><?xml version="1.0" encoding="utf-8"?>
+<p:sld xmlns:a="http://schemas.openxmlformats.org/drawingml/2006/main" xmlns:r="http://schemas.openxmlformats.org/officeDocument/2006/relationships" xmlns:p="http://schemas.openxmlformats.org/presentationml/2006/main">
+  <p:cSld>
+    <p:spTree>
+      <p:nvGrpSpPr>
+        <p:cNvPr id="1" name=""/>
+        <p:cNvGrpSpPr/>
+        <p:nvPr/>
+      </p:nvGrpSpPr>
+      <p:grpSpPr>
+        <a:xfrm>
+          <a:off x="0" y="0"/>
+          <a:ext cx="0" cy="0"/>
+          <a:chOff x="0" y="0"/>
+          <a:chExt cx="0" cy="0"/>
+        </a:xfrm>
+      </p:grpSpPr>
+      <p:sp>
+        <p:nvSpPr>
+          <p:cNvPr id="11" name="Titel 10"/>
+          <p:cNvSpPr>
+            <a:spLocks noGrp="1"/>
+          </p:cNvSpPr>
+          <p:nvPr>
+            <p:ph type="ctrTitle"/>
+          </p:nvPr>
+        </p:nvSpPr>
+        <p:spPr/>
+        <p:txBody>
+          <a:bodyPr/>
+          <a:lstStyle/>
+          <a:p>
+            <a:r>
+              <a:rPr lang="nl-NL" dirty="0"/>
+              <a:t>Vragen?</a:t>
+            </a:r>
+          </a:p>
+        </p:txBody>
+      </p:sp>
+      <p:sp>
+        <p:nvSpPr>
+          <p:cNvPr id="2" name="Tekstvak 1"/>
+          <p:cNvSpPr txBox="1"/>
+          <p:nvPr/>
+        </p:nvSpPr>
+        <p:spPr>
+          <a:xfrm>
+            <a:off x="634402" y="3851374"/>
+            <a:ext cx="2730235" cy="1323439"/>
+          </a:xfrm>
+          <a:prstGeom prst="rect">
+            <a:avLst/>
+          </a:prstGeom>
+          <a:noFill/>
+        </p:spPr>
+        <p:txBody>
+          <a:bodyPr wrap="none" rtlCol="0">
+            <a:spAutoFit/>
+          </a:bodyPr>
+          <a:lstStyle/>
+          <a:p>
+            <a:r>
+              <a:rPr lang="en-US" sz="1600" dirty="0">
+                <a:solidFill>
+                  <a:schemeClr val="bg1"/>
+                </a:solidFill>
+                <a:latin typeface="Arial"/>
+                <a:cs typeface="Arial"/>
+              </a:rPr>
+              <a:t>Johannes Sim</a:t>
+            </a:r>
+          </a:p>
+          <a:p>
+            <a:r>
+              <a:rPr lang="en-US" sz="1600" dirty="0">
+                <a:solidFill>
+                  <a:schemeClr val="bg1"/>
+                </a:solidFill>
+                <a:latin typeface="Arial"/>
+                <a:cs typeface="Arial"/>
+              </a:rPr>
+              <a:t>johannes.sim@centric.eu</a:t>
+            </a:r>
+          </a:p>
+          <a:p>
+            <a:endParaRPr lang="nl-NL" sz="1600" dirty="0">
+              <a:solidFill>
+                <a:schemeClr val="bg1"/>
+              </a:solidFill>
+              <a:latin typeface="Arial"/>
+              <a:cs typeface="Arial"/>
+            </a:endParaRPr>
+          </a:p>
+          <a:p>
+            <a:r>
+              <a:rPr lang="nl-NL" sz="1600" dirty="0">
+                <a:solidFill>
+                  <a:schemeClr val="bg1"/>
+                </a:solidFill>
+                <a:latin typeface="Arial"/>
+                <a:cs typeface="Arial"/>
+              </a:rPr>
+              <a:t>Renzo Veldkamp</a:t>
+            </a:r>
+          </a:p>
+          <a:p>
+            <a:r>
+              <a:rPr lang="nl-NL" sz="1600" dirty="0">
+                <a:solidFill>
+                  <a:schemeClr val="bg1"/>
+                </a:solidFill>
+                <a:latin typeface="Arial"/>
+                <a:cs typeface="Arial"/>
+              </a:rPr>
+              <a:t>renzo.veldkamp@centric.eu</a:t>
+            </a:r>
+          </a:p>
+        </p:txBody>
+      </p:sp>
+      <p:sp>
+        <p:nvSpPr>
+          <p:cNvPr id="5" name="Date Placeholder 4"/>
+          <p:cNvSpPr>
+            <a:spLocks noGrp="1"/>
+          </p:cNvSpPr>
+          <p:nvPr>
+            <p:ph type="dt" sz="half" idx="10"/>
+          </p:nvPr>
+        </p:nvSpPr>
+        <p:spPr/>
+        <p:txBody>
+          <a:bodyPr/>
+          <a:lstStyle/>
+          <a:p>
+            <a:fld id="{6C8F2B54-89D2-4D0B-81B9-EBE704C6250E}" type="datetime4">
+              <a:rPr lang="nl-NL" smtClean="0"/>
+              <a:t>2 november 2018</a:t>
+            </a:fld>
+            <a:endParaRPr lang="nl-NL" dirty="0"/>
+          </a:p>
+        </p:txBody>
+      </p:sp>
+      <p:sp>
+        <p:nvSpPr>
+          <p:cNvPr id="6" name="Footer Placeholder 5"/>
+          <p:cNvSpPr>
+            <a:spLocks noGrp="1"/>
+          </p:cNvSpPr>
+          <p:nvPr>
+            <p:ph type="ftr" sz="quarter" idx="11"/>
+          </p:nvPr>
+        </p:nvSpPr>
+        <p:spPr/>
+        <p:txBody>
+          <a:bodyPr/>
+          <a:lstStyle/>
+          <a:p>
+            <a:r>
+              <a:rPr lang="en-US" dirty="0"/>
+              <a:t>Johannes Sim &amp;</a:t>
+            </a:r>
+          </a:p>
+          <a:p>
+            <a:r>
+              <a:rPr lang="en-US" dirty="0"/>
+              <a:t>Renzo </a:t>
+            </a:r>
+            <a:r>
+              <a:rPr lang="en-US" dirty="0" err="1"/>
+              <a:t>veldkamp</a:t>
+            </a:r>
+            <a:endParaRPr lang="nl-NL" dirty="0"/>
+          </a:p>
+        </p:txBody>
+      </p:sp>
+    </p:spTree>
+    <p:extLst>
+      <p:ext uri="{BB962C8B-B14F-4D97-AF65-F5344CB8AC3E}">
+        <p14:creationId xmlns:p14="http://schemas.microsoft.com/office/powerpoint/2010/main" val="1991217779"/>
       </p:ext>
     </p:extLst>
   </p:cSld>
@@ -4855,196 +5044,24 @@
           <a:chExt cx="0" cy="0"/>
         </a:xfrm>
       </p:grpSpPr>
-      <p:sp>
-        <p:nvSpPr>
-          <p:cNvPr id="2" name="Titel 1"/>
-          <p:cNvSpPr>
-            <a:spLocks noGrp="1"/>
-          </p:cNvSpPr>
-          <p:nvPr>
-            <p:ph type="title"/>
-          </p:nvPr>
-        </p:nvSpPr>
-        <p:spPr/>
-        <p:txBody>
-          <a:bodyPr/>
-          <a:lstStyle/>
-          <a:p>
-            <a:r>
-              <a:rPr lang="nl-NL" cap="all" dirty="0"/>
-              <a:t>onderwerpen</a:t>
-            </a:r>
-            <a:endParaRPr lang="nl-NL" dirty="0"/>
-          </a:p>
-        </p:txBody>
-      </p:sp>
-      <p:sp>
-        <p:nvSpPr>
-          <p:cNvPr id="3" name="Tijdelijke aanduiding voor inhoud 2"/>
-          <p:cNvSpPr>
-            <a:spLocks noGrp="1"/>
-          </p:cNvSpPr>
+      <p:pic>
+        <p:nvPicPr>
+          <p:cNvPr id="7" name="Content Placeholder 6">
+            <a:extLst>
+              <a:ext uri="{FF2B5EF4-FFF2-40B4-BE49-F238E27FC236}">
+                <a16:creationId xmlns:a16="http://schemas.microsoft.com/office/drawing/2014/main" id="{6AA55384-36C5-4718-9A8B-F696915B0FA8}"/>
+              </a:ext>
+            </a:extLst>
+          </p:cNvPr>
+          <p:cNvPicPr>
+            <a:picLocks noGrp="1" noChangeAspect="1"/>
+          </p:cNvPicPr>
           <p:nvPr>
             <p:ph idx="1"/>
           </p:nvPr>
-        </p:nvSpPr>
-        <p:spPr>
-          <a:xfrm>
-            <a:off x="617538" y="1295518"/>
-            <a:ext cx="8163164" cy="4579765"/>
-          </a:xfrm>
-        </p:spPr>
-        <p:txBody>
-          <a:bodyPr>
-            <a:normAutofit/>
-          </a:bodyPr>
-          <a:lstStyle/>
-          <a:p>
-            <a:pPr>
-              <a:spcAft>
-                <a:spcPts val="600"/>
-              </a:spcAft>
-            </a:pPr>
-            <a:r>
-              <a:rPr lang="nl-NL" dirty="0"/>
-              <a:t>Microservices-architectuur</a:t>
-            </a:r>
-          </a:p>
-          <a:p>
-            <a:pPr>
-              <a:spcAft>
-                <a:spcPts val="600"/>
-              </a:spcAft>
-            </a:pPr>
-            <a:r>
-              <a:rPr lang="nl-NL" dirty="0"/>
-              <a:t>(Nieuwe) Mogelijkheden</a:t>
-            </a:r>
-          </a:p>
-          <a:p>
-            <a:pPr>
-              <a:spcAft>
-                <a:spcPts val="600"/>
-              </a:spcAft>
-            </a:pPr>
-            <a:r>
-              <a:rPr lang="en-US" dirty="0"/>
-              <a:t>O</a:t>
-            </a:r>
-            <a:r>
-              <a:rPr lang="nl-NL" dirty="0" err="1"/>
-              <a:t>nderlinge</a:t>
-            </a:r>
-            <a:r>
-              <a:rPr lang="nl-NL" dirty="0"/>
-              <a:t> communicatie</a:t>
-            </a:r>
-          </a:p>
-          <a:p>
-            <a:pPr>
-              <a:spcAft>
-                <a:spcPts val="600"/>
-              </a:spcAft>
-            </a:pPr>
-            <a:r>
-              <a:rPr lang="en-US" dirty="0"/>
-              <a:t>Hosting (on premise, cloud)</a:t>
-            </a:r>
-          </a:p>
-          <a:p>
-            <a:pPr>
-              <a:spcAft>
-                <a:spcPts val="600"/>
-              </a:spcAft>
-            </a:pPr>
-            <a:r>
-              <a:rPr lang="en-US" dirty="0" err="1"/>
-              <a:t>Vragen</a:t>
-            </a:r>
-            <a:endParaRPr lang="nl-NL" dirty="0"/>
-          </a:p>
-        </p:txBody>
-      </p:sp>
-      <p:sp>
-        <p:nvSpPr>
-          <p:cNvPr id="4" name="Tijdelijke aanduiding voor voettekst 3"/>
-          <p:cNvSpPr>
-            <a:spLocks noGrp="1"/>
-          </p:cNvSpPr>
-          <p:nvPr>
-            <p:ph type="ftr" sz="quarter" idx="11"/>
-          </p:nvPr>
-        </p:nvSpPr>
-        <p:spPr/>
-        <p:txBody>
-          <a:bodyPr vert="horz" lIns="91440" tIns="45720" rIns="91440" bIns="45720" rtlCol="0" anchor="ctr"/>
-          <a:lstStyle/>
-          <a:p>
-            <a:r>
-              <a:rPr lang="nl-NL" dirty="0">
-                <a:solidFill>
-                  <a:srgbClr val="009036"/>
-                </a:solidFill>
-              </a:rPr>
-              <a:t>Johannes Sim &amp; Renzo </a:t>
-            </a:r>
-            <a:r>
-              <a:rPr lang="nl-NL" dirty="0" err="1">
-                <a:solidFill>
-                  <a:srgbClr val="009036"/>
-                </a:solidFill>
-              </a:rPr>
-              <a:t>veldkamp</a:t>
-            </a:r>
-            <a:endParaRPr lang="nl-NL" dirty="0">
-              <a:solidFill>
-                <a:srgbClr val="009036"/>
-              </a:solidFill>
-            </a:endParaRPr>
-          </a:p>
-        </p:txBody>
-      </p:sp>
-      <p:sp>
-        <p:nvSpPr>
-          <p:cNvPr id="6" name="Date Placeholder 5"/>
-          <p:cNvSpPr>
-            <a:spLocks noGrp="1"/>
-          </p:cNvSpPr>
-          <p:nvPr>
-            <p:ph type="dt" sz="half" idx="10"/>
-          </p:nvPr>
-        </p:nvSpPr>
-        <p:spPr/>
-        <p:txBody>
-          <a:bodyPr vert="horz" lIns="91440" tIns="45720" rIns="91440" bIns="45720" rtlCol="0" anchor="ctr"/>
-          <a:lstStyle/>
-          <a:p>
-            <a:fld id="{91A25AAE-37E5-4948-9A98-4D0CB3952B1C}" type="datetime4">
-              <a:rPr lang="nl-NL" sz="900" cap="all" smtClean="0">
-                <a:solidFill>
-                  <a:srgbClr val="009036"/>
-                </a:solidFill>
-              </a:rPr>
-              <a:t>17 oktober 2018</a:t>
-            </a:fld>
-            <a:endParaRPr lang="nl-NL" sz="900" cap="all" dirty="0">
-              <a:solidFill>
-                <a:srgbClr val="009036"/>
-              </a:solidFill>
-            </a:endParaRPr>
-          </a:p>
-        </p:txBody>
-      </p:sp>
-      <p:pic>
-        <p:nvPicPr>
-          <p:cNvPr id="9" name="Afbeelding 8"/>
-          <p:cNvPicPr>
-            <a:picLocks noChangeAspect="1"/>
-          </p:cNvPicPr>
-          <p:nvPr/>
         </p:nvPicPr>
         <p:blipFill>
-          <a:blip r:embed="rId3" cstate="print">
+          <a:blip r:embed="rId2" cstate="print">
             <a:extLst>
               <a:ext uri="{28A0092B-C50C-407E-A947-70E740481C1C}">
                 <a14:useLocalDpi xmlns:a14="http://schemas.microsoft.com/office/drawing/2010/main" val="0"/>
@@ -5057,18 +5074,209 @@
         </p:blipFill>
         <p:spPr>
           <a:xfrm>
-            <a:off x="6244731" y="1167324"/>
-            <a:ext cx="2684815" cy="2512659"/>
+            <a:off x="4810125" y="572348"/>
+            <a:ext cx="3938588" cy="5265628"/>
+          </a:xfrm>
+        </p:spPr>
+      </p:pic>
+      <p:sp>
+        <p:nvSpPr>
+          <p:cNvPr id="4" name="Date Placeholder 3">
+            <a:extLst>
+              <a:ext uri="{FF2B5EF4-FFF2-40B4-BE49-F238E27FC236}">
+                <a16:creationId xmlns:a16="http://schemas.microsoft.com/office/drawing/2014/main" id="{8CAEBB11-FF08-4F5E-89BB-4B2F72D55C90}"/>
+              </a:ext>
+            </a:extLst>
+          </p:cNvPr>
+          <p:cNvSpPr>
+            <a:spLocks noGrp="1"/>
+          </p:cNvSpPr>
+          <p:nvPr>
+            <p:ph type="dt" sz="half" idx="10"/>
+          </p:nvPr>
+        </p:nvSpPr>
+        <p:spPr/>
+        <p:txBody>
+          <a:bodyPr/>
+          <a:lstStyle/>
+          <a:p>
+            <a:fld id="{249B52C1-75DC-496B-AF3F-4978B95BB865}" type="datetime4">
+              <a:rPr lang="nl-NL" smtClean="0"/>
+              <a:pPr/>
+              <a:t>2 november 2018</a:t>
+            </a:fld>
+            <a:endParaRPr lang="nl-NL" dirty="0"/>
+          </a:p>
+        </p:txBody>
+      </p:sp>
+      <p:sp>
+        <p:nvSpPr>
+          <p:cNvPr id="5" name="Footer Placeholder 4">
+            <a:extLst>
+              <a:ext uri="{FF2B5EF4-FFF2-40B4-BE49-F238E27FC236}">
+                <a16:creationId xmlns:a16="http://schemas.microsoft.com/office/drawing/2014/main" id="{92DA294A-607B-420F-9F6D-047CA73E4FC3}"/>
+              </a:ext>
+            </a:extLst>
+          </p:cNvPr>
+          <p:cNvSpPr>
+            <a:spLocks noGrp="1"/>
+          </p:cNvSpPr>
+          <p:nvPr>
+            <p:ph type="ftr" sz="quarter" idx="11"/>
+          </p:nvPr>
+        </p:nvSpPr>
+        <p:spPr/>
+        <p:txBody>
+          <a:bodyPr/>
+          <a:lstStyle/>
+          <a:p>
+            <a:r>
+              <a:rPr lang="nl-NL"/>
+              <a:t>Johannes Sim &amp; Renzo veldkamp</a:t>
+            </a:r>
+            <a:endParaRPr lang="nl-NL" dirty="0"/>
+          </a:p>
+        </p:txBody>
+      </p:sp>
+      <p:sp>
+        <p:nvSpPr>
+          <p:cNvPr id="10" name="Picture Placeholder 9">
+            <a:extLst>
+              <a:ext uri="{FF2B5EF4-FFF2-40B4-BE49-F238E27FC236}">
+                <a16:creationId xmlns:a16="http://schemas.microsoft.com/office/drawing/2014/main" id="{58E8D336-78A6-45A6-B03B-192A3A456E81}"/>
+              </a:ext>
+            </a:extLst>
+          </p:cNvPr>
+          <p:cNvSpPr>
+            <a:spLocks noGrp="1"/>
+          </p:cNvSpPr>
+          <p:nvPr>
+            <p:ph type="pic" sz="quarter" idx="13"/>
+          </p:nvPr>
+        </p:nvSpPr>
+        <p:spPr/>
+      </p:sp>
+      <p:sp>
+        <p:nvSpPr>
+          <p:cNvPr id="2" name="Title 1">
+            <a:extLst>
+              <a:ext uri="{FF2B5EF4-FFF2-40B4-BE49-F238E27FC236}">
+                <a16:creationId xmlns:a16="http://schemas.microsoft.com/office/drawing/2014/main" id="{8DB21C58-4215-4707-868A-670FACAE25B3}"/>
+              </a:ext>
+            </a:extLst>
+          </p:cNvPr>
+          <p:cNvSpPr>
+            <a:spLocks noGrp="1"/>
+          </p:cNvSpPr>
+          <p:nvPr>
+            <p:ph type="title" idx="4294967295"/>
+          </p:nvPr>
+        </p:nvSpPr>
+        <p:spPr>
+          <a:xfrm>
+            <a:off x="395287" y="473075"/>
+            <a:ext cx="8748713" cy="698500"/>
+          </a:xfrm>
+        </p:spPr>
+        <p:txBody>
+          <a:bodyPr/>
+          <a:lstStyle/>
+          <a:p>
+            <a:r>
+              <a:rPr lang="en-US" dirty="0"/>
+              <a:t>WHOAMI</a:t>
+            </a:r>
+            <a:endParaRPr lang="nl-NL" dirty="0"/>
+          </a:p>
+        </p:txBody>
+      </p:sp>
+      <p:sp>
+        <p:nvSpPr>
+          <p:cNvPr id="11" name="TextBox 10">
+            <a:extLst>
+              <a:ext uri="{FF2B5EF4-FFF2-40B4-BE49-F238E27FC236}">
+                <a16:creationId xmlns:a16="http://schemas.microsoft.com/office/drawing/2014/main" id="{03A8E310-42C7-4BBA-A222-704DF697BBEE}"/>
+              </a:ext>
+            </a:extLst>
+          </p:cNvPr>
+          <p:cNvSpPr txBox="1"/>
+          <p:nvPr/>
+        </p:nvSpPr>
+        <p:spPr>
+          <a:xfrm>
+            <a:off x="497840" y="1249680"/>
+            <a:ext cx="3759200" cy="1477328"/>
           </a:xfrm>
           <a:prstGeom prst="rect">
             <a:avLst/>
           </a:prstGeom>
-        </p:spPr>
-      </p:pic>
+          <a:noFill/>
+        </p:spPr>
+        <p:txBody>
+          <a:bodyPr wrap="square" rtlCol="0">
+            <a:spAutoFit/>
+          </a:bodyPr>
+          <a:lstStyle/>
+          <a:p>
+            <a:pPr marL="285750" indent="-285750">
+              <a:buFont typeface="Arial" panose="020B0604020202020204" pitchFamily="34" charset="0"/>
+              <a:buChar char="•"/>
+            </a:pPr>
+            <a:r>
+              <a:rPr lang="en-US" dirty="0"/>
+              <a:t>Since 1995 in IT</a:t>
+            </a:r>
+          </a:p>
+          <a:p>
+            <a:pPr marL="285750" indent="-285750">
+              <a:buFont typeface="Arial" panose="020B0604020202020204" pitchFamily="34" charset="0"/>
+              <a:buChar char="•"/>
+            </a:pPr>
+            <a:r>
+              <a:rPr lang="en-US" dirty="0"/>
+              <a:t>5 years @ Centric (SP midden)</a:t>
+            </a:r>
+          </a:p>
+          <a:p>
+            <a:pPr marL="285750" indent="-285750">
+              <a:buFont typeface="Arial" panose="020B0604020202020204" pitchFamily="34" charset="0"/>
+              <a:buChar char="•"/>
+            </a:pPr>
+            <a:r>
+              <a:rPr lang="en-US" dirty="0"/>
+              <a:t>Software architect</a:t>
+            </a:r>
+          </a:p>
+          <a:p>
+            <a:pPr marL="285750" indent="-285750">
+              <a:buFont typeface="Arial" panose="020B0604020202020204" pitchFamily="34" charset="0"/>
+              <a:buChar char="•"/>
+            </a:pPr>
+            <a:r>
+              <a:rPr lang="en-US" dirty="0"/>
+              <a:t>Craft expert</a:t>
+            </a:r>
+          </a:p>
+          <a:p>
+            <a:pPr marL="285750" indent="-285750">
+              <a:buFont typeface="Arial" panose="020B0604020202020204" pitchFamily="34" charset="0"/>
+              <a:buChar char="•"/>
+            </a:pPr>
+            <a:r>
+              <a:rPr lang="en-US" dirty="0" err="1"/>
+              <a:t>.Net</a:t>
+            </a:r>
+            <a:r>
+              <a:rPr lang="en-US" dirty="0"/>
+              <a:t>, NG</a:t>
+            </a:r>
+          </a:p>
+        </p:txBody>
+      </p:sp>
     </p:spTree>
     <p:extLst>
       <p:ext uri="{BB962C8B-B14F-4D97-AF65-F5344CB8AC3E}">
-        <p14:creationId xmlns:p14="http://schemas.microsoft.com/office/powerpoint/2010/main" val="1615963405"/>
+        <p14:creationId xmlns:p14="http://schemas.microsoft.com/office/powerpoint/2010/main" val="3225869260"/>
       </p:ext>
     </p:extLst>
   </p:cSld>
@@ -5097,6 +5305,246 @@
       </p:grpSpPr>
       <p:sp>
         <p:nvSpPr>
+          <p:cNvPr id="2" name="Titel 1"/>
+          <p:cNvSpPr>
+            <a:spLocks noGrp="1"/>
+          </p:cNvSpPr>
+          <p:nvPr>
+            <p:ph type="title"/>
+          </p:nvPr>
+        </p:nvSpPr>
+        <p:spPr/>
+        <p:txBody>
+          <a:bodyPr/>
+          <a:lstStyle/>
+          <a:p>
+            <a:r>
+              <a:rPr lang="nl-NL" cap="all" dirty="0"/>
+              <a:t>onderwerpen</a:t>
+            </a:r>
+            <a:endParaRPr lang="nl-NL" dirty="0"/>
+          </a:p>
+        </p:txBody>
+      </p:sp>
+      <p:sp>
+        <p:nvSpPr>
+          <p:cNvPr id="3" name="Tijdelijke aanduiding voor inhoud 2"/>
+          <p:cNvSpPr>
+            <a:spLocks noGrp="1"/>
+          </p:cNvSpPr>
+          <p:nvPr>
+            <p:ph idx="1"/>
+          </p:nvPr>
+        </p:nvSpPr>
+        <p:spPr>
+          <a:xfrm>
+            <a:off x="617538" y="1295518"/>
+            <a:ext cx="8163164" cy="4579765"/>
+          </a:xfrm>
+        </p:spPr>
+        <p:txBody>
+          <a:bodyPr>
+            <a:normAutofit/>
+          </a:bodyPr>
+          <a:lstStyle/>
+          <a:p>
+            <a:pPr>
+              <a:spcAft>
+                <a:spcPts val="600"/>
+              </a:spcAft>
+            </a:pPr>
+            <a:r>
+              <a:rPr lang="nl-NL" dirty="0"/>
+              <a:t>Microservices-architectuur</a:t>
+            </a:r>
+          </a:p>
+          <a:p>
+            <a:pPr>
+              <a:spcAft>
+                <a:spcPts val="600"/>
+              </a:spcAft>
+            </a:pPr>
+            <a:r>
+              <a:rPr lang="nl-NL" dirty="0"/>
+              <a:t>(Nieuwe) Mogelijkheden</a:t>
+            </a:r>
+          </a:p>
+          <a:p>
+            <a:pPr>
+              <a:spcAft>
+                <a:spcPts val="600"/>
+              </a:spcAft>
+            </a:pPr>
+            <a:r>
+              <a:rPr lang="en-US" dirty="0"/>
+              <a:t>O</a:t>
+            </a:r>
+            <a:r>
+              <a:rPr lang="nl-NL" dirty="0" err="1"/>
+              <a:t>nderlinge</a:t>
+            </a:r>
+            <a:r>
+              <a:rPr lang="nl-NL" dirty="0"/>
+              <a:t> communicatie</a:t>
+            </a:r>
+          </a:p>
+          <a:p>
+            <a:pPr>
+              <a:spcAft>
+                <a:spcPts val="600"/>
+              </a:spcAft>
+            </a:pPr>
+            <a:r>
+              <a:rPr lang="en-US" dirty="0"/>
+              <a:t>Hosting (on premise, cloud)</a:t>
+            </a:r>
+          </a:p>
+          <a:p>
+            <a:pPr>
+              <a:spcAft>
+                <a:spcPts val="600"/>
+              </a:spcAft>
+            </a:pPr>
+            <a:r>
+              <a:rPr lang="en-US" dirty="0" err="1"/>
+              <a:t>Vragen</a:t>
+            </a:r>
+            <a:endParaRPr lang="nl-NL" dirty="0"/>
+          </a:p>
+        </p:txBody>
+      </p:sp>
+      <p:sp>
+        <p:nvSpPr>
+          <p:cNvPr id="4" name="Tijdelijke aanduiding voor voettekst 3"/>
+          <p:cNvSpPr>
+            <a:spLocks noGrp="1"/>
+          </p:cNvSpPr>
+          <p:nvPr>
+            <p:ph type="ftr" sz="quarter" idx="11"/>
+          </p:nvPr>
+        </p:nvSpPr>
+        <p:spPr/>
+        <p:txBody>
+          <a:bodyPr vert="horz" lIns="91440" tIns="45720" rIns="91440" bIns="45720" rtlCol="0" anchor="ctr"/>
+          <a:lstStyle/>
+          <a:p>
+            <a:r>
+              <a:rPr lang="nl-NL" dirty="0">
+                <a:solidFill>
+                  <a:srgbClr val="009036"/>
+                </a:solidFill>
+              </a:rPr>
+              <a:t>Johannes Sim &amp; Renzo </a:t>
+            </a:r>
+            <a:r>
+              <a:rPr lang="nl-NL" dirty="0" err="1">
+                <a:solidFill>
+                  <a:srgbClr val="009036"/>
+                </a:solidFill>
+              </a:rPr>
+              <a:t>veldkamp</a:t>
+            </a:r>
+            <a:endParaRPr lang="nl-NL" dirty="0">
+              <a:solidFill>
+                <a:srgbClr val="009036"/>
+              </a:solidFill>
+            </a:endParaRPr>
+          </a:p>
+        </p:txBody>
+      </p:sp>
+      <p:sp>
+        <p:nvSpPr>
+          <p:cNvPr id="6" name="Date Placeholder 5"/>
+          <p:cNvSpPr>
+            <a:spLocks noGrp="1"/>
+          </p:cNvSpPr>
+          <p:nvPr>
+            <p:ph type="dt" sz="half" idx="10"/>
+          </p:nvPr>
+        </p:nvSpPr>
+        <p:spPr/>
+        <p:txBody>
+          <a:bodyPr vert="horz" lIns="91440" tIns="45720" rIns="91440" bIns="45720" rtlCol="0" anchor="ctr"/>
+          <a:lstStyle/>
+          <a:p>
+            <a:fld id="{91A25AAE-37E5-4948-9A98-4D0CB3952B1C}" type="datetime4">
+              <a:rPr lang="nl-NL" sz="900" cap="all" smtClean="0">
+                <a:solidFill>
+                  <a:srgbClr val="009036"/>
+                </a:solidFill>
+              </a:rPr>
+              <a:t>2 november 2018</a:t>
+            </a:fld>
+            <a:endParaRPr lang="nl-NL" sz="900" cap="all" dirty="0">
+              <a:solidFill>
+                <a:srgbClr val="009036"/>
+              </a:solidFill>
+            </a:endParaRPr>
+          </a:p>
+        </p:txBody>
+      </p:sp>
+      <p:pic>
+        <p:nvPicPr>
+          <p:cNvPr id="9" name="Afbeelding 8"/>
+          <p:cNvPicPr>
+            <a:picLocks noChangeAspect="1"/>
+          </p:cNvPicPr>
+          <p:nvPr/>
+        </p:nvPicPr>
+        <p:blipFill>
+          <a:blip r:embed="rId3" cstate="print">
+            <a:extLst>
+              <a:ext uri="{28A0092B-C50C-407E-A947-70E740481C1C}">
+                <a14:useLocalDpi xmlns:a14="http://schemas.microsoft.com/office/drawing/2010/main" val="0"/>
+              </a:ext>
+            </a:extLst>
+          </a:blip>
+          <a:stretch>
+            <a:fillRect/>
+          </a:stretch>
+        </p:blipFill>
+        <p:spPr>
+          <a:xfrm>
+            <a:off x="6244731" y="1167324"/>
+            <a:ext cx="2684815" cy="2512659"/>
+          </a:xfrm>
+          <a:prstGeom prst="rect">
+            <a:avLst/>
+          </a:prstGeom>
+        </p:spPr>
+      </p:pic>
+    </p:spTree>
+    <p:extLst>
+      <p:ext uri="{BB962C8B-B14F-4D97-AF65-F5344CB8AC3E}">
+        <p14:creationId xmlns:p14="http://schemas.microsoft.com/office/powerpoint/2010/main" val="1615963405"/>
+      </p:ext>
+    </p:extLst>
+  </p:cSld>
+  <p:clrMapOvr>
+    <a:masterClrMapping/>
+  </p:clrMapOvr>
+</p:sld>
+</file>
+
+<file path=ppt/slides/slide4.xml><?xml version="1.0" encoding="utf-8"?>
+<p:sld xmlns:a="http://schemas.openxmlformats.org/drawingml/2006/main" xmlns:r="http://schemas.openxmlformats.org/officeDocument/2006/relationships" xmlns:p="http://schemas.openxmlformats.org/presentationml/2006/main">
+  <p:cSld>
+    <p:spTree>
+      <p:nvGrpSpPr>
+        <p:cNvPr id="1" name=""/>
+        <p:cNvGrpSpPr/>
+        <p:nvPr/>
+      </p:nvGrpSpPr>
+      <p:grpSpPr>
+        <a:xfrm>
+          <a:off x="0" y="0"/>
+          <a:ext cx="0" cy="0"/>
+          <a:chOff x="0" y="0"/>
+          <a:chExt cx="0" cy="0"/>
+        </a:xfrm>
+      </p:grpSpPr>
+      <p:sp>
+        <p:nvSpPr>
           <p:cNvPr id="34" name="Stroomdiagram: Proces 33"/>
           <p:cNvSpPr/>
           <p:nvPr/>
@@ -5508,7 +5956,7 @@
                   <a:srgbClr val="009036"/>
                 </a:solidFill>
               </a:rPr>
-              <a:t>17 oktober 2018</a:t>
+              <a:t>2 november 2018</a:t>
             </a:fld>
             <a:endParaRPr lang="nl-NL" sz="900" cap="all" dirty="0">
               <a:solidFill>
@@ -8330,7 +8778,7 @@
 </p:sld>
 </file>
 
-<file path=ppt/slides/slide4.xml><?xml version="1.0" encoding="utf-8"?>
+<file path=ppt/slides/slide5.xml><?xml version="1.0" encoding="utf-8"?>
 <p:sld xmlns:a="http://schemas.openxmlformats.org/drawingml/2006/main" xmlns:r="http://schemas.openxmlformats.org/officeDocument/2006/relationships" xmlns:p="http://schemas.openxmlformats.org/presentationml/2006/main">
   <p:cSld>
     <p:spTree>
@@ -8439,7 +8887,7 @@
                   <a:srgbClr val="009036"/>
                 </a:solidFill>
               </a:rPr>
-              <a:t>17 oktober 2018</a:t>
+              <a:t>2 november 2018</a:t>
             </a:fld>
             <a:endParaRPr lang="nl-NL" sz="900" cap="all" dirty="0">
               <a:solidFill>
@@ -8631,348 +9079,6 @@
     <p:extLst>
       <p:ext uri="{BB962C8B-B14F-4D97-AF65-F5344CB8AC3E}">
         <p14:creationId xmlns:p14="http://schemas.microsoft.com/office/powerpoint/2010/main" val="1355181863"/>
-      </p:ext>
-    </p:extLst>
-  </p:cSld>
-  <p:clrMapOvr>
-    <a:masterClrMapping/>
-  </p:clrMapOvr>
-</p:sld>
-</file>
-
-<file path=ppt/slides/slide5.xml><?xml version="1.0" encoding="utf-8"?>
-<p:sld xmlns:a="http://schemas.openxmlformats.org/drawingml/2006/main" xmlns:r="http://schemas.openxmlformats.org/officeDocument/2006/relationships" xmlns:p="http://schemas.openxmlformats.org/presentationml/2006/main">
-  <p:cSld>
-    <p:spTree>
-      <p:nvGrpSpPr>
-        <p:cNvPr id="1" name=""/>
-        <p:cNvGrpSpPr/>
-        <p:nvPr/>
-      </p:nvGrpSpPr>
-      <p:grpSpPr>
-        <a:xfrm>
-          <a:off x="0" y="0"/>
-          <a:ext cx="0" cy="0"/>
-          <a:chOff x="0" y="0"/>
-          <a:chExt cx="0" cy="0"/>
-        </a:xfrm>
-      </p:grpSpPr>
-      <p:sp>
-        <p:nvSpPr>
-          <p:cNvPr id="2" name="Title 1"/>
-          <p:cNvSpPr>
-            <a:spLocks noGrp="1"/>
-          </p:cNvSpPr>
-          <p:nvPr>
-            <p:ph type="title"/>
-          </p:nvPr>
-        </p:nvSpPr>
-        <p:spPr/>
-        <p:txBody>
-          <a:bodyPr/>
-          <a:lstStyle/>
-          <a:p>
-            <a:r>
-              <a:rPr lang="nl-NL" dirty="0"/>
-              <a:t>onderlinge communicatie</a:t>
-            </a:r>
-          </a:p>
-        </p:txBody>
-      </p:sp>
-      <p:sp>
-        <p:nvSpPr>
-          <p:cNvPr id="3" name="Content Placeholder 2"/>
-          <p:cNvSpPr>
-            <a:spLocks noGrp="1"/>
-          </p:cNvSpPr>
-          <p:nvPr>
-            <p:ph idx="1"/>
-          </p:nvPr>
-        </p:nvSpPr>
-        <p:spPr/>
-        <p:txBody>
-          <a:bodyPr>
-            <a:normAutofit/>
-          </a:bodyPr>
-          <a:lstStyle/>
-          <a:p>
-            <a:pPr>
-              <a:spcAft>
-                <a:spcPts val="600"/>
-              </a:spcAft>
-            </a:pPr>
-            <a:r>
-              <a:rPr lang="nl-NL" dirty="0"/>
-              <a:t>Communicatie via REST</a:t>
-            </a:r>
-          </a:p>
-          <a:p>
-            <a:pPr>
-              <a:spcAft>
-                <a:spcPts val="600"/>
-              </a:spcAft>
-            </a:pPr>
-            <a:r>
-              <a:rPr lang="nl-NL" dirty="0"/>
-              <a:t>Communicatie via een bus</a:t>
-            </a:r>
-          </a:p>
-          <a:p>
-            <a:pPr>
-              <a:spcAft>
-                <a:spcPts val="600"/>
-              </a:spcAft>
-            </a:pPr>
-            <a:endParaRPr lang="nl-NL" dirty="0"/>
-          </a:p>
-        </p:txBody>
-      </p:sp>
-      <p:sp>
-        <p:nvSpPr>
-          <p:cNvPr id="4" name="Date Placeholder 3"/>
-          <p:cNvSpPr>
-            <a:spLocks noGrp="1"/>
-          </p:cNvSpPr>
-          <p:nvPr>
-            <p:ph type="dt" sz="half" idx="10"/>
-          </p:nvPr>
-        </p:nvSpPr>
-        <p:spPr/>
-        <p:txBody>
-          <a:bodyPr vert="horz" lIns="91440" tIns="45720" rIns="91440" bIns="45720" rtlCol="0" anchor="ctr"/>
-          <a:lstStyle/>
-          <a:p>
-            <a:fld id="{61ED3ADE-4C26-4B65-A1D2-9CF6E82EBBE4}" type="datetime4">
-              <a:rPr lang="nl-NL" sz="900" cap="all" smtClean="0">
-                <a:solidFill>
-                  <a:srgbClr val="009036"/>
-                </a:solidFill>
-              </a:rPr>
-              <a:t>17 oktober 2018</a:t>
-            </a:fld>
-            <a:endParaRPr lang="nl-NL" sz="900" cap="all" dirty="0">
-              <a:solidFill>
-                <a:srgbClr val="009036"/>
-              </a:solidFill>
-            </a:endParaRPr>
-          </a:p>
-        </p:txBody>
-      </p:sp>
-      <p:sp>
-        <p:nvSpPr>
-          <p:cNvPr id="5" name="Footer Placeholder 4"/>
-          <p:cNvSpPr>
-            <a:spLocks noGrp="1"/>
-          </p:cNvSpPr>
-          <p:nvPr>
-            <p:ph type="ftr" sz="quarter" idx="11"/>
-          </p:nvPr>
-        </p:nvSpPr>
-        <p:spPr/>
-        <p:txBody>
-          <a:bodyPr vert="horz" lIns="91440" tIns="45720" rIns="91440" bIns="45720" rtlCol="0" anchor="ctr"/>
-          <a:lstStyle/>
-          <a:p>
-            <a:r>
-              <a:rPr lang="nl-NL">
-                <a:solidFill>
-                  <a:srgbClr val="009036"/>
-                </a:solidFill>
-              </a:rPr>
-              <a:t>Johannes Sim &amp; Renzo veldkamp</a:t>
-            </a:r>
-            <a:endParaRPr lang="nl-NL" dirty="0">
-              <a:solidFill>
-                <a:srgbClr val="009036"/>
-              </a:solidFill>
-            </a:endParaRPr>
-          </a:p>
-        </p:txBody>
-      </p:sp>
-      <p:pic>
-        <p:nvPicPr>
-          <p:cNvPr id="10" name="Afbeelding 9"/>
-          <p:cNvPicPr>
-            <a:picLocks noChangeAspect="1"/>
-          </p:cNvPicPr>
-          <p:nvPr/>
-        </p:nvPicPr>
-        <p:blipFill>
-          <a:blip r:embed="rId3">
-            <a:extLst>
-              <a:ext uri="{28A0092B-C50C-407E-A947-70E740481C1C}">
-                <a14:useLocalDpi xmlns:a14="http://schemas.microsoft.com/office/drawing/2010/main" val="0"/>
-              </a:ext>
-            </a:extLst>
-          </a:blip>
-          <a:stretch>
-            <a:fillRect/>
-          </a:stretch>
-        </p:blipFill>
-        <p:spPr>
-          <a:xfrm>
-            <a:off x="856395" y="3074426"/>
-            <a:ext cx="1589356" cy="1589356"/>
-          </a:xfrm>
-          <a:prstGeom prst="rect">
-            <a:avLst/>
-          </a:prstGeom>
-        </p:spPr>
-      </p:pic>
-      <p:pic>
-        <p:nvPicPr>
-          <p:cNvPr id="11" name="Afbeelding 10"/>
-          <p:cNvPicPr>
-            <a:picLocks noChangeAspect="1"/>
-          </p:cNvPicPr>
-          <p:nvPr/>
-        </p:nvPicPr>
-        <p:blipFill>
-          <a:blip r:embed="rId4">
-            <a:extLst>
-              <a:ext uri="{28A0092B-C50C-407E-A947-70E740481C1C}">
-                <a14:useLocalDpi xmlns:a14="http://schemas.microsoft.com/office/drawing/2010/main" val="0"/>
-              </a:ext>
-            </a:extLst>
-          </a:blip>
-          <a:stretch>
-            <a:fillRect/>
-          </a:stretch>
-        </p:blipFill>
-        <p:spPr>
-          <a:xfrm>
-            <a:off x="2577423" y="3062687"/>
-            <a:ext cx="1495895" cy="1625972"/>
-          </a:xfrm>
-          <a:prstGeom prst="rect">
-            <a:avLst/>
-          </a:prstGeom>
-        </p:spPr>
-      </p:pic>
-      <p:pic>
-        <p:nvPicPr>
-          <p:cNvPr id="12" name="Afbeelding 11"/>
-          <p:cNvPicPr>
-            <a:picLocks noChangeAspect="1"/>
-          </p:cNvPicPr>
-          <p:nvPr/>
-        </p:nvPicPr>
-        <p:blipFill>
-          <a:blip r:embed="rId5">
-            <a:extLst>
-              <a:ext uri="{28A0092B-C50C-407E-A947-70E740481C1C}">
-                <a14:useLocalDpi xmlns:a14="http://schemas.microsoft.com/office/drawing/2010/main" val="0"/>
-              </a:ext>
-            </a:extLst>
-          </a:blip>
-          <a:stretch>
-            <a:fillRect/>
-          </a:stretch>
-        </p:blipFill>
-        <p:spPr>
-          <a:xfrm>
-            <a:off x="5054718" y="4227713"/>
-            <a:ext cx="1640363" cy="1640363"/>
-          </a:xfrm>
-          <a:prstGeom prst="rect">
-            <a:avLst/>
-          </a:prstGeom>
-        </p:spPr>
-      </p:pic>
-      <p:pic>
-        <p:nvPicPr>
-          <p:cNvPr id="13" name="Afbeelding 12"/>
-          <p:cNvPicPr>
-            <a:picLocks noChangeAspect="1"/>
-          </p:cNvPicPr>
-          <p:nvPr/>
-        </p:nvPicPr>
-        <p:blipFill>
-          <a:blip r:embed="rId6">
-            <a:extLst>
-              <a:ext uri="{28A0092B-C50C-407E-A947-70E740481C1C}">
-                <a14:useLocalDpi xmlns:a14="http://schemas.microsoft.com/office/drawing/2010/main" val="0"/>
-              </a:ext>
-            </a:extLst>
-          </a:blip>
-          <a:stretch>
-            <a:fillRect/>
-          </a:stretch>
-        </p:blipFill>
-        <p:spPr>
-          <a:xfrm>
-            <a:off x="5054718" y="3114545"/>
-            <a:ext cx="3465473" cy="790371"/>
-          </a:xfrm>
-          <a:prstGeom prst="rect">
-            <a:avLst/>
-          </a:prstGeom>
-        </p:spPr>
-      </p:pic>
-      <p:pic>
-        <p:nvPicPr>
-          <p:cNvPr id="14" name="Afbeelding 13"/>
-          <p:cNvPicPr>
-            <a:picLocks noChangeAspect="1"/>
-          </p:cNvPicPr>
-          <p:nvPr/>
-        </p:nvPicPr>
-        <p:blipFill>
-          <a:blip r:embed="rId7">
-            <a:extLst>
-              <a:ext uri="{28A0092B-C50C-407E-A947-70E740481C1C}">
-                <a14:useLocalDpi xmlns:a14="http://schemas.microsoft.com/office/drawing/2010/main" val="0"/>
-              </a:ext>
-            </a:extLst>
-          </a:blip>
-          <a:stretch>
-            <a:fillRect/>
-          </a:stretch>
-        </p:blipFill>
-        <p:spPr>
-          <a:xfrm>
-            <a:off x="833437" y="5129800"/>
-            <a:ext cx="2667000" cy="504825"/>
-          </a:xfrm>
-          <a:prstGeom prst="rect">
-            <a:avLst/>
-          </a:prstGeom>
-        </p:spPr>
-      </p:pic>
-      <p:pic>
-        <p:nvPicPr>
-          <p:cNvPr id="15" name="Afbeelding 14"/>
-          <p:cNvPicPr>
-            <a:picLocks noChangeAspect="1"/>
-          </p:cNvPicPr>
-          <p:nvPr/>
-        </p:nvPicPr>
-        <p:blipFill>
-          <a:blip r:embed="rId8">
-            <a:extLst>
-              <a:ext uri="{28A0092B-C50C-407E-A947-70E740481C1C}">
-                <a14:useLocalDpi xmlns:a14="http://schemas.microsoft.com/office/drawing/2010/main" val="0"/>
-              </a:ext>
-            </a:extLst>
-          </a:blip>
-          <a:stretch>
-            <a:fillRect/>
-          </a:stretch>
-        </p:blipFill>
-        <p:spPr>
-          <a:xfrm>
-            <a:off x="7183097" y="4227713"/>
-            <a:ext cx="1597605" cy="1597605"/>
-          </a:xfrm>
-          <a:prstGeom prst="rect">
-            <a:avLst/>
-          </a:prstGeom>
-        </p:spPr>
-      </p:pic>
-    </p:spTree>
-    <p:extLst>
-      <p:ext uri="{BB962C8B-B14F-4D97-AF65-F5344CB8AC3E}">
-        <p14:creationId xmlns:p14="http://schemas.microsoft.com/office/powerpoint/2010/main" val="3633287920"/>
       </p:ext>
     </p:extLst>
   </p:cSld>
@@ -9001,6 +9107,348 @@
       </p:grpSpPr>
       <p:sp>
         <p:nvSpPr>
+          <p:cNvPr id="2" name="Title 1"/>
+          <p:cNvSpPr>
+            <a:spLocks noGrp="1"/>
+          </p:cNvSpPr>
+          <p:nvPr>
+            <p:ph type="title"/>
+          </p:nvPr>
+        </p:nvSpPr>
+        <p:spPr/>
+        <p:txBody>
+          <a:bodyPr/>
+          <a:lstStyle/>
+          <a:p>
+            <a:r>
+              <a:rPr lang="nl-NL" dirty="0"/>
+              <a:t>onderlinge communicatie</a:t>
+            </a:r>
+          </a:p>
+        </p:txBody>
+      </p:sp>
+      <p:sp>
+        <p:nvSpPr>
+          <p:cNvPr id="3" name="Content Placeholder 2"/>
+          <p:cNvSpPr>
+            <a:spLocks noGrp="1"/>
+          </p:cNvSpPr>
+          <p:nvPr>
+            <p:ph idx="1"/>
+          </p:nvPr>
+        </p:nvSpPr>
+        <p:spPr/>
+        <p:txBody>
+          <a:bodyPr>
+            <a:normAutofit/>
+          </a:bodyPr>
+          <a:lstStyle/>
+          <a:p>
+            <a:pPr>
+              <a:spcAft>
+                <a:spcPts val="600"/>
+              </a:spcAft>
+            </a:pPr>
+            <a:r>
+              <a:rPr lang="nl-NL" dirty="0"/>
+              <a:t>Communicatie via REST</a:t>
+            </a:r>
+          </a:p>
+          <a:p>
+            <a:pPr>
+              <a:spcAft>
+                <a:spcPts val="600"/>
+              </a:spcAft>
+            </a:pPr>
+            <a:r>
+              <a:rPr lang="nl-NL" dirty="0"/>
+              <a:t>Communicatie via een bus</a:t>
+            </a:r>
+          </a:p>
+          <a:p>
+            <a:pPr>
+              <a:spcAft>
+                <a:spcPts val="600"/>
+              </a:spcAft>
+            </a:pPr>
+            <a:endParaRPr lang="nl-NL" dirty="0"/>
+          </a:p>
+        </p:txBody>
+      </p:sp>
+      <p:sp>
+        <p:nvSpPr>
+          <p:cNvPr id="4" name="Date Placeholder 3"/>
+          <p:cNvSpPr>
+            <a:spLocks noGrp="1"/>
+          </p:cNvSpPr>
+          <p:nvPr>
+            <p:ph type="dt" sz="half" idx="10"/>
+          </p:nvPr>
+        </p:nvSpPr>
+        <p:spPr/>
+        <p:txBody>
+          <a:bodyPr vert="horz" lIns="91440" tIns="45720" rIns="91440" bIns="45720" rtlCol="0" anchor="ctr"/>
+          <a:lstStyle/>
+          <a:p>
+            <a:fld id="{61ED3ADE-4C26-4B65-A1D2-9CF6E82EBBE4}" type="datetime4">
+              <a:rPr lang="nl-NL" sz="900" cap="all" smtClean="0">
+                <a:solidFill>
+                  <a:srgbClr val="009036"/>
+                </a:solidFill>
+              </a:rPr>
+              <a:t>2 november 2018</a:t>
+            </a:fld>
+            <a:endParaRPr lang="nl-NL" sz="900" cap="all" dirty="0">
+              <a:solidFill>
+                <a:srgbClr val="009036"/>
+              </a:solidFill>
+            </a:endParaRPr>
+          </a:p>
+        </p:txBody>
+      </p:sp>
+      <p:sp>
+        <p:nvSpPr>
+          <p:cNvPr id="5" name="Footer Placeholder 4"/>
+          <p:cNvSpPr>
+            <a:spLocks noGrp="1"/>
+          </p:cNvSpPr>
+          <p:nvPr>
+            <p:ph type="ftr" sz="quarter" idx="11"/>
+          </p:nvPr>
+        </p:nvSpPr>
+        <p:spPr/>
+        <p:txBody>
+          <a:bodyPr vert="horz" lIns="91440" tIns="45720" rIns="91440" bIns="45720" rtlCol="0" anchor="ctr"/>
+          <a:lstStyle/>
+          <a:p>
+            <a:r>
+              <a:rPr lang="nl-NL">
+                <a:solidFill>
+                  <a:srgbClr val="009036"/>
+                </a:solidFill>
+              </a:rPr>
+              <a:t>Johannes Sim &amp; Renzo veldkamp</a:t>
+            </a:r>
+            <a:endParaRPr lang="nl-NL" dirty="0">
+              <a:solidFill>
+                <a:srgbClr val="009036"/>
+              </a:solidFill>
+            </a:endParaRPr>
+          </a:p>
+        </p:txBody>
+      </p:sp>
+      <p:pic>
+        <p:nvPicPr>
+          <p:cNvPr id="10" name="Afbeelding 9"/>
+          <p:cNvPicPr>
+            <a:picLocks noChangeAspect="1"/>
+          </p:cNvPicPr>
+          <p:nvPr/>
+        </p:nvPicPr>
+        <p:blipFill>
+          <a:blip r:embed="rId3">
+            <a:extLst>
+              <a:ext uri="{28A0092B-C50C-407E-A947-70E740481C1C}">
+                <a14:useLocalDpi xmlns:a14="http://schemas.microsoft.com/office/drawing/2010/main" val="0"/>
+              </a:ext>
+            </a:extLst>
+          </a:blip>
+          <a:stretch>
+            <a:fillRect/>
+          </a:stretch>
+        </p:blipFill>
+        <p:spPr>
+          <a:xfrm>
+            <a:off x="856395" y="3074426"/>
+            <a:ext cx="1589356" cy="1589356"/>
+          </a:xfrm>
+          <a:prstGeom prst="rect">
+            <a:avLst/>
+          </a:prstGeom>
+        </p:spPr>
+      </p:pic>
+      <p:pic>
+        <p:nvPicPr>
+          <p:cNvPr id="11" name="Afbeelding 10"/>
+          <p:cNvPicPr>
+            <a:picLocks noChangeAspect="1"/>
+          </p:cNvPicPr>
+          <p:nvPr/>
+        </p:nvPicPr>
+        <p:blipFill>
+          <a:blip r:embed="rId4">
+            <a:extLst>
+              <a:ext uri="{28A0092B-C50C-407E-A947-70E740481C1C}">
+                <a14:useLocalDpi xmlns:a14="http://schemas.microsoft.com/office/drawing/2010/main" val="0"/>
+              </a:ext>
+            </a:extLst>
+          </a:blip>
+          <a:stretch>
+            <a:fillRect/>
+          </a:stretch>
+        </p:blipFill>
+        <p:spPr>
+          <a:xfrm>
+            <a:off x="2577423" y="3062687"/>
+            <a:ext cx="1495895" cy="1625972"/>
+          </a:xfrm>
+          <a:prstGeom prst="rect">
+            <a:avLst/>
+          </a:prstGeom>
+        </p:spPr>
+      </p:pic>
+      <p:pic>
+        <p:nvPicPr>
+          <p:cNvPr id="12" name="Afbeelding 11"/>
+          <p:cNvPicPr>
+            <a:picLocks noChangeAspect="1"/>
+          </p:cNvPicPr>
+          <p:nvPr/>
+        </p:nvPicPr>
+        <p:blipFill>
+          <a:blip r:embed="rId5">
+            <a:extLst>
+              <a:ext uri="{28A0092B-C50C-407E-A947-70E740481C1C}">
+                <a14:useLocalDpi xmlns:a14="http://schemas.microsoft.com/office/drawing/2010/main" val="0"/>
+              </a:ext>
+            </a:extLst>
+          </a:blip>
+          <a:stretch>
+            <a:fillRect/>
+          </a:stretch>
+        </p:blipFill>
+        <p:spPr>
+          <a:xfrm>
+            <a:off x="5054718" y="4227713"/>
+            <a:ext cx="1640363" cy="1640363"/>
+          </a:xfrm>
+          <a:prstGeom prst="rect">
+            <a:avLst/>
+          </a:prstGeom>
+        </p:spPr>
+      </p:pic>
+      <p:pic>
+        <p:nvPicPr>
+          <p:cNvPr id="13" name="Afbeelding 12"/>
+          <p:cNvPicPr>
+            <a:picLocks noChangeAspect="1"/>
+          </p:cNvPicPr>
+          <p:nvPr/>
+        </p:nvPicPr>
+        <p:blipFill>
+          <a:blip r:embed="rId6">
+            <a:extLst>
+              <a:ext uri="{28A0092B-C50C-407E-A947-70E740481C1C}">
+                <a14:useLocalDpi xmlns:a14="http://schemas.microsoft.com/office/drawing/2010/main" val="0"/>
+              </a:ext>
+            </a:extLst>
+          </a:blip>
+          <a:stretch>
+            <a:fillRect/>
+          </a:stretch>
+        </p:blipFill>
+        <p:spPr>
+          <a:xfrm>
+            <a:off x="5054718" y="3114545"/>
+            <a:ext cx="3465473" cy="790371"/>
+          </a:xfrm>
+          <a:prstGeom prst="rect">
+            <a:avLst/>
+          </a:prstGeom>
+        </p:spPr>
+      </p:pic>
+      <p:pic>
+        <p:nvPicPr>
+          <p:cNvPr id="14" name="Afbeelding 13"/>
+          <p:cNvPicPr>
+            <a:picLocks noChangeAspect="1"/>
+          </p:cNvPicPr>
+          <p:nvPr/>
+        </p:nvPicPr>
+        <p:blipFill>
+          <a:blip r:embed="rId7">
+            <a:extLst>
+              <a:ext uri="{28A0092B-C50C-407E-A947-70E740481C1C}">
+                <a14:useLocalDpi xmlns:a14="http://schemas.microsoft.com/office/drawing/2010/main" val="0"/>
+              </a:ext>
+            </a:extLst>
+          </a:blip>
+          <a:stretch>
+            <a:fillRect/>
+          </a:stretch>
+        </p:blipFill>
+        <p:spPr>
+          <a:xfrm>
+            <a:off x="833437" y="5129800"/>
+            <a:ext cx="2667000" cy="504825"/>
+          </a:xfrm>
+          <a:prstGeom prst="rect">
+            <a:avLst/>
+          </a:prstGeom>
+        </p:spPr>
+      </p:pic>
+      <p:pic>
+        <p:nvPicPr>
+          <p:cNvPr id="15" name="Afbeelding 14"/>
+          <p:cNvPicPr>
+            <a:picLocks noChangeAspect="1"/>
+          </p:cNvPicPr>
+          <p:nvPr/>
+        </p:nvPicPr>
+        <p:blipFill>
+          <a:blip r:embed="rId8">
+            <a:extLst>
+              <a:ext uri="{28A0092B-C50C-407E-A947-70E740481C1C}">
+                <a14:useLocalDpi xmlns:a14="http://schemas.microsoft.com/office/drawing/2010/main" val="0"/>
+              </a:ext>
+            </a:extLst>
+          </a:blip>
+          <a:stretch>
+            <a:fillRect/>
+          </a:stretch>
+        </p:blipFill>
+        <p:spPr>
+          <a:xfrm>
+            <a:off x="7183097" y="4227713"/>
+            <a:ext cx="1597605" cy="1597605"/>
+          </a:xfrm>
+          <a:prstGeom prst="rect">
+            <a:avLst/>
+          </a:prstGeom>
+        </p:spPr>
+      </p:pic>
+    </p:spTree>
+    <p:extLst>
+      <p:ext uri="{BB962C8B-B14F-4D97-AF65-F5344CB8AC3E}">
+        <p14:creationId xmlns:p14="http://schemas.microsoft.com/office/powerpoint/2010/main" val="3633287920"/>
+      </p:ext>
+    </p:extLst>
+  </p:cSld>
+  <p:clrMapOvr>
+    <a:masterClrMapping/>
+  </p:clrMapOvr>
+</p:sld>
+</file>
+
+<file path=ppt/slides/slide7.xml><?xml version="1.0" encoding="utf-8"?>
+<p:sld xmlns:a="http://schemas.openxmlformats.org/drawingml/2006/main" xmlns:r="http://schemas.openxmlformats.org/officeDocument/2006/relationships" xmlns:p="http://schemas.openxmlformats.org/presentationml/2006/main">
+  <p:cSld>
+    <p:spTree>
+      <p:nvGrpSpPr>
+        <p:cNvPr id="1" name=""/>
+        <p:cNvGrpSpPr/>
+        <p:nvPr/>
+      </p:nvGrpSpPr>
+      <p:grpSpPr>
+        <a:xfrm>
+          <a:off x="0" y="0"/>
+          <a:ext cx="0" cy="0"/>
+          <a:chOff x="0" y="0"/>
+          <a:chExt cx="0" cy="0"/>
+        </a:xfrm>
+      </p:grpSpPr>
+      <p:sp>
+        <p:nvSpPr>
           <p:cNvPr id="2" name="Title 1">
             <a:extLst>
               <a:ext uri="{FF2B5EF4-FFF2-40B4-BE49-F238E27FC236}">
@@ -9056,7 +9504,7 @@
             <a:fld id="{249B52C1-75DC-496B-AF3F-4978B95BB865}" type="datetime4">
               <a:rPr lang="nl-NL" smtClean="0"/>
               <a:pPr/>
-              <a:t>17 oktober 2018</a:t>
+              <a:t>2 november 2018</a:t>
             </a:fld>
             <a:endParaRPr lang="nl-NL" dirty="0"/>
           </a:p>
@@ -9721,7 +10169,7 @@
 </p:sld>
 </file>
 
-<file path=ppt/slides/slide7.xml><?xml version="1.0" encoding="utf-8"?>
+<file path=ppt/slides/slide8.xml><?xml version="1.0" encoding="utf-8"?>
 <p:sld xmlns:a="http://schemas.openxmlformats.org/drawingml/2006/main" xmlns:r="http://schemas.openxmlformats.org/officeDocument/2006/relationships" xmlns:p="http://schemas.openxmlformats.org/presentationml/2006/main">
   <p:cSld>
     <p:bg>
@@ -9808,7 +10256,7 @@
             <a:fld id="{249B52C1-75DC-496B-AF3F-4978B95BB865}" type="datetime4">
               <a:rPr lang="nl-NL" smtClean="0"/>
               <a:pPr/>
-              <a:t>17 oktober 2018</a:t>
+              <a:t>2 november 2018</a:t>
             </a:fld>
             <a:endParaRPr lang="nl-NL" dirty="0"/>
           </a:p>
@@ -10631,7 +11079,7 @@
 </p:sld>
 </file>
 
-<file path=ppt/slides/slide8.xml><?xml version="1.0" encoding="utf-8"?>
+<file path=ppt/slides/slide9.xml><?xml version="1.0" encoding="utf-8"?>
 <p:sld xmlns:a="http://schemas.openxmlformats.org/drawingml/2006/main" xmlns:r="http://schemas.openxmlformats.org/officeDocument/2006/relationships" xmlns:p="http://schemas.openxmlformats.org/presentationml/2006/main">
   <p:cSld>
     <p:spTree>
@@ -10798,7 +11246,7 @@
                   <a:srgbClr val="009036"/>
                 </a:solidFill>
               </a:rPr>
-              <a:t>17 oktober 2018</a:t>
+              <a:t>2 november 2018</a:t>
             </a:fld>
             <a:endParaRPr lang="nl-NL" sz="900" cap="all" dirty="0">
               <a:solidFill>
@@ -10933,194 +11381,6 @@
     <p:extLst>
       <p:ext uri="{BB962C8B-B14F-4D97-AF65-F5344CB8AC3E}">
         <p14:creationId xmlns:p14="http://schemas.microsoft.com/office/powerpoint/2010/main" val="1086943586"/>
-      </p:ext>
-    </p:extLst>
-  </p:cSld>
-  <p:clrMapOvr>
-    <a:masterClrMapping/>
-  </p:clrMapOvr>
-</p:sld>
-</file>
-
-<file path=ppt/slides/slide9.xml><?xml version="1.0" encoding="utf-8"?>
-<p:sld xmlns:a="http://schemas.openxmlformats.org/drawingml/2006/main" xmlns:r="http://schemas.openxmlformats.org/officeDocument/2006/relationships" xmlns:p="http://schemas.openxmlformats.org/presentationml/2006/main">
-  <p:cSld>
-    <p:spTree>
-      <p:nvGrpSpPr>
-        <p:cNvPr id="1" name=""/>
-        <p:cNvGrpSpPr/>
-        <p:nvPr/>
-      </p:nvGrpSpPr>
-      <p:grpSpPr>
-        <a:xfrm>
-          <a:off x="0" y="0"/>
-          <a:ext cx="0" cy="0"/>
-          <a:chOff x="0" y="0"/>
-          <a:chExt cx="0" cy="0"/>
-        </a:xfrm>
-      </p:grpSpPr>
-      <p:sp>
-        <p:nvSpPr>
-          <p:cNvPr id="11" name="Titel 10"/>
-          <p:cNvSpPr>
-            <a:spLocks noGrp="1"/>
-          </p:cNvSpPr>
-          <p:nvPr>
-            <p:ph type="ctrTitle"/>
-          </p:nvPr>
-        </p:nvSpPr>
-        <p:spPr/>
-        <p:txBody>
-          <a:bodyPr/>
-          <a:lstStyle/>
-          <a:p>
-            <a:r>
-              <a:rPr lang="nl-NL" dirty="0"/>
-              <a:t>Vragen?</a:t>
-            </a:r>
-          </a:p>
-        </p:txBody>
-      </p:sp>
-      <p:sp>
-        <p:nvSpPr>
-          <p:cNvPr id="2" name="Tekstvak 1"/>
-          <p:cNvSpPr txBox="1"/>
-          <p:nvPr/>
-        </p:nvSpPr>
-        <p:spPr>
-          <a:xfrm>
-            <a:off x="634402" y="3851374"/>
-            <a:ext cx="2730235" cy="1323439"/>
-          </a:xfrm>
-          <a:prstGeom prst="rect">
-            <a:avLst/>
-          </a:prstGeom>
-          <a:noFill/>
-        </p:spPr>
-        <p:txBody>
-          <a:bodyPr wrap="none" rtlCol="0">
-            <a:spAutoFit/>
-          </a:bodyPr>
-          <a:lstStyle/>
-          <a:p>
-            <a:r>
-              <a:rPr lang="en-US" sz="1600" dirty="0">
-                <a:solidFill>
-                  <a:schemeClr val="bg1"/>
-                </a:solidFill>
-                <a:latin typeface="Arial"/>
-                <a:cs typeface="Arial"/>
-              </a:rPr>
-              <a:t>Johannes Sim</a:t>
-            </a:r>
-          </a:p>
-          <a:p>
-            <a:r>
-              <a:rPr lang="en-US" sz="1600" dirty="0">
-                <a:solidFill>
-                  <a:schemeClr val="bg1"/>
-                </a:solidFill>
-                <a:latin typeface="Arial"/>
-                <a:cs typeface="Arial"/>
-              </a:rPr>
-              <a:t>johannes.sim@centric.eu</a:t>
-            </a:r>
-          </a:p>
-          <a:p>
-            <a:endParaRPr lang="nl-NL" sz="1600" dirty="0">
-              <a:solidFill>
-                <a:schemeClr val="bg1"/>
-              </a:solidFill>
-              <a:latin typeface="Arial"/>
-              <a:cs typeface="Arial"/>
-            </a:endParaRPr>
-          </a:p>
-          <a:p>
-            <a:r>
-              <a:rPr lang="nl-NL" sz="1600" dirty="0">
-                <a:solidFill>
-                  <a:schemeClr val="bg1"/>
-                </a:solidFill>
-                <a:latin typeface="Arial"/>
-                <a:cs typeface="Arial"/>
-              </a:rPr>
-              <a:t>Renzo Veldkamp</a:t>
-            </a:r>
-          </a:p>
-          <a:p>
-            <a:r>
-              <a:rPr lang="nl-NL" sz="1600" dirty="0">
-                <a:solidFill>
-                  <a:schemeClr val="bg1"/>
-                </a:solidFill>
-                <a:latin typeface="Arial"/>
-                <a:cs typeface="Arial"/>
-              </a:rPr>
-              <a:t>renzo.veldkamp@centric.eu</a:t>
-            </a:r>
-          </a:p>
-        </p:txBody>
-      </p:sp>
-      <p:sp>
-        <p:nvSpPr>
-          <p:cNvPr id="5" name="Date Placeholder 4"/>
-          <p:cNvSpPr>
-            <a:spLocks noGrp="1"/>
-          </p:cNvSpPr>
-          <p:nvPr>
-            <p:ph type="dt" sz="half" idx="10"/>
-          </p:nvPr>
-        </p:nvSpPr>
-        <p:spPr/>
-        <p:txBody>
-          <a:bodyPr/>
-          <a:lstStyle/>
-          <a:p>
-            <a:fld id="{6C8F2B54-89D2-4D0B-81B9-EBE704C6250E}" type="datetime4">
-              <a:rPr lang="nl-NL" smtClean="0"/>
-              <a:t>17 oktober 2018</a:t>
-            </a:fld>
-            <a:endParaRPr lang="nl-NL" dirty="0"/>
-          </a:p>
-        </p:txBody>
-      </p:sp>
-      <p:sp>
-        <p:nvSpPr>
-          <p:cNvPr id="6" name="Footer Placeholder 5"/>
-          <p:cNvSpPr>
-            <a:spLocks noGrp="1"/>
-          </p:cNvSpPr>
-          <p:nvPr>
-            <p:ph type="ftr" sz="quarter" idx="11"/>
-          </p:nvPr>
-        </p:nvSpPr>
-        <p:spPr/>
-        <p:txBody>
-          <a:bodyPr/>
-          <a:lstStyle/>
-          <a:p>
-            <a:r>
-              <a:rPr lang="en-US" dirty="0"/>
-              <a:t>Johannes Sim &amp;</a:t>
-            </a:r>
-          </a:p>
-          <a:p>
-            <a:r>
-              <a:rPr lang="en-US" dirty="0"/>
-              <a:t>Renzo </a:t>
-            </a:r>
-            <a:r>
-              <a:rPr lang="en-US" dirty="0" err="1"/>
-              <a:t>veldkamp</a:t>
-            </a:r>
-            <a:endParaRPr lang="nl-NL" dirty="0"/>
-          </a:p>
-        </p:txBody>
-      </p:sp>
-    </p:spTree>
-    <p:extLst>
-      <p:ext uri="{BB962C8B-B14F-4D97-AF65-F5344CB8AC3E}">
-        <p14:creationId xmlns:p14="http://schemas.microsoft.com/office/powerpoint/2010/main" val="1991217779"/>
       </p:ext>
     </p:extLst>
   </p:cSld>
@@ -12064,15 +12324,6 @@
 </file>
 
 <file path=customXml/item1.xml><?xml version="1.0" encoding="utf-8"?>
-<?mso-contentType ?>
-<FormTemplates xmlns="http://schemas.microsoft.com/sharepoint/v3/contenttype/forms">
-  <Display>DocumentLibraryForm</Display>
-  <Edit>DocumentLibraryForm</Edit>
-  <New>DocumentLibraryForm</New>
-</FormTemplates>
-</file>
-
-<file path=customXml/item2.xml><?xml version="1.0" encoding="utf-8"?>
 <ct:contentTypeSchema xmlns:ct="http://schemas.microsoft.com/office/2006/metadata/contentType" xmlns:ma="http://schemas.microsoft.com/office/2006/metadata/properties/metaAttributes" ct:_="" ma:_="" ma:contentTypeName="Document" ma:contentTypeID="0x0101009843F10021B1B74BA5DD583B6999787F" ma:contentTypeVersion="1" ma:contentTypeDescription="Een nieuw document maken." ma:contentTypeScope="" ma:versionID="9f7dad7ca3b37095ed9229a6a072267d">
   <xsd:schema xmlns:xsd="http://www.w3.org/2001/XMLSchema" xmlns:xs="http://www.w3.org/2001/XMLSchema" xmlns:p="http://schemas.microsoft.com/office/2006/metadata/properties" targetNamespace="http://schemas.microsoft.com/office/2006/metadata/properties" ma:root="true" ma:fieldsID="a17e5968c79d9fe2fc9f8835eee23f58">
     <xsd:element name="properties">
@@ -12186,21 +12437,22 @@
 </ct:contentTypeSchema>
 </file>
 
-<file path=customXml/item3.xml><?xml version="1.0" encoding="utf-8"?>
+<file path=customXml/item2.xml><?xml version="1.0" encoding="utf-8"?>
 <p:properties xmlns:p="http://schemas.microsoft.com/office/2006/metadata/properties" xmlns:xsi="http://www.w3.org/2001/XMLSchema-instance" xmlns:pc="http://schemas.microsoft.com/office/infopath/2007/PartnerControls">
   <documentManagement/>
 </p:properties>
 </file>
 
-<file path=customXml/itemProps1.xml><?xml version="1.0" encoding="utf-8"?>
-<ds:datastoreItem xmlns:ds="http://schemas.openxmlformats.org/officeDocument/2006/customXml" ds:itemID="{4A752D92-0ACC-48D2-A658-AB744FE70ECE}">
-  <ds:schemaRefs>
-    <ds:schemaRef ds:uri="http://schemas.microsoft.com/sharepoint/v3/contenttype/forms"/>
-  </ds:schemaRefs>
-</ds:datastoreItem>
+<file path=customXml/item3.xml><?xml version="1.0" encoding="utf-8"?>
+<?mso-contentType ?>
+<FormTemplates xmlns="http://schemas.microsoft.com/sharepoint/v3/contenttype/forms">
+  <Display>DocumentLibraryForm</Display>
+  <Edit>DocumentLibraryForm</Edit>
+  <New>DocumentLibraryForm</New>
+</FormTemplates>
 </file>
 
-<file path=customXml/itemProps2.xml><?xml version="1.0" encoding="utf-8"?>
+<file path=customXml/itemProps1.xml><?xml version="1.0" encoding="utf-8"?>
 <ds:datastoreItem xmlns:ds="http://schemas.openxmlformats.org/officeDocument/2006/customXml" ds:itemID="{3175F035-B069-4F0E-ADC8-454931FDE34D}">
   <ds:schemaRefs>
     <ds:schemaRef ds:uri="http://schemas.microsoft.com/office/2006/metadata/contentType"/>
@@ -12216,17 +12468,25 @@
 </ds:datastoreItem>
 </file>
 
-<file path=customXml/itemProps3.xml><?xml version="1.0" encoding="utf-8"?>
+<file path=customXml/itemProps2.xml><?xml version="1.0" encoding="utf-8"?>
 <ds:datastoreItem xmlns:ds="http://schemas.openxmlformats.org/officeDocument/2006/customXml" ds:itemID="{DE0A3E1F-B2EC-4B36-9F71-3169FFDE4AE0}">
   <ds:schemaRefs>
+    <ds:schemaRef ds:uri="http://purl.org/dc/terms/"/>
+    <ds:schemaRef ds:uri="http://schemas.openxmlformats.org/package/2006/metadata/core-properties"/>
+    <ds:schemaRef ds:uri="http://schemas.microsoft.com/office/2006/documentManagement/types"/>
+    <ds:schemaRef ds:uri="http://schemas.microsoft.com/office/infopath/2007/PartnerControls"/>
     <ds:schemaRef ds:uri="http://purl.org/dc/elements/1.1/"/>
     <ds:schemaRef ds:uri="http://schemas.microsoft.com/office/2006/metadata/properties"/>
-    <ds:schemaRef ds:uri="http://schemas.microsoft.com/office/2006/documentManagement/types"/>
-    <ds:schemaRef ds:uri="http://purl.org/dc/terms/"/>
-    <ds:schemaRef ds:uri="http://schemas.openxmlformats.org/package/2006/metadata/core-properties"/>
+    <ds:schemaRef ds:uri="http://www.w3.org/XML/1998/namespace"/>
     <ds:schemaRef ds:uri="http://purl.org/dc/dcmitype/"/>
-    <ds:schemaRef ds:uri="http://schemas.microsoft.com/office/infopath/2007/PartnerControls"/>
-    <ds:schemaRef ds:uri="http://www.w3.org/XML/1998/namespace"/>
+  </ds:schemaRefs>
+</ds:datastoreItem>
+</file>
+
+<file path=customXml/itemProps3.xml><?xml version="1.0" encoding="utf-8"?>
+<ds:datastoreItem xmlns:ds="http://schemas.openxmlformats.org/officeDocument/2006/customXml" ds:itemID="{4A752D92-0ACC-48D2-A658-AB744FE70ECE}">
+  <ds:schemaRefs>
+    <ds:schemaRef ds:uri="http://schemas.microsoft.com/sharepoint/v3/contenttype/forms"/>
   </ds:schemaRefs>
 </ds:datastoreItem>
 </file>
</xml_diff>

<commit_message>
updated index.html updated presentations (now in English) Added menti results day 1
</commit_message>
<xml_diff>
--- a/Presentatie/Microservices 101.pptx
+++ b/Presentatie/Microservices 101.pptx
@@ -14,7 +14,7 @@
     <p:sldId id="257" r:id="rId5"/>
     <p:sldId id="280" r:id="rId6"/>
     <p:sldId id="259" r:id="rId7"/>
-    <p:sldId id="266" r:id="rId8"/>
+    <p:sldId id="281" r:id="rId8"/>
     <p:sldId id="270" r:id="rId9"/>
     <p:sldId id="274" r:id="rId10"/>
     <p:sldId id="278" r:id="rId11"/>
@@ -233,7 +233,7 @@
           <a:p>
             <a:fld id="{4FDA5BBF-9A9E-E34C-87D2-CD6D1CA60245}" type="datetime1">
               <a:rPr lang="en-US" smtClean="0"/>
-              <a:t>11/2/2018</a:t>
+              <a:t>11/14/2018</a:t>
             </a:fld>
             <a:endParaRPr lang="en-US" dirty="0"/>
           </a:p>
@@ -399,7 +399,7 @@
           <a:p>
             <a:fld id="{FE5FB5CF-D153-1544-8329-2FC1F4ABF24D}" type="datetime1">
               <a:rPr lang="en-US" smtClean="0"/>
-              <a:t>11/2/2018</a:t>
+              <a:t>11/14/2018</a:t>
             </a:fld>
             <a:endParaRPr lang="nl-NL" dirty="0"/>
           </a:p>
@@ -989,16 +989,9 @@
             </a:r>
           </a:p>
           <a:p>
-            <a:endParaRPr lang="en-US" dirty="0"/>
-          </a:p>
-          <a:p>
-            <a:r>
-              <a:rPr lang="en-US" dirty="0" err="1"/>
-              <a:t>Losse</a:t>
-            </a:r>
             <a:r>
               <a:rPr lang="en-US" dirty="0"/>
-              <a:t> applicatiefuncties, kies de omvang</a:t>
+              <a:t>Losse applicatiefuncties, kies de omvang</a:t>
             </a:r>
             <a:r>
               <a:rPr lang="en-US" baseline="0" dirty="0"/>
@@ -1007,11 +1000,8 @@
             <a:endParaRPr lang="en-US" dirty="0"/>
           </a:p>
           <a:p>
-            <a:endParaRPr lang="en-US" dirty="0"/>
-          </a:p>
-          <a:p>
-            <a:r>
-              <a:rPr lang="en-US" dirty="0" err="1"/>
+            <a:r>
+              <a:rPr lang="en-US" dirty="0"/>
               <a:t>Temporeel</a:t>
             </a:r>
             <a:r>
@@ -1020,41 +1010,22 @@
             </a:r>
           </a:p>
           <a:p>
+            <a:r>
+              <a:rPr lang="en-US" baseline="0" dirty="0"/>
+              <a:t>Inter-service communicatie obv REST of MQ</a:t>
+            </a:r>
+          </a:p>
+          <a:p>
             <a:endParaRPr lang="en-US" baseline="0" dirty="0"/>
           </a:p>
           <a:p>
             <a:r>
               <a:rPr lang="en-US" baseline="0" dirty="0"/>
-              <a:t>Inter-service communicatie obv REST of message bus (</a:t>
+              <a:t>Client-</a:t>
             </a:r>
             <a:r>
               <a:rPr lang="en-US" baseline="0" dirty="0" err="1"/>
-              <a:t>bijv</a:t>
-            </a:r>
-            <a:r>
-              <a:rPr lang="en-US" baseline="0" dirty="0"/>
-              <a:t>. MQ-</a:t>
-            </a:r>
-            <a:r>
-              <a:rPr lang="en-US" baseline="0" dirty="0" err="1"/>
-              <a:t>gebaseerd</a:t>
-            </a:r>
-            <a:r>
-              <a:rPr lang="en-US" baseline="0" dirty="0"/>
-              <a:t>)</a:t>
-            </a:r>
-          </a:p>
-          <a:p>
-            <a:endParaRPr lang="en-US" baseline="0" dirty="0"/>
-          </a:p>
-          <a:p>
-            <a:r>
-              <a:rPr lang="en-US" baseline="0" dirty="0"/>
-              <a:t>Elke service </a:t>
-            </a:r>
-            <a:r>
-              <a:rPr lang="en-US" baseline="0" dirty="0" err="1"/>
-              <a:t>een</a:t>
+              <a:t>applicatie</a:t>
             </a:r>
             <a:r>
               <a:rPr lang="en-US" baseline="0" dirty="0"/>
@@ -1062,28 +1033,43 @@
             </a:r>
             <a:r>
               <a:rPr lang="en-US" baseline="0" dirty="0" err="1"/>
-              <a:t>eigen</a:t>
+              <a:t>kan</a:t>
             </a:r>
             <a:r>
               <a:rPr lang="en-US" baseline="0" dirty="0"/>
-              <a:t> database, of </a:t>
+              <a:t> in 2 </a:t>
             </a:r>
             <a:r>
               <a:rPr lang="en-US" baseline="0" dirty="0" err="1"/>
-              <a:t>alle</a:t>
+              <a:t>delen</a:t>
             </a:r>
             <a:r>
               <a:rPr lang="en-US" baseline="0" dirty="0"/>
-              <a:t> instances van </a:t>
+              <a:t> (web-client-app </a:t>
             </a:r>
             <a:r>
               <a:rPr lang="en-US" baseline="0" dirty="0" err="1"/>
-              <a:t>een</a:t>
+              <a:t>en</a:t>
             </a:r>
             <a:r>
               <a:rPr lang="en-US" baseline="0" dirty="0"/>
-              <a:t> service op 1 database??</a:t>
-            </a:r>
+              <a:t> REST-gateway) </a:t>
+            </a:r>
+            <a:r>
+              <a:rPr lang="en-US" baseline="0" dirty="0" err="1"/>
+              <a:t>zijn</a:t>
+            </a:r>
+            <a:r>
+              <a:rPr lang="en-US" baseline="0" dirty="0"/>
+              <a:t> </a:t>
+            </a:r>
+            <a:r>
+              <a:rPr lang="en-US" baseline="0" dirty="0" err="1"/>
+              <a:t>opgesplitst</a:t>
+            </a:r>
+            <a:endParaRPr lang="en-US" baseline="0"/>
+          </a:p>
+          <a:p>
             <a:endParaRPr lang="nl-NL" dirty="0"/>
           </a:p>
         </p:txBody>
@@ -1114,7 +1100,7 @@
     </p:spTree>
     <p:extLst>
       <p:ext uri="{BB962C8B-B14F-4D97-AF65-F5344CB8AC3E}">
-        <p14:creationId xmlns:p14="http://schemas.microsoft.com/office/powerpoint/2010/main" val="99600452"/>
+        <p14:creationId xmlns:p14="http://schemas.microsoft.com/office/powerpoint/2010/main" val="638979167"/>
       </p:ext>
     </p:extLst>
   </p:cSld>
@@ -1815,7 +1801,7 @@
           <a:p>
             <a:fld id="{69E2E37C-AA1E-43B2-B213-E688D587CE49}" type="datetime4">
               <a:rPr lang="nl-NL" smtClean="0"/>
-              <a:t>2 november 2018</a:t>
+              <a:t>14 november 2018</a:t>
             </a:fld>
             <a:endParaRPr lang="nl-NL" dirty="0"/>
           </a:p>
@@ -1932,7 +1918,7 @@
           <a:p>
             <a:fld id="{96BF97C2-7262-427C-9F3E-B0D6D33F54E2}" type="datetime4">
               <a:rPr lang="nl-NL" smtClean="0"/>
-              <a:t>2 november 2018</a:t>
+              <a:t>14 november 2018</a:t>
             </a:fld>
             <a:endParaRPr lang="nl-NL" dirty="0"/>
           </a:p>
@@ -2156,7 +2142,7 @@
           <a:p>
             <a:fld id="{AB63B3A2-628B-479E-BF05-5959017C6A02}" type="datetime4">
               <a:rPr lang="nl-NL" smtClean="0"/>
-              <a:t>2 november 2018</a:t>
+              <a:t>14 november 2018</a:t>
             </a:fld>
             <a:endParaRPr lang="nl-NL" dirty="0"/>
           </a:p>
@@ -2423,7 +2409,7 @@
             <a:fld id="{249B52C1-75DC-496B-AF3F-4978B95BB865}" type="datetime4">
               <a:rPr lang="nl-NL" smtClean="0"/>
               <a:pPr/>
-              <a:t>2 november 2018</a:t>
+              <a:t>14 november 2018</a:t>
             </a:fld>
             <a:endParaRPr lang="nl-NL" dirty="0"/>
           </a:p>
@@ -2519,7 +2505,7 @@
           <a:p>
             <a:fld id="{8D31B592-DB5E-43FC-B016-67E26C01643F}" type="datetime4">
               <a:rPr lang="nl-NL" smtClean="0"/>
-              <a:t>2 november 2018</a:t>
+              <a:t>14 november 2018</a:t>
             </a:fld>
             <a:endParaRPr lang="nl-NL" dirty="0"/>
           </a:p>
@@ -2729,7 +2715,7 @@
           <a:p>
             <a:fld id="{92E94904-3BB7-4874-AB8B-F31F00F8A078}" type="datetime4">
               <a:rPr lang="nl-NL" smtClean="0"/>
-              <a:t>2 november 2018</a:t>
+              <a:t>14 november 2018</a:t>
             </a:fld>
             <a:endParaRPr lang="nl-NL" dirty="0"/>
           </a:p>
@@ -2910,7 +2896,7 @@
           <a:p>
             <a:fld id="{A9642D5E-8E53-4D94-8479-CCF9387ED904}" type="datetime4">
               <a:rPr lang="nl-NL" smtClean="0"/>
-              <a:t>2 november 2018</a:t>
+              <a:t>14 november 2018</a:t>
             </a:fld>
             <a:endParaRPr lang="nl-NL" dirty="0"/>
           </a:p>
@@ -3125,7 +3111,7 @@
           <a:p>
             <a:fld id="{87D76D0B-AA25-481F-9FCE-BD155C5A6085}" type="datetime4">
               <a:rPr lang="nl-NL" smtClean="0"/>
-              <a:t>2 november 2018</a:t>
+              <a:t>14 november 2018</a:t>
             </a:fld>
             <a:endParaRPr lang="nl-NL" dirty="0"/>
           </a:p>
@@ -3337,7 +3323,7 @@
           <a:p>
             <a:fld id="{88C11819-B839-4C27-8B45-7170CEF46D62}" type="datetime4">
               <a:rPr lang="nl-NL" smtClean="0"/>
-              <a:t>2 november 2018</a:t>
+              <a:t>14 november 2018</a:t>
             </a:fld>
             <a:endParaRPr lang="nl-NL" dirty="0"/>
           </a:p>
@@ -3552,7 +3538,7 @@
           <a:p>
             <a:fld id="{174613E7-29CA-4C1D-88BD-FA51696C19FE}" type="datetime4">
               <a:rPr lang="nl-NL" smtClean="0"/>
-              <a:t>2 november 2018</a:t>
+              <a:t>14 november 2018</a:t>
             </a:fld>
             <a:endParaRPr lang="nl-NL" dirty="0"/>
           </a:p>
@@ -3745,7 +3731,7 @@
           <a:p>
             <a:fld id="{9F389A9C-5452-4AF4-8D69-2209042ED2AB}" type="datetime4">
               <a:rPr lang="nl-NL" smtClean="0"/>
-              <a:t>2 november 2018</a:t>
+              <a:t>14 november 2018</a:t>
             </a:fld>
             <a:endParaRPr lang="nl-NL" dirty="0"/>
           </a:p>
@@ -3949,7 +3935,7 @@
           <a:p>
             <a:fld id="{59ABBC3E-A20C-4DEE-9D7A-437B797B148A}" type="datetime4">
               <a:rPr lang="nl-NL" smtClean="0"/>
-              <a:t>2 november 2018</a:t>
+              <a:t>14 november 2018</a:t>
             </a:fld>
             <a:r>
               <a:rPr lang="en-US"/>
@@ -4446,7 +4432,7 @@
           <a:p>
             <a:fld id="{E8809DAD-F941-4A15-ABB1-44FA32742BE9}" type="datetime4">
               <a:rPr lang="nl-NL" smtClean="0"/>
-              <a:t>2 november 2018</a:t>
+              <a:t>14 november 2018</a:t>
             </a:fld>
             <a:endParaRPr lang="nl-NL" dirty="0"/>
           </a:p>
@@ -4872,8 +4858,12 @@
           <a:lstStyle/>
           <a:p>
             <a:r>
+              <a:rPr lang="nl-NL" dirty="0" err="1"/>
+              <a:t>questions</a:t>
+            </a:r>
+            <a:r>
               <a:rPr lang="nl-NL" dirty="0"/>
-              <a:t>Vragen?</a:t>
+              <a:t>?</a:t>
             </a:r>
           </a:p>
         </p:txBody>
@@ -4975,7 +4965,7 @@
           <a:p>
             <a:fld id="{6C8F2B54-89D2-4D0B-81B9-EBE704C6250E}" type="datetime4">
               <a:rPr lang="nl-NL" smtClean="0"/>
-              <a:t>2 november 2018</a:t>
+              <a:t>14 november 2018</a:t>
             </a:fld>
             <a:endParaRPr lang="nl-NL" dirty="0"/>
           </a:p>
@@ -5074,8 +5064,8 @@
         </p:blipFill>
         <p:spPr>
           <a:xfrm>
-            <a:off x="4810125" y="572348"/>
-            <a:ext cx="3938588" cy="5265628"/>
+            <a:off x="4893947" y="906253"/>
+            <a:ext cx="2755603" cy="3684056"/>
           </a:xfrm>
         </p:spPr>
       </p:pic>
@@ -5103,7 +5093,7 @@
             <a:fld id="{249B52C1-75DC-496B-AF3F-4978B95BB865}" type="datetime4">
               <a:rPr lang="nl-NL" smtClean="0"/>
               <a:pPr/>
-              <a:t>2 november 2018</a:t>
+              <a:t>14 november 2018</a:t>
             </a:fld>
             <a:endParaRPr lang="nl-NL" dirty="0"/>
           </a:p>
@@ -5138,24 +5128,42 @@
           </a:p>
         </p:txBody>
       </p:sp>
-      <p:sp>
-        <p:nvSpPr>
-          <p:cNvPr id="10" name="Picture Placeholder 9">
+      <p:pic>
+        <p:nvPicPr>
+          <p:cNvPr id="6" name="Picture Placeholder 5">
             <a:extLst>
               <a:ext uri="{FF2B5EF4-FFF2-40B4-BE49-F238E27FC236}">
-                <a16:creationId xmlns:a16="http://schemas.microsoft.com/office/drawing/2014/main" id="{58E8D336-78A6-45A6-B03B-192A3A456E81}"/>
+                <a16:creationId xmlns:a16="http://schemas.microsoft.com/office/drawing/2014/main" id="{3B4D6D9D-AE5A-4097-BA9C-F37C485A6A75}"/>
               </a:ext>
             </a:extLst>
           </p:cNvPr>
-          <p:cNvSpPr>
-            <a:spLocks noGrp="1"/>
-          </p:cNvSpPr>
+          <p:cNvPicPr>
+            <a:picLocks noGrp="1" noChangeAspect="1"/>
+          </p:cNvPicPr>
           <p:nvPr>
             <p:ph type="pic" sz="quarter" idx="13"/>
           </p:nvPr>
-        </p:nvSpPr>
-        <p:spPr/>
-      </p:sp>
+        </p:nvPicPr>
+        <p:blipFill>
+          <a:blip r:embed="rId3" cstate="print">
+            <a:extLst>
+              <a:ext uri="{28A0092B-C50C-407E-A947-70E740481C1C}">
+                <a14:useLocalDpi xmlns:a14="http://schemas.microsoft.com/office/drawing/2010/main" val="0"/>
+              </a:ext>
+            </a:extLst>
+          </a:blip>
+          <a:srcRect l="9852" r="9852"/>
+          <a:stretch>
+            <a:fillRect/>
+          </a:stretch>
+        </p:blipFill>
+        <p:spPr>
+          <a:xfrm>
+            <a:off x="2972622" y="3912551"/>
+            <a:ext cx="601084" cy="795135"/>
+          </a:xfrm>
+        </p:spPr>
+      </p:pic>
       <p:sp>
         <p:nvSpPr>
           <p:cNvPr id="2" name="Title 1">
@@ -5273,6 +5281,42 @@
           </a:p>
         </p:txBody>
       </p:sp>
+      <p:pic>
+        <p:nvPicPr>
+          <p:cNvPr id="9" name="Picture 8">
+            <a:extLst>
+              <a:ext uri="{FF2B5EF4-FFF2-40B4-BE49-F238E27FC236}">
+                <a16:creationId xmlns:a16="http://schemas.microsoft.com/office/drawing/2014/main" id="{5C4CE16B-E6F6-44AD-B5A4-825A90B3BDA1}"/>
+              </a:ext>
+            </a:extLst>
+          </p:cNvPr>
+          <p:cNvPicPr>
+            <a:picLocks noChangeAspect="1"/>
+          </p:cNvPicPr>
+          <p:nvPr/>
+        </p:nvPicPr>
+        <p:blipFill>
+          <a:blip r:embed="rId4">
+            <a:extLst>
+              <a:ext uri="{28A0092B-C50C-407E-A947-70E740481C1C}">
+                <a14:useLocalDpi xmlns:a14="http://schemas.microsoft.com/office/drawing/2010/main" val="0"/>
+              </a:ext>
+            </a:extLst>
+          </a:blip>
+          <a:stretch>
+            <a:fillRect/>
+          </a:stretch>
+        </p:blipFill>
+        <p:spPr>
+          <a:xfrm>
+            <a:off x="234922" y="2748281"/>
+            <a:ext cx="1790700" cy="1714500"/>
+          </a:xfrm>
+          <a:prstGeom prst="rect">
+            <a:avLst/>
+          </a:prstGeom>
+        </p:spPr>
+      </p:pic>
     </p:spTree>
     <p:extLst>
       <p:ext uri="{BB962C8B-B14F-4D97-AF65-F5344CB8AC3E}">
@@ -5320,7 +5364,7 @@
           <a:p>
             <a:r>
               <a:rPr lang="nl-NL" cap="all" dirty="0"/>
-              <a:t>onderwerpen</a:t>
+              <a:t>topics</a:t>
             </a:r>
             <a:endParaRPr lang="nl-NL" dirty="0"/>
           </a:p>
@@ -5355,8 +5399,13 @@
             </a:pPr>
             <a:r>
               <a:rPr lang="nl-NL" dirty="0"/>
-              <a:t>Microservices-architectuur</a:t>
-            </a:r>
+              <a:t>Microservices-</a:t>
+            </a:r>
+            <a:r>
+              <a:rPr lang="nl-NL" dirty="0" err="1"/>
+              <a:t>architecture</a:t>
+            </a:r>
+            <a:endParaRPr lang="nl-NL" dirty="0"/>
           </a:p>
           <a:p>
             <a:pPr>
@@ -5366,8 +5415,13 @@
             </a:pPr>
             <a:r>
               <a:rPr lang="nl-NL" dirty="0"/>
-              <a:t>(Nieuwe) Mogelijkheden</a:t>
-            </a:r>
+              <a:t>(New) </a:t>
+            </a:r>
+            <a:r>
+              <a:rPr lang="nl-NL" dirty="0" err="1"/>
+              <a:t>possibilities</a:t>
+            </a:r>
+            <a:endParaRPr lang="nl-NL" dirty="0"/>
           </a:p>
           <a:p>
             <a:pPr>
@@ -5376,16 +5430,16 @@
               </a:spcAft>
             </a:pPr>
             <a:r>
-              <a:rPr lang="en-US" dirty="0"/>
-              <a:t>O</a:t>
+              <a:rPr lang="nl-NL" dirty="0"/>
+              <a:t>Communication </a:t>
             </a:r>
             <a:r>
               <a:rPr lang="nl-NL" dirty="0" err="1"/>
-              <a:t>nderlinge</a:t>
+              <a:t>between</a:t>
             </a:r>
             <a:r>
               <a:rPr lang="nl-NL" dirty="0"/>
-              <a:t> communicatie</a:t>
+              <a:t> microservices</a:t>
             </a:r>
           </a:p>
           <a:p>
@@ -5406,8 +5460,8 @@
               </a:spcAft>
             </a:pPr>
             <a:r>
-              <a:rPr lang="en-US" dirty="0" err="1"/>
-              <a:t>Vragen</a:t>
+              <a:rPr lang="en-US" dirty="0"/>
+              <a:t>Questions</a:t>
             </a:r>
             <a:endParaRPr lang="nl-NL" dirty="0"/>
           </a:p>
@@ -5473,7 +5527,7 @@
                   <a:srgbClr val="009036"/>
                 </a:solidFill>
               </a:rPr>
-              <a:t>2 november 2018</a:t>
+              <a:t>14 november 2018</a:t>
             </a:fld>
             <a:endParaRPr lang="nl-NL" sz="900" cap="all" dirty="0">
               <a:solidFill>
@@ -5545,14 +5599,14 @@
       </p:grpSpPr>
       <p:sp>
         <p:nvSpPr>
-          <p:cNvPr id="34" name="Stroomdiagram: Proces 33"/>
+          <p:cNvPr id="41" name="Stroomdiagram: Proces 40"/>
           <p:cNvSpPr/>
           <p:nvPr/>
         </p:nvSpPr>
         <p:spPr>
           <a:xfrm>
-            <a:off x="4035742" y="2186673"/>
-            <a:ext cx="1291908" cy="725703"/>
+            <a:off x="773927" y="2189480"/>
+            <a:ext cx="1291908" cy="724738"/>
           </a:xfrm>
           <a:prstGeom prst="flowChartProcess">
             <a:avLst/>
@@ -5588,21 +5642,22 @@
           <a:p>
             <a:pPr algn="ctr"/>
             <a:r>
-              <a:rPr lang="nl-NL" dirty="0"/>
-              <a:t>presentatie</a:t>
-            </a:r>
-          </a:p>
-        </p:txBody>
-      </p:sp>
-      <p:sp>
-        <p:nvSpPr>
-          <p:cNvPr id="35" name="Rechthoek 34"/>
+              <a:rPr lang="nl-NL" dirty="0" err="1"/>
+              <a:t>api</a:t>
+            </a:r>
+            <a:endParaRPr lang="nl-NL" dirty="0"/>
+          </a:p>
+        </p:txBody>
+      </p:sp>
+      <p:sp>
+        <p:nvSpPr>
+          <p:cNvPr id="46" name="Rechthoek 45"/>
           <p:cNvSpPr/>
           <p:nvPr/>
         </p:nvSpPr>
         <p:spPr>
           <a:xfrm>
-            <a:off x="4035742" y="2912376"/>
+            <a:off x="2741748" y="1630007"/>
             <a:ext cx="1291908" cy="762000"/>
           </a:xfrm>
           <a:prstGeom prst="rect">
@@ -5647,14 +5702,67 @@
       </p:sp>
       <p:sp>
         <p:nvSpPr>
-          <p:cNvPr id="36" name="Rechthoek 35"/>
+          <p:cNvPr id="34" name="Stroomdiagram: Proces 33"/>
           <p:cNvSpPr/>
           <p:nvPr/>
         </p:nvSpPr>
         <p:spPr>
           <a:xfrm>
-            <a:off x="4035741" y="3674376"/>
-            <a:ext cx="1306830" cy="762000"/>
+            <a:off x="4035742" y="2186673"/>
+            <a:ext cx="1291908" cy="725703"/>
+          </a:xfrm>
+          <a:prstGeom prst="flowChartProcess">
+            <a:avLst/>
+          </a:prstGeom>
+          <a:ln/>
+        </p:spPr>
+        <p:style>
+          <a:lnRef idx="2">
+            <a:schemeClr val="accent5">
+              <a:shade val="50000"/>
+            </a:schemeClr>
+          </a:lnRef>
+          <a:fillRef idx="1">
+            <a:schemeClr val="accent5"/>
+          </a:fillRef>
+          <a:effectRef idx="0">
+            <a:schemeClr val="accent5"/>
+          </a:effectRef>
+          <a:fontRef idx="minor">
+            <a:schemeClr val="lt1"/>
+          </a:fontRef>
+        </p:style>
+        <p:txBody>
+          <a:bodyPr rtlCol="0" anchor="ctr"/>
+          <a:lstStyle/>
+          <a:p>
+            <a:pPr algn="ctr"/>
+            <a:r>
+              <a:rPr lang="nl-NL" sz="1600" dirty="0" err="1">
+                <a:solidFill>
+                  <a:schemeClr val="tx1"/>
+                </a:solidFill>
+              </a:rPr>
+              <a:t>presentation</a:t>
+            </a:r>
+            <a:endParaRPr lang="nl-NL" sz="1600" dirty="0">
+              <a:solidFill>
+                <a:schemeClr val="tx1"/>
+              </a:solidFill>
+            </a:endParaRPr>
+          </a:p>
+        </p:txBody>
+      </p:sp>
+      <p:sp>
+        <p:nvSpPr>
+          <p:cNvPr id="35" name="Rechthoek 34"/>
+          <p:cNvSpPr/>
+          <p:nvPr/>
+        </p:nvSpPr>
+        <p:spPr>
+          <a:xfrm>
+            <a:off x="4035742" y="2912376"/>
+            <a:ext cx="1291908" cy="762000"/>
           </a:xfrm>
           <a:prstGeom prst="rect">
             <a:avLst/>
@@ -5691,52 +5799,23 @@
             <a:pPr algn="ctr"/>
             <a:r>
               <a:rPr lang="nl-NL" dirty="0"/>
-              <a:t>data</a:t>
-            </a:r>
-          </a:p>
-        </p:txBody>
-      </p:sp>
-      <p:sp>
-        <p:nvSpPr>
-          <p:cNvPr id="39" name="Tekstvak 38"/>
-          <p:cNvSpPr txBox="1"/>
-          <p:nvPr/>
-        </p:nvSpPr>
-        <p:spPr>
-          <a:xfrm>
-            <a:off x="4162425" y="1709306"/>
-            <a:ext cx="1087029" cy="369332"/>
-          </a:xfrm>
-          <a:prstGeom prst="rect">
-            <a:avLst/>
-          </a:prstGeom>
-          <a:noFill/>
-        </p:spPr>
-        <p:txBody>
-          <a:bodyPr wrap="none" rtlCol="0">
-            <a:spAutoFit/>
-          </a:bodyPr>
-          <a:lstStyle/>
-          <a:p>
-            <a:r>
-              <a:rPr lang="nl-NL" dirty="0"/>
-              <a:t>facturatie</a:t>
-            </a:r>
-          </a:p>
-        </p:txBody>
-      </p:sp>
-      <p:sp>
-        <p:nvSpPr>
-          <p:cNvPr id="49" name="Stroomdiagram: Proces 48"/>
+              <a:t>logica</a:t>
+            </a:r>
+          </a:p>
+        </p:txBody>
+      </p:sp>
+      <p:sp>
+        <p:nvSpPr>
+          <p:cNvPr id="36" name="Rechthoek 35"/>
           <p:cNvSpPr/>
           <p:nvPr/>
         </p:nvSpPr>
         <p:spPr>
           <a:xfrm>
-            <a:off x="3603782" y="3809812"/>
-            <a:ext cx="1291908" cy="725703"/>
-          </a:xfrm>
-          <a:prstGeom prst="flowChartProcess">
+            <a:off x="4035741" y="3674376"/>
+            <a:ext cx="1306830" cy="762000"/>
+          </a:xfrm>
+          <a:prstGeom prst="rect">
             <a:avLst/>
           </a:prstGeom>
           <a:solidFill>
@@ -5771,8 +5850,38 @@
             <a:pPr algn="ctr"/>
             <a:r>
               <a:rPr lang="nl-NL" dirty="0"/>
-              <a:t>presentatie</a:t>
-            </a:r>
+              <a:t>data</a:t>
+            </a:r>
+          </a:p>
+        </p:txBody>
+      </p:sp>
+      <p:sp>
+        <p:nvSpPr>
+          <p:cNvPr id="39" name="Tekstvak 38"/>
+          <p:cNvSpPr txBox="1"/>
+          <p:nvPr/>
+        </p:nvSpPr>
+        <p:spPr>
+          <a:xfrm>
+            <a:off x="4162425" y="1709306"/>
+            <a:ext cx="1013867" cy="369332"/>
+          </a:xfrm>
+          <a:prstGeom prst="rect">
+            <a:avLst/>
+          </a:prstGeom>
+          <a:noFill/>
+        </p:spPr>
+        <p:txBody>
+          <a:bodyPr wrap="none" rtlCol="0">
+            <a:spAutoFit/>
+          </a:bodyPr>
+          <a:lstStyle/>
+          <a:p>
+            <a:r>
+              <a:rPr lang="nl-NL" dirty="0" err="1"/>
+              <a:t>invoicing</a:t>
+            </a:r>
+            <a:endParaRPr lang="nl-NL" dirty="0"/>
           </a:p>
         </p:txBody>
       </p:sp>
@@ -5887,7 +5996,7 @@
         <p:spPr>
           <a:xfrm>
             <a:off x="4923790" y="5689916"/>
-            <a:ext cx="1087029" cy="369332"/>
+            <a:ext cx="1013419" cy="369332"/>
           </a:xfrm>
           <a:prstGeom prst="rect">
             <a:avLst/>
@@ -5901,9 +6010,10 @@
           <a:lstStyle/>
           <a:p>
             <a:r>
-              <a:rPr lang="nl-NL" dirty="0"/>
-              <a:t>facturatie</a:t>
-            </a:r>
+              <a:rPr lang="nl-NL" dirty="0" err="1"/>
+              <a:t>invoicing</a:t>
+            </a:r>
+            <a:endParaRPr lang="nl-NL" dirty="0"/>
           </a:p>
         </p:txBody>
       </p:sp>
@@ -5919,7 +6029,7 @@
         </p:nvSpPr>
         <p:spPr>
           <a:xfrm>
-            <a:off x="617538" y="473075"/>
+            <a:off x="166736" y="189101"/>
             <a:ext cx="8163164" cy="467411"/>
           </a:xfrm>
         </p:spPr>
@@ -5928,8 +6038,12 @@
           <a:lstStyle/>
           <a:p>
             <a:r>
-              <a:rPr lang="nl-NL"/>
-              <a:t>microservices-architectuur</a:t>
+              <a:rPr lang="nl-NL" dirty="0"/>
+              <a:t>microservices-</a:t>
+            </a:r>
+            <a:r>
+              <a:rPr lang="nl-NL" dirty="0" err="1"/>
+              <a:t>architecture</a:t>
             </a:r>
             <a:endParaRPr lang="nl-NL" dirty="0"/>
           </a:p>
@@ -5956,7 +6070,7 @@
                   <a:srgbClr val="009036"/>
                 </a:solidFill>
               </a:rPr>
-              <a:t>2 november 2018</a:t>
+              <a:t>14 november 2018</a:t>
             </a:fld>
             <a:endParaRPr lang="nl-NL" sz="900" cap="all" dirty="0">
               <a:solidFill>
@@ -6009,6 +6123,59 @@
             <a:ext cx="1291908" cy="725703"/>
           </a:xfrm>
           <a:prstGeom prst="flowChartProcess">
+            <a:avLst/>
+          </a:prstGeom>
+          <a:ln/>
+        </p:spPr>
+        <p:style>
+          <a:lnRef idx="2">
+            <a:schemeClr val="accent5">
+              <a:shade val="50000"/>
+            </a:schemeClr>
+          </a:lnRef>
+          <a:fillRef idx="1">
+            <a:schemeClr val="accent5"/>
+          </a:fillRef>
+          <a:effectRef idx="0">
+            <a:schemeClr val="accent5"/>
+          </a:effectRef>
+          <a:fontRef idx="minor">
+            <a:schemeClr val="lt1"/>
+          </a:fontRef>
+        </p:style>
+        <p:txBody>
+          <a:bodyPr rtlCol="0" anchor="ctr"/>
+          <a:lstStyle/>
+          <a:p>
+            <a:pPr algn="ctr"/>
+            <a:r>
+              <a:rPr lang="nl-NL" sz="1600" dirty="0" err="1">
+                <a:solidFill>
+                  <a:schemeClr val="tx1"/>
+                </a:solidFill>
+              </a:rPr>
+              <a:t>presentation</a:t>
+            </a:r>
+            <a:endParaRPr lang="nl-NL" sz="1600" dirty="0">
+              <a:solidFill>
+                <a:schemeClr val="tx1"/>
+              </a:solidFill>
+            </a:endParaRPr>
+          </a:p>
+        </p:txBody>
+      </p:sp>
+      <p:sp>
+        <p:nvSpPr>
+          <p:cNvPr id="26" name="Rechthoek 25"/>
+          <p:cNvSpPr/>
+          <p:nvPr/>
+        </p:nvSpPr>
+        <p:spPr>
+          <a:xfrm>
+            <a:off x="5334815" y="2912376"/>
+            <a:ext cx="1291908" cy="762000"/>
+          </a:xfrm>
+          <a:prstGeom prst="rect">
             <a:avLst/>
           </a:prstGeom>
           <a:solidFill>
@@ -6043,21 +6210,21 @@
             <a:pPr algn="ctr"/>
             <a:r>
               <a:rPr lang="nl-NL" dirty="0"/>
-              <a:t>presentatie</a:t>
-            </a:r>
-          </a:p>
-        </p:txBody>
-      </p:sp>
-      <p:sp>
-        <p:nvSpPr>
-          <p:cNvPr id="26" name="Rechthoek 25"/>
+              <a:t>logica</a:t>
+            </a:r>
+          </a:p>
+        </p:txBody>
+      </p:sp>
+      <p:sp>
+        <p:nvSpPr>
+          <p:cNvPr id="27" name="Rechthoek 26"/>
           <p:cNvSpPr/>
           <p:nvPr/>
         </p:nvSpPr>
         <p:spPr>
           <a:xfrm>
-            <a:off x="5334815" y="2912376"/>
-            <a:ext cx="1291908" cy="762000"/>
+            <a:off x="5339736" y="3674376"/>
+            <a:ext cx="1289231" cy="762000"/>
           </a:xfrm>
           <a:prstGeom prst="rect">
             <a:avLst/>
@@ -6094,21 +6261,74 @@
             <a:pPr algn="ctr"/>
             <a:r>
               <a:rPr lang="nl-NL" dirty="0"/>
-              <a:t>logica</a:t>
-            </a:r>
-          </a:p>
-        </p:txBody>
-      </p:sp>
-      <p:sp>
-        <p:nvSpPr>
-          <p:cNvPr id="27" name="Rechthoek 26"/>
+              <a:t>data</a:t>
+            </a:r>
+          </a:p>
+        </p:txBody>
+      </p:sp>
+      <p:sp>
+        <p:nvSpPr>
+          <p:cNvPr id="28" name="Stroomdiagram: Proces 27"/>
           <p:cNvSpPr/>
           <p:nvPr/>
         </p:nvSpPr>
         <p:spPr>
           <a:xfrm>
-            <a:off x="5339736" y="3674376"/>
-            <a:ext cx="1289231" cy="762000"/>
+            <a:off x="2740342" y="2186673"/>
+            <a:ext cx="1291908" cy="727978"/>
+          </a:xfrm>
+          <a:prstGeom prst="flowChartProcess">
+            <a:avLst/>
+          </a:prstGeom>
+          <a:ln/>
+        </p:spPr>
+        <p:style>
+          <a:lnRef idx="2">
+            <a:schemeClr val="accent5">
+              <a:shade val="50000"/>
+            </a:schemeClr>
+          </a:lnRef>
+          <a:fillRef idx="1">
+            <a:schemeClr val="accent5"/>
+          </a:fillRef>
+          <a:effectRef idx="0">
+            <a:schemeClr val="accent5"/>
+          </a:effectRef>
+          <a:fontRef idx="minor">
+            <a:schemeClr val="lt1"/>
+          </a:fontRef>
+        </p:style>
+        <p:txBody>
+          <a:bodyPr rtlCol="0" anchor="ctr"/>
+          <a:lstStyle/>
+          <a:p>
+            <a:pPr algn="ctr"/>
+            <a:r>
+              <a:rPr lang="nl-NL" sz="1600" dirty="0" err="1">
+                <a:solidFill>
+                  <a:schemeClr val="tx1"/>
+                </a:solidFill>
+              </a:rPr>
+              <a:t>presentation</a:t>
+            </a:r>
+            <a:endParaRPr lang="nl-NL" sz="1600" dirty="0">
+              <a:solidFill>
+                <a:schemeClr val="tx1"/>
+              </a:solidFill>
+            </a:endParaRPr>
+          </a:p>
+        </p:txBody>
+      </p:sp>
+      <p:sp>
+        <p:nvSpPr>
+          <p:cNvPr id="29" name="Rechthoek 28"/>
+          <p:cNvSpPr/>
+          <p:nvPr/>
+        </p:nvSpPr>
+        <p:spPr>
+          <a:xfrm>
+            <a:off x="2740342" y="2913380"/>
+            <a:ext cx="1291908" cy="762000"/>
           </a:xfrm>
           <a:prstGeom prst="rect">
             <a:avLst/>
@@ -6145,23 +6365,23 @@
             <a:pPr algn="ctr"/>
             <a:r>
               <a:rPr lang="nl-NL" dirty="0"/>
-              <a:t>data</a:t>
-            </a:r>
-          </a:p>
-        </p:txBody>
-      </p:sp>
-      <p:sp>
-        <p:nvSpPr>
-          <p:cNvPr id="28" name="Stroomdiagram: Proces 27"/>
+              <a:t>logica</a:t>
+            </a:r>
+          </a:p>
+        </p:txBody>
+      </p:sp>
+      <p:sp>
+        <p:nvSpPr>
+          <p:cNvPr id="30" name="Rechthoek 29"/>
           <p:cNvSpPr/>
           <p:nvPr/>
         </p:nvSpPr>
         <p:spPr>
           <a:xfrm>
-            <a:off x="2740342" y="2186673"/>
-            <a:ext cx="1291908" cy="727978"/>
-          </a:xfrm>
-          <a:prstGeom prst="flowChartProcess">
+            <a:off x="2745263" y="3675380"/>
+            <a:ext cx="1289231" cy="762000"/>
+          </a:xfrm>
+          <a:prstGeom prst="rect">
             <a:avLst/>
           </a:prstGeom>
           <a:solidFill>
@@ -6196,20 +6416,73 @@
             <a:pPr algn="ctr"/>
             <a:r>
               <a:rPr lang="nl-NL" dirty="0"/>
-              <a:t>presentatie</a:t>
-            </a:r>
-          </a:p>
-        </p:txBody>
-      </p:sp>
-      <p:sp>
-        <p:nvSpPr>
-          <p:cNvPr id="29" name="Rechthoek 28"/>
+              <a:t>data</a:t>
+            </a:r>
+          </a:p>
+        </p:txBody>
+      </p:sp>
+      <p:sp>
+        <p:nvSpPr>
+          <p:cNvPr id="31" name="Stroomdiagram: Proces 30"/>
           <p:cNvSpPr/>
           <p:nvPr/>
         </p:nvSpPr>
         <p:spPr>
           <a:xfrm>
-            <a:off x="2740342" y="2913380"/>
+            <a:off x="1452107" y="2185111"/>
+            <a:ext cx="1291908" cy="729107"/>
+          </a:xfrm>
+          <a:prstGeom prst="flowChartProcess">
+            <a:avLst/>
+          </a:prstGeom>
+          <a:ln/>
+        </p:spPr>
+        <p:style>
+          <a:lnRef idx="2">
+            <a:schemeClr val="accent5">
+              <a:shade val="50000"/>
+            </a:schemeClr>
+          </a:lnRef>
+          <a:fillRef idx="1">
+            <a:schemeClr val="accent5"/>
+          </a:fillRef>
+          <a:effectRef idx="0">
+            <a:schemeClr val="accent5"/>
+          </a:effectRef>
+          <a:fontRef idx="minor">
+            <a:schemeClr val="lt1"/>
+          </a:fontRef>
+        </p:style>
+        <p:txBody>
+          <a:bodyPr rtlCol="0" anchor="ctr"/>
+          <a:lstStyle/>
+          <a:p>
+            <a:pPr algn="ctr"/>
+            <a:r>
+              <a:rPr lang="nl-NL" sz="1600" dirty="0" err="1">
+                <a:solidFill>
+                  <a:schemeClr val="tx1"/>
+                </a:solidFill>
+              </a:rPr>
+              <a:t>presentation</a:t>
+            </a:r>
+            <a:endParaRPr lang="nl-NL" sz="1600" dirty="0">
+              <a:solidFill>
+                <a:schemeClr val="tx1"/>
+              </a:solidFill>
+            </a:endParaRPr>
+          </a:p>
+        </p:txBody>
+      </p:sp>
+      <p:sp>
+        <p:nvSpPr>
+          <p:cNvPr id="32" name="Rechthoek 31"/>
+          <p:cNvSpPr/>
+          <p:nvPr/>
+        </p:nvSpPr>
+        <p:spPr>
+          <a:xfrm>
+            <a:off x="1452107" y="2914218"/>
             <a:ext cx="1291908" cy="762000"/>
           </a:xfrm>
           <a:prstGeom prst="rect">
@@ -6254,14 +6527,14 @@
       </p:sp>
       <p:sp>
         <p:nvSpPr>
-          <p:cNvPr id="30" name="Rechthoek 29"/>
+          <p:cNvPr id="33" name="Rechthoek 32"/>
           <p:cNvSpPr/>
           <p:nvPr/>
         </p:nvSpPr>
         <p:spPr>
           <a:xfrm>
-            <a:off x="2745263" y="3675380"/>
-            <a:ext cx="1289231" cy="762000"/>
+            <a:off x="1452880" y="3676218"/>
+            <a:ext cx="1293379" cy="762000"/>
           </a:xfrm>
           <a:prstGeom prst="rect">
             <a:avLst/>
@@ -6305,16 +6578,105 @@
       </p:sp>
       <p:sp>
         <p:nvSpPr>
-          <p:cNvPr id="31" name="Stroomdiagram: Proces 30"/>
+          <p:cNvPr id="37" name="Tekstvak 36"/>
+          <p:cNvSpPr txBox="1"/>
+          <p:nvPr/>
+        </p:nvSpPr>
+        <p:spPr>
+          <a:xfrm>
+            <a:off x="1245415" y="1709306"/>
+            <a:ext cx="1535870" cy="369332"/>
+          </a:xfrm>
+          <a:prstGeom prst="rect">
+            <a:avLst/>
+          </a:prstGeom>
+          <a:noFill/>
+        </p:spPr>
+        <p:txBody>
+          <a:bodyPr wrap="none" rtlCol="0">
+            <a:spAutoFit/>
+          </a:bodyPr>
+          <a:lstStyle/>
+          <a:p>
+            <a:r>
+              <a:rPr lang="nl-NL" dirty="0"/>
+              <a:t>customer data</a:t>
+            </a:r>
+          </a:p>
+        </p:txBody>
+      </p:sp>
+      <p:sp>
+        <p:nvSpPr>
+          <p:cNvPr id="38" name="Tekstvak 37"/>
+          <p:cNvSpPr txBox="1"/>
+          <p:nvPr/>
+        </p:nvSpPr>
+        <p:spPr>
+          <a:xfrm>
+            <a:off x="2680869" y="1710868"/>
+            <a:ext cx="1413336" cy="369332"/>
+          </a:xfrm>
+          <a:prstGeom prst="rect">
+            <a:avLst/>
+          </a:prstGeom>
+          <a:noFill/>
+        </p:spPr>
+        <p:txBody>
+          <a:bodyPr wrap="none" rtlCol="0">
+            <a:spAutoFit/>
+          </a:bodyPr>
+          <a:lstStyle/>
+          <a:p>
+            <a:r>
+              <a:rPr lang="nl-NL" dirty="0" err="1"/>
+              <a:t>procurement</a:t>
+            </a:r>
+            <a:endParaRPr lang="nl-NL" dirty="0"/>
+          </a:p>
+        </p:txBody>
+      </p:sp>
+      <p:sp>
+        <p:nvSpPr>
+          <p:cNvPr id="40" name="Tekstvak 39"/>
+          <p:cNvSpPr txBox="1"/>
+          <p:nvPr/>
+        </p:nvSpPr>
+        <p:spPr>
+          <a:xfrm>
+            <a:off x="5441060" y="1710868"/>
+            <a:ext cx="925894" cy="369332"/>
+          </a:xfrm>
+          <a:prstGeom prst="rect">
+            <a:avLst/>
+          </a:prstGeom>
+          <a:noFill/>
+        </p:spPr>
+        <p:txBody>
+          <a:bodyPr wrap="none" rtlCol="0">
+            <a:spAutoFit/>
+          </a:bodyPr>
+          <a:lstStyle/>
+          <a:p>
+            <a:r>
+              <a:rPr lang="nl-NL" dirty="0" err="1"/>
+              <a:t>logistics</a:t>
+            </a:r>
+            <a:endParaRPr lang="nl-NL" dirty="0"/>
+          </a:p>
+        </p:txBody>
+      </p:sp>
+      <p:sp>
+        <p:nvSpPr>
+          <p:cNvPr id="42" name="Rechthoek 41"/>
           <p:cNvSpPr/>
           <p:nvPr/>
         </p:nvSpPr>
         <p:spPr>
           <a:xfrm>
-            <a:off x="1452107" y="2185111"/>
-            <a:ext cx="1291908" cy="729107"/>
-          </a:xfrm>
-          <a:prstGeom prst="flowChartProcess">
+            <a:off x="773927" y="2914218"/>
+            <a:ext cx="1291908" cy="762000"/>
+          </a:xfrm>
+          <a:prstGeom prst="rect">
             <a:avLst/>
           </a:prstGeom>
           <a:solidFill>
@@ -6349,21 +6711,21 @@
             <a:pPr algn="ctr"/>
             <a:r>
               <a:rPr lang="nl-NL" dirty="0"/>
-              <a:t>presentatie</a:t>
-            </a:r>
-          </a:p>
-        </p:txBody>
-      </p:sp>
-      <p:sp>
-        <p:nvSpPr>
-          <p:cNvPr id="32" name="Rechthoek 31"/>
+              <a:t>logica</a:t>
+            </a:r>
+          </a:p>
+        </p:txBody>
+      </p:sp>
+      <p:sp>
+        <p:nvSpPr>
+          <p:cNvPr id="43" name="Rechthoek 42"/>
           <p:cNvSpPr/>
           <p:nvPr/>
         </p:nvSpPr>
         <p:spPr>
           <a:xfrm>
-            <a:off x="1452107" y="2914218"/>
-            <a:ext cx="1291908" cy="762000"/>
+            <a:off x="772160" y="3676218"/>
+            <a:ext cx="1293675" cy="762000"/>
           </a:xfrm>
           <a:prstGeom prst="rect">
             <a:avLst/>
@@ -6400,23 +6762,52 @@
             <a:pPr algn="ctr"/>
             <a:r>
               <a:rPr lang="nl-NL" dirty="0"/>
-              <a:t>logica</a:t>
-            </a:r>
-          </a:p>
-        </p:txBody>
-      </p:sp>
-      <p:sp>
-        <p:nvSpPr>
-          <p:cNvPr id="33" name="Rechthoek 32"/>
+              <a:t>data</a:t>
+            </a:r>
+          </a:p>
+        </p:txBody>
+      </p:sp>
+      <p:sp>
+        <p:nvSpPr>
+          <p:cNvPr id="44" name="Tekstvak 43"/>
+          <p:cNvSpPr txBox="1"/>
+          <p:nvPr/>
+        </p:nvSpPr>
+        <p:spPr>
+          <a:xfrm>
+            <a:off x="567235" y="1709306"/>
+            <a:ext cx="1568571" cy="369332"/>
+          </a:xfrm>
+          <a:prstGeom prst="rect">
+            <a:avLst/>
+          </a:prstGeom>
+          <a:noFill/>
+        </p:spPr>
+        <p:txBody>
+          <a:bodyPr wrap="none" rtlCol="0">
+            <a:spAutoFit/>
+          </a:bodyPr>
+          <a:lstStyle/>
+          <a:p>
+            <a:r>
+              <a:rPr lang="nl-NL" dirty="0"/>
+              <a:t>customer data</a:t>
+            </a:r>
+          </a:p>
+        </p:txBody>
+      </p:sp>
+      <p:sp>
+        <p:nvSpPr>
+          <p:cNvPr id="45" name="Stroomdiagram: Proces 44"/>
           <p:cNvSpPr/>
           <p:nvPr/>
         </p:nvSpPr>
         <p:spPr>
           <a:xfrm>
-            <a:off x="1452880" y="3676218"/>
-            <a:ext cx="1293379" cy="762000"/>
-          </a:xfrm>
-          <a:prstGeom prst="rect">
+            <a:off x="2741748" y="909650"/>
+            <a:ext cx="1291908" cy="727978"/>
+          </a:xfrm>
+          <a:prstGeom prst="flowChartProcess">
             <a:avLst/>
           </a:prstGeom>
           <a:solidFill>
@@ -6450,111 +6841,25 @@
           <a:p>
             <a:pPr algn="ctr"/>
             <a:r>
-              <a:rPr lang="nl-NL" dirty="0"/>
-              <a:t>data</a:t>
-            </a:r>
-          </a:p>
-        </p:txBody>
-      </p:sp>
-      <p:sp>
-        <p:nvSpPr>
-          <p:cNvPr id="37" name="Tekstvak 36"/>
-          <p:cNvSpPr txBox="1"/>
-          <p:nvPr/>
-        </p:nvSpPr>
-        <p:spPr>
-          <a:xfrm>
-            <a:off x="1245415" y="1709306"/>
-            <a:ext cx="1521827" cy="369332"/>
-          </a:xfrm>
-          <a:prstGeom prst="rect">
-            <a:avLst/>
-          </a:prstGeom>
-          <a:noFill/>
-        </p:spPr>
-        <p:txBody>
-          <a:bodyPr wrap="none" rtlCol="0">
-            <a:spAutoFit/>
-          </a:bodyPr>
-          <a:lstStyle/>
-          <a:p>
-            <a:r>
-              <a:rPr lang="nl-NL" dirty="0"/>
-              <a:t>klantgegevens</a:t>
-            </a:r>
-          </a:p>
-        </p:txBody>
-      </p:sp>
-      <p:sp>
-        <p:nvSpPr>
-          <p:cNvPr id="38" name="Tekstvak 37"/>
-          <p:cNvSpPr txBox="1"/>
-          <p:nvPr/>
-        </p:nvSpPr>
-        <p:spPr>
-          <a:xfrm>
-            <a:off x="2979039" y="1710868"/>
-            <a:ext cx="821315" cy="369332"/>
-          </a:xfrm>
-          <a:prstGeom prst="rect">
-            <a:avLst/>
-          </a:prstGeom>
-          <a:noFill/>
-        </p:spPr>
-        <p:txBody>
-          <a:bodyPr wrap="none" rtlCol="0">
-            <a:spAutoFit/>
-          </a:bodyPr>
-          <a:lstStyle/>
-          <a:p>
-            <a:r>
-              <a:rPr lang="nl-NL" dirty="0"/>
-              <a:t>inkoop</a:t>
-            </a:r>
-          </a:p>
-        </p:txBody>
-      </p:sp>
-      <p:sp>
-        <p:nvSpPr>
-          <p:cNvPr id="40" name="Tekstvak 39"/>
-          <p:cNvSpPr txBox="1"/>
-          <p:nvPr/>
-        </p:nvSpPr>
-        <p:spPr>
-          <a:xfrm>
-            <a:off x="5441060" y="1710868"/>
-            <a:ext cx="957955" cy="369332"/>
-          </a:xfrm>
-          <a:prstGeom prst="rect">
-            <a:avLst/>
-          </a:prstGeom>
-          <a:noFill/>
-        </p:spPr>
-        <p:txBody>
-          <a:bodyPr wrap="none" rtlCol="0">
-            <a:spAutoFit/>
-          </a:bodyPr>
-          <a:lstStyle/>
-          <a:p>
-            <a:r>
-              <a:rPr lang="nl-NL" dirty="0"/>
-              <a:t>logistiek</a:t>
-            </a:r>
-          </a:p>
-        </p:txBody>
-      </p:sp>
-      <p:sp>
-        <p:nvSpPr>
-          <p:cNvPr id="41" name="Stroomdiagram: Proces 40"/>
+              <a:rPr lang="nl-NL" dirty="0" err="1"/>
+              <a:t>api</a:t>
+            </a:r>
+            <a:endParaRPr lang="nl-NL" dirty="0"/>
+          </a:p>
+        </p:txBody>
+      </p:sp>
+      <p:sp>
+        <p:nvSpPr>
+          <p:cNvPr id="47" name="Rechthoek 46"/>
           <p:cNvSpPr/>
           <p:nvPr/>
         </p:nvSpPr>
         <p:spPr>
           <a:xfrm>
-            <a:off x="773927" y="2189480"/>
-            <a:ext cx="1291908" cy="724738"/>
-          </a:xfrm>
-          <a:prstGeom prst="flowChartProcess">
+            <a:off x="2746101" y="2392007"/>
+            <a:ext cx="1287420" cy="762000"/>
+          </a:xfrm>
+          <a:prstGeom prst="rect">
             <a:avLst/>
           </a:prstGeom>
           <a:solidFill>
@@ -6589,23 +6894,56 @@
             <a:pPr algn="ctr"/>
             <a:r>
               <a:rPr lang="nl-NL" dirty="0"/>
-              <a:t>presentatie</a:t>
-            </a:r>
-          </a:p>
-        </p:txBody>
-      </p:sp>
-      <p:sp>
-        <p:nvSpPr>
-          <p:cNvPr id="42" name="Rechthoek 41"/>
+              <a:t>data</a:t>
+            </a:r>
+          </a:p>
+        </p:txBody>
+      </p:sp>
+      <p:sp>
+        <p:nvSpPr>
+          <p:cNvPr id="48" name="Tekstvak 47"/>
+          <p:cNvSpPr txBox="1"/>
+          <p:nvPr/>
+        </p:nvSpPr>
+        <p:spPr>
+          <a:xfrm>
+            <a:off x="4082050" y="799971"/>
+            <a:ext cx="1413336" cy="646331"/>
+          </a:xfrm>
+          <a:prstGeom prst="rect">
+            <a:avLst/>
+          </a:prstGeom>
+          <a:noFill/>
+        </p:spPr>
+        <p:txBody>
+          <a:bodyPr wrap="none" rtlCol="0">
+            <a:spAutoFit/>
+          </a:bodyPr>
+          <a:lstStyle/>
+          <a:p>
+            <a:r>
+              <a:rPr lang="nl-NL" dirty="0" err="1"/>
+              <a:t>procurement</a:t>
+            </a:r>
+            <a:endParaRPr lang="nl-NL" dirty="0"/>
+          </a:p>
+          <a:p>
+            <a:endParaRPr lang="nl-NL" dirty="0"/>
+          </a:p>
+        </p:txBody>
+      </p:sp>
+      <p:sp>
+        <p:nvSpPr>
+          <p:cNvPr id="53" name="Stroomdiagram: Proces 52"/>
           <p:cNvSpPr/>
           <p:nvPr/>
         </p:nvSpPr>
         <p:spPr>
           <a:xfrm>
-            <a:off x="773927" y="2914218"/>
-            <a:ext cx="1291908" cy="762000"/>
-          </a:xfrm>
-          <a:prstGeom prst="rect">
+            <a:off x="6828335" y="2943327"/>
+            <a:ext cx="1291908" cy="725703"/>
+          </a:xfrm>
+          <a:prstGeom prst="flowChartProcess">
             <a:avLst/>
           </a:prstGeom>
           <a:solidFill>
@@ -6639,22 +6977,23 @@
           <a:p>
             <a:pPr algn="ctr"/>
             <a:r>
-              <a:rPr lang="nl-NL" dirty="0"/>
-              <a:t>logica</a:t>
-            </a:r>
-          </a:p>
-        </p:txBody>
-      </p:sp>
-      <p:sp>
-        <p:nvSpPr>
-          <p:cNvPr id="43" name="Rechthoek 42"/>
+              <a:rPr lang="nl-NL" dirty="0" err="1"/>
+              <a:t>api</a:t>
+            </a:r>
+            <a:endParaRPr lang="nl-NL" dirty="0"/>
+          </a:p>
+        </p:txBody>
+      </p:sp>
+      <p:sp>
+        <p:nvSpPr>
+          <p:cNvPr id="54" name="Rechthoek 53"/>
           <p:cNvSpPr/>
           <p:nvPr/>
         </p:nvSpPr>
         <p:spPr>
           <a:xfrm>
-            <a:off x="772160" y="3676218"/>
-            <a:ext cx="1293675" cy="762000"/>
+            <a:off x="6828335" y="3669030"/>
+            <a:ext cx="1291908" cy="762000"/>
           </a:xfrm>
           <a:prstGeom prst="rect">
             <a:avLst/>
@@ -6691,52 +7030,23 @@
             <a:pPr algn="ctr"/>
             <a:r>
               <a:rPr lang="nl-NL" dirty="0"/>
-              <a:t>data</a:t>
-            </a:r>
-          </a:p>
-        </p:txBody>
-      </p:sp>
-      <p:sp>
-        <p:nvSpPr>
-          <p:cNvPr id="44" name="Tekstvak 43"/>
-          <p:cNvSpPr txBox="1"/>
-          <p:nvPr/>
-        </p:nvSpPr>
-        <p:spPr>
-          <a:xfrm>
-            <a:off x="567235" y="1709306"/>
-            <a:ext cx="1521827" cy="369332"/>
-          </a:xfrm>
-          <a:prstGeom prst="rect">
-            <a:avLst/>
-          </a:prstGeom>
-          <a:noFill/>
-        </p:spPr>
-        <p:txBody>
-          <a:bodyPr wrap="none" rtlCol="0">
-            <a:spAutoFit/>
-          </a:bodyPr>
-          <a:lstStyle/>
-          <a:p>
-            <a:r>
-              <a:rPr lang="nl-NL" dirty="0"/>
-              <a:t>klantgegevens</a:t>
-            </a:r>
-          </a:p>
-        </p:txBody>
-      </p:sp>
-      <p:sp>
-        <p:nvSpPr>
-          <p:cNvPr id="45" name="Stroomdiagram: Proces 44"/>
+              <a:t>logica</a:t>
+            </a:r>
+          </a:p>
+        </p:txBody>
+      </p:sp>
+      <p:sp>
+        <p:nvSpPr>
+          <p:cNvPr id="55" name="Rechthoek 54"/>
           <p:cNvSpPr/>
           <p:nvPr/>
         </p:nvSpPr>
         <p:spPr>
           <a:xfrm>
-            <a:off x="2741748" y="909650"/>
-            <a:ext cx="1291908" cy="727978"/>
-          </a:xfrm>
-          <a:prstGeom prst="flowChartProcess">
+            <a:off x="6828336" y="4431030"/>
+            <a:ext cx="1294152" cy="762000"/>
+          </a:xfrm>
+          <a:prstGeom prst="rect">
             <a:avLst/>
           </a:prstGeom>
           <a:solidFill>
@@ -6771,57 +7081,6 @@
             <a:pPr algn="ctr"/>
             <a:r>
               <a:rPr lang="nl-NL" dirty="0"/>
-              <a:t>presentatie</a:t>
-            </a:r>
-          </a:p>
-        </p:txBody>
-      </p:sp>
-      <p:sp>
-        <p:nvSpPr>
-          <p:cNvPr id="47" name="Rechthoek 46"/>
-          <p:cNvSpPr/>
-          <p:nvPr/>
-        </p:nvSpPr>
-        <p:spPr>
-          <a:xfrm>
-            <a:off x="2746101" y="2392007"/>
-            <a:ext cx="1287420" cy="762000"/>
-          </a:xfrm>
-          <a:prstGeom prst="rect">
-            <a:avLst/>
-          </a:prstGeom>
-          <a:solidFill>
-            <a:srgbClr val="92D050"/>
-          </a:solidFill>
-          <a:ln>
-            <a:solidFill>
-              <a:srgbClr val="00B050"/>
-            </a:solidFill>
-          </a:ln>
-        </p:spPr>
-        <p:style>
-          <a:lnRef idx="2">
-            <a:schemeClr val="accent1">
-              <a:shade val="50000"/>
-            </a:schemeClr>
-          </a:lnRef>
-          <a:fillRef idx="1">
-            <a:schemeClr val="accent1"/>
-          </a:fillRef>
-          <a:effectRef idx="0">
-            <a:schemeClr val="accent1"/>
-          </a:effectRef>
-          <a:fontRef idx="minor">
-            <a:schemeClr val="lt1"/>
-          </a:fontRef>
-        </p:style>
-        <p:txBody>
-          <a:bodyPr rtlCol="0" anchor="ctr"/>
-          <a:lstStyle/>
-          <a:p>
-            <a:pPr algn="ctr"/>
-            <a:r>
-              <a:rPr lang="nl-NL" dirty="0"/>
               <a:t>data</a:t>
             </a:r>
           </a:p>
@@ -6829,14 +7088,14 @@
       </p:sp>
       <p:sp>
         <p:nvSpPr>
-          <p:cNvPr id="48" name="Tekstvak 47"/>
+          <p:cNvPr id="56" name="Tekstvak 55"/>
           <p:cNvSpPr txBox="1"/>
           <p:nvPr/>
         </p:nvSpPr>
         <p:spPr>
           <a:xfrm>
-            <a:off x="4082050" y="799971"/>
-            <a:ext cx="821315" cy="369332"/>
+            <a:off x="6934580" y="2467522"/>
+            <a:ext cx="925894" cy="369332"/>
           </a:xfrm>
           <a:prstGeom prst="rect">
             <a:avLst/>
@@ -6850,191 +7109,10 @@
           <a:lstStyle/>
           <a:p>
             <a:r>
-              <a:rPr lang="nl-NL" dirty="0"/>
-              <a:t>inkoop</a:t>
-            </a:r>
-          </a:p>
-        </p:txBody>
-      </p:sp>
-      <p:sp>
-        <p:nvSpPr>
-          <p:cNvPr id="53" name="Stroomdiagram: Proces 52"/>
-          <p:cNvSpPr/>
-          <p:nvPr/>
-        </p:nvSpPr>
-        <p:spPr>
-          <a:xfrm>
-            <a:off x="6828335" y="2943327"/>
-            <a:ext cx="1291908" cy="725703"/>
-          </a:xfrm>
-          <a:prstGeom prst="flowChartProcess">
-            <a:avLst/>
-          </a:prstGeom>
-          <a:solidFill>
-            <a:srgbClr val="92D050"/>
-          </a:solidFill>
-          <a:ln>
-            <a:solidFill>
-              <a:srgbClr val="00B050"/>
-            </a:solidFill>
-          </a:ln>
-        </p:spPr>
-        <p:style>
-          <a:lnRef idx="2">
-            <a:schemeClr val="accent1">
-              <a:shade val="50000"/>
-            </a:schemeClr>
-          </a:lnRef>
-          <a:fillRef idx="1">
-            <a:schemeClr val="accent1"/>
-          </a:fillRef>
-          <a:effectRef idx="0">
-            <a:schemeClr val="accent1"/>
-          </a:effectRef>
-          <a:fontRef idx="minor">
-            <a:schemeClr val="lt1"/>
-          </a:fontRef>
-        </p:style>
-        <p:txBody>
-          <a:bodyPr rtlCol="0" anchor="ctr"/>
-          <a:lstStyle/>
-          <a:p>
-            <a:pPr algn="ctr"/>
-            <a:r>
-              <a:rPr lang="nl-NL" dirty="0"/>
-              <a:t>presentatie</a:t>
-            </a:r>
-          </a:p>
-        </p:txBody>
-      </p:sp>
-      <p:sp>
-        <p:nvSpPr>
-          <p:cNvPr id="54" name="Rechthoek 53"/>
-          <p:cNvSpPr/>
-          <p:nvPr/>
-        </p:nvSpPr>
-        <p:spPr>
-          <a:xfrm>
-            <a:off x="6828335" y="3669030"/>
-            <a:ext cx="1291908" cy="762000"/>
-          </a:xfrm>
-          <a:prstGeom prst="rect">
-            <a:avLst/>
-          </a:prstGeom>
-          <a:solidFill>
-            <a:srgbClr val="92D050"/>
-          </a:solidFill>
-          <a:ln>
-            <a:solidFill>
-              <a:srgbClr val="00B050"/>
-            </a:solidFill>
-          </a:ln>
-        </p:spPr>
-        <p:style>
-          <a:lnRef idx="2">
-            <a:schemeClr val="accent1">
-              <a:shade val="50000"/>
-            </a:schemeClr>
-          </a:lnRef>
-          <a:fillRef idx="1">
-            <a:schemeClr val="accent1"/>
-          </a:fillRef>
-          <a:effectRef idx="0">
-            <a:schemeClr val="accent1"/>
-          </a:effectRef>
-          <a:fontRef idx="minor">
-            <a:schemeClr val="lt1"/>
-          </a:fontRef>
-        </p:style>
-        <p:txBody>
-          <a:bodyPr rtlCol="0" anchor="ctr"/>
-          <a:lstStyle/>
-          <a:p>
-            <a:pPr algn="ctr"/>
-            <a:r>
-              <a:rPr lang="nl-NL" dirty="0"/>
-              <a:t>logica</a:t>
-            </a:r>
-          </a:p>
-        </p:txBody>
-      </p:sp>
-      <p:sp>
-        <p:nvSpPr>
-          <p:cNvPr id="55" name="Rechthoek 54"/>
-          <p:cNvSpPr/>
-          <p:nvPr/>
-        </p:nvSpPr>
-        <p:spPr>
-          <a:xfrm>
-            <a:off x="6828336" y="4431030"/>
-            <a:ext cx="1294152" cy="762000"/>
-          </a:xfrm>
-          <a:prstGeom prst="rect">
-            <a:avLst/>
-          </a:prstGeom>
-          <a:solidFill>
-            <a:srgbClr val="92D050"/>
-          </a:solidFill>
-          <a:ln>
-            <a:solidFill>
-              <a:srgbClr val="00B050"/>
-            </a:solidFill>
-          </a:ln>
-        </p:spPr>
-        <p:style>
-          <a:lnRef idx="2">
-            <a:schemeClr val="accent1">
-              <a:shade val="50000"/>
-            </a:schemeClr>
-          </a:lnRef>
-          <a:fillRef idx="1">
-            <a:schemeClr val="accent1"/>
-          </a:fillRef>
-          <a:effectRef idx="0">
-            <a:schemeClr val="accent1"/>
-          </a:effectRef>
-          <a:fontRef idx="minor">
-            <a:schemeClr val="lt1"/>
-          </a:fontRef>
-        </p:style>
-        <p:txBody>
-          <a:bodyPr rtlCol="0" anchor="ctr"/>
-          <a:lstStyle/>
-          <a:p>
-            <a:pPr algn="ctr"/>
-            <a:r>
-              <a:rPr lang="nl-NL" dirty="0"/>
-              <a:t>data</a:t>
-            </a:r>
-          </a:p>
-        </p:txBody>
-      </p:sp>
-      <p:sp>
-        <p:nvSpPr>
-          <p:cNvPr id="56" name="Tekstvak 55"/>
-          <p:cNvSpPr txBox="1"/>
-          <p:nvPr/>
-        </p:nvSpPr>
-        <p:spPr>
-          <a:xfrm>
-            <a:off x="6934580" y="2467522"/>
-            <a:ext cx="957955" cy="369332"/>
-          </a:xfrm>
-          <a:prstGeom prst="rect">
-            <a:avLst/>
-          </a:prstGeom>
-          <a:noFill/>
-        </p:spPr>
-        <p:txBody>
-          <a:bodyPr wrap="none" rtlCol="0">
-            <a:spAutoFit/>
-          </a:bodyPr>
-          <a:lstStyle/>
-          <a:p>
-            <a:r>
-              <a:rPr lang="nl-NL" dirty="0"/>
-              <a:t>logistiek</a:t>
-            </a:r>
+              <a:rPr lang="nl-NL" dirty="0" err="1"/>
+              <a:t>logistics</a:t>
+            </a:r>
+            <a:endParaRPr lang="nl-NL" dirty="0"/>
           </a:p>
         </p:txBody>
       </p:sp>
@@ -7042,15 +7120,15 @@
         <p:nvCxnSpPr>
           <p:cNvPr id="58" name="Rechte verbindingslijn met pijl 57"/>
           <p:cNvCxnSpPr>
-            <a:stCxn id="42" idx="3"/>
-            <a:endCxn id="50" idx="1"/>
+            <a:stCxn id="41" idx="3"/>
+            <a:endCxn id="49" idx="1"/>
           </p:cNvCxnSpPr>
           <p:nvPr/>
         </p:nvCxnSpPr>
         <p:spPr>
           <a:xfrm>
-            <a:off x="2065835" y="3295218"/>
-            <a:ext cx="1537947" cy="1621297"/>
+            <a:off x="2065835" y="2551849"/>
+            <a:ext cx="1537947" cy="1620815"/>
           </a:xfrm>
           <a:prstGeom prst="straightConnector1">
             <a:avLst/>
@@ -7082,15 +7160,15 @@
         <p:nvCxnSpPr>
           <p:cNvPr id="60" name="Rechte verbindingslijn met pijl 59"/>
           <p:cNvCxnSpPr>
-            <a:stCxn id="42" idx="3"/>
-            <a:endCxn id="54" idx="1"/>
+            <a:stCxn id="41" idx="3"/>
+            <a:endCxn id="53" idx="1"/>
           </p:cNvCxnSpPr>
           <p:nvPr/>
         </p:nvCxnSpPr>
         <p:spPr>
           <a:xfrm>
-            <a:off x="2065835" y="3295218"/>
-            <a:ext cx="4762500" cy="754812"/>
+            <a:off x="2065835" y="2551849"/>
+            <a:ext cx="4762500" cy="754330"/>
           </a:xfrm>
           <a:prstGeom prst="straightConnector1">
             <a:avLst/>
@@ -7122,15 +7200,15 @@
         <p:nvCxnSpPr>
           <p:cNvPr id="64" name="Rechte verbindingslijn met pijl 63"/>
           <p:cNvCxnSpPr>
-            <a:stCxn id="46" idx="3"/>
-            <a:endCxn id="54" idx="1"/>
+            <a:stCxn id="45" idx="3"/>
+            <a:endCxn id="53" idx="1"/>
           </p:cNvCxnSpPr>
           <p:nvPr/>
         </p:nvCxnSpPr>
         <p:spPr>
           <a:xfrm>
-            <a:off x="4033656" y="2011007"/>
-            <a:ext cx="2794679" cy="2039023"/>
+            <a:off x="4033656" y="1273639"/>
+            <a:ext cx="2794679" cy="2032540"/>
           </a:xfrm>
           <a:prstGeom prst="straightConnector1">
             <a:avLst/>
@@ -7162,14 +7240,14 @@
         <p:nvCxnSpPr>
           <p:cNvPr id="66" name="Rechte verbindingslijn met pijl 65"/>
           <p:cNvCxnSpPr>
-            <a:stCxn id="50" idx="3"/>
-            <a:endCxn id="54" idx="1"/>
+            <a:stCxn id="49" idx="3"/>
+            <a:endCxn id="53" idx="1"/>
           </p:cNvCxnSpPr>
           <p:nvPr/>
         </p:nvCxnSpPr>
         <p:spPr>
           <a:xfrm flipV="1">
-            <a:off x="4895690" y="4050030"/>
+            <a:off x="4895690" y="3306179"/>
             <a:ext cx="1932645" cy="866485"/>
           </a:xfrm>
           <a:prstGeom prst="straightConnector1">
@@ -7202,15 +7280,15 @@
         <p:nvCxnSpPr>
           <p:cNvPr id="68" name="Rechte verbindingslijn met pijl 67"/>
           <p:cNvCxnSpPr>
-            <a:stCxn id="42" idx="3"/>
-            <a:endCxn id="46" idx="1"/>
+            <a:stCxn id="41" idx="3"/>
+            <a:endCxn id="45" idx="1"/>
           </p:cNvCxnSpPr>
           <p:nvPr/>
         </p:nvCxnSpPr>
         <p:spPr>
           <a:xfrm flipV="1">
-            <a:off x="2065835" y="2011007"/>
-            <a:ext cx="675913" cy="1284211"/>
+            <a:off x="2065835" y="1273639"/>
+            <a:ext cx="675913" cy="1278210"/>
           </a:xfrm>
           <a:prstGeom prst="straightConnector1">
             <a:avLst/>
@@ -7238,18 +7316,231 @@
           </a:fontRef>
         </p:style>
       </p:cxnSp>
-      <p:sp>
-        <p:nvSpPr>
-          <p:cNvPr id="46" name="Rechthoek 45"/>
+      <p:cxnSp>
+        <p:nvCxnSpPr>
+          <p:cNvPr id="57" name="Rechte verbindingslijn met pijl 67"/>
+          <p:cNvCxnSpPr>
+            <a:stCxn id="41" idx="3"/>
+            <a:endCxn id="8" idx="2"/>
+          </p:cNvCxnSpPr>
+          <p:nvPr/>
+        </p:nvCxnSpPr>
+        <p:spPr>
+          <a:xfrm flipV="1">
+            <a:off x="2065835" y="1571110"/>
+            <a:ext cx="5336342" cy="980739"/>
+          </a:xfrm>
+          <a:prstGeom prst="straightConnector1">
+            <a:avLst/>
+          </a:prstGeom>
+          <a:ln w="19050">
+            <a:solidFill>
+              <a:srgbClr val="00B050"/>
+            </a:solidFill>
+            <a:headEnd type="triangle"/>
+            <a:tailEnd type="triangle"/>
+          </a:ln>
+        </p:spPr>
+        <p:style>
+          <a:lnRef idx="1">
+            <a:schemeClr val="accent1"/>
+          </a:lnRef>
+          <a:fillRef idx="0">
+            <a:schemeClr val="accent1"/>
+          </a:fillRef>
+          <a:effectRef idx="0">
+            <a:schemeClr val="accent1"/>
+          </a:effectRef>
+          <a:fontRef idx="minor">
+            <a:schemeClr val="tx1"/>
+          </a:fontRef>
+        </p:style>
+      </p:cxnSp>
+      <p:sp>
+        <p:nvSpPr>
+          <p:cNvPr id="8" name="Rectangle 7"/>
           <p:cNvSpPr/>
           <p:nvPr/>
         </p:nvSpPr>
         <p:spPr>
-          <a:xfrm>
-            <a:off x="2741748" y="1630007"/>
-            <a:ext cx="1291908" cy="762000"/>
+          <a:xfrm rot="2319906">
+            <a:off x="5996174" y="998827"/>
+            <a:ext cx="3213558" cy="642722"/>
           </a:xfrm>
           <a:prstGeom prst="rect">
+            <a:avLst/>
+          </a:prstGeom>
+          <a:ln/>
+        </p:spPr>
+        <p:style>
+          <a:lnRef idx="2">
+            <a:schemeClr val="accent5">
+              <a:shade val="50000"/>
+            </a:schemeClr>
+          </a:lnRef>
+          <a:fillRef idx="1">
+            <a:schemeClr val="accent5"/>
+          </a:fillRef>
+          <a:effectRef idx="0">
+            <a:schemeClr val="accent5"/>
+          </a:effectRef>
+          <a:fontRef idx="minor">
+            <a:schemeClr val="lt1"/>
+          </a:fontRef>
+        </p:style>
+        <p:txBody>
+          <a:bodyPr rtlCol="0" anchor="ctr"/>
+          <a:lstStyle/>
+          <a:p>
+            <a:pPr algn="ctr"/>
+            <a:r>
+              <a:rPr lang="en-US" dirty="0">
+                <a:solidFill>
+                  <a:schemeClr val="tx1"/>
+                </a:solidFill>
+              </a:rPr>
+              <a:t>Client-application</a:t>
+            </a:r>
+            <a:endParaRPr lang="nl-NL" dirty="0">
+              <a:solidFill>
+                <a:schemeClr val="tx1"/>
+              </a:solidFill>
+            </a:endParaRPr>
+          </a:p>
+        </p:txBody>
+      </p:sp>
+      <p:cxnSp>
+        <p:nvCxnSpPr>
+          <p:cNvPr id="59" name="Rechte verbindingslijn met pijl 67"/>
+          <p:cNvCxnSpPr>
+            <a:stCxn id="45" idx="3"/>
+            <a:endCxn id="8" idx="2"/>
+          </p:cNvCxnSpPr>
+          <p:nvPr/>
+        </p:nvCxnSpPr>
+        <p:spPr>
+          <a:xfrm>
+            <a:off x="4033656" y="1273639"/>
+            <a:ext cx="3368521" cy="297471"/>
+          </a:xfrm>
+          <a:prstGeom prst="straightConnector1">
+            <a:avLst/>
+          </a:prstGeom>
+          <a:ln w="19050">
+            <a:solidFill>
+              <a:srgbClr val="00B050"/>
+            </a:solidFill>
+            <a:headEnd type="triangle"/>
+            <a:tailEnd type="triangle"/>
+          </a:ln>
+        </p:spPr>
+        <p:style>
+          <a:lnRef idx="1">
+            <a:schemeClr val="accent1"/>
+          </a:lnRef>
+          <a:fillRef idx="0">
+            <a:schemeClr val="accent1"/>
+          </a:fillRef>
+          <a:effectRef idx="0">
+            <a:schemeClr val="accent1"/>
+          </a:effectRef>
+          <a:fontRef idx="minor">
+            <a:schemeClr val="tx1"/>
+          </a:fontRef>
+        </p:style>
+      </p:cxnSp>
+      <p:cxnSp>
+        <p:nvCxnSpPr>
+          <p:cNvPr id="61" name="Rechte verbindingslijn met pijl 67"/>
+          <p:cNvCxnSpPr>
+            <a:stCxn id="49" idx="3"/>
+            <a:endCxn id="8" idx="2"/>
+          </p:cNvCxnSpPr>
+          <p:nvPr/>
+        </p:nvCxnSpPr>
+        <p:spPr>
+          <a:xfrm flipV="1">
+            <a:off x="4895690" y="1571110"/>
+            <a:ext cx="2506487" cy="2601554"/>
+          </a:xfrm>
+          <a:prstGeom prst="straightConnector1">
+            <a:avLst/>
+          </a:prstGeom>
+          <a:ln w="19050">
+            <a:solidFill>
+              <a:srgbClr val="00B050"/>
+            </a:solidFill>
+            <a:headEnd type="triangle"/>
+            <a:tailEnd type="triangle"/>
+          </a:ln>
+        </p:spPr>
+        <p:style>
+          <a:lnRef idx="1">
+            <a:schemeClr val="accent1"/>
+          </a:lnRef>
+          <a:fillRef idx="0">
+            <a:schemeClr val="accent1"/>
+          </a:fillRef>
+          <a:effectRef idx="0">
+            <a:schemeClr val="accent1"/>
+          </a:effectRef>
+          <a:fontRef idx="minor">
+            <a:schemeClr val="tx1"/>
+          </a:fontRef>
+        </p:style>
+      </p:cxnSp>
+      <p:cxnSp>
+        <p:nvCxnSpPr>
+          <p:cNvPr id="62" name="Rechte verbindingslijn met pijl 67"/>
+          <p:cNvCxnSpPr>
+            <a:stCxn id="53" idx="0"/>
+            <a:endCxn id="8" idx="2"/>
+          </p:cNvCxnSpPr>
+          <p:nvPr/>
+        </p:nvCxnSpPr>
+        <p:spPr>
+          <a:xfrm flipH="1" flipV="1">
+            <a:off x="7402177" y="1571110"/>
+            <a:ext cx="72112" cy="1372217"/>
+          </a:xfrm>
+          <a:prstGeom prst="straightConnector1">
+            <a:avLst/>
+          </a:prstGeom>
+          <a:ln w="19050">
+            <a:solidFill>
+              <a:srgbClr val="00B050"/>
+            </a:solidFill>
+            <a:headEnd type="triangle"/>
+            <a:tailEnd type="triangle"/>
+          </a:ln>
+        </p:spPr>
+        <p:style>
+          <a:lnRef idx="1">
+            <a:schemeClr val="accent1"/>
+          </a:lnRef>
+          <a:fillRef idx="0">
+            <a:schemeClr val="accent1"/>
+          </a:fillRef>
+          <a:effectRef idx="0">
+            <a:schemeClr val="accent1"/>
+          </a:effectRef>
+          <a:fontRef idx="minor">
+            <a:schemeClr val="tx1"/>
+          </a:fontRef>
+        </p:style>
+      </p:cxnSp>
+      <p:sp>
+        <p:nvSpPr>
+          <p:cNvPr id="49" name="Stroomdiagram: Proces 48"/>
+          <p:cNvSpPr/>
+          <p:nvPr/>
+        </p:nvSpPr>
+        <p:spPr>
+          <a:xfrm>
+            <a:off x="3603782" y="3809812"/>
+            <a:ext cx="1291908" cy="725703"/>
+          </a:xfrm>
+          <a:prstGeom prst="flowChartProcess">
             <a:avLst/>
           </a:prstGeom>
           <a:solidFill>
@@ -7283,16 +7574,57 @@
           <a:p>
             <a:pPr algn="ctr"/>
             <a:r>
-              <a:rPr lang="nl-NL" dirty="0"/>
-              <a:t>logica</a:t>
-            </a:r>
+              <a:rPr lang="nl-NL" dirty="0" err="1"/>
+              <a:t>api</a:t>
+            </a:r>
+            <a:endParaRPr lang="nl-NL" dirty="0"/>
+          </a:p>
+        </p:txBody>
+      </p:sp>
+      <p:sp>
+        <p:nvSpPr>
+          <p:cNvPr id="83" name="Smiley Face 82"/>
+          <p:cNvSpPr/>
+          <p:nvPr/>
+        </p:nvSpPr>
+        <p:spPr>
+          <a:xfrm>
+            <a:off x="7892535" y="283468"/>
+            <a:ext cx="792480" cy="746760"/>
+          </a:xfrm>
+          <a:prstGeom prst="smileyFace">
+            <a:avLst/>
+          </a:prstGeom>
+        </p:spPr>
+        <p:style>
+          <a:lnRef idx="2">
+            <a:schemeClr val="accent3">
+              <a:shade val="50000"/>
+            </a:schemeClr>
+          </a:lnRef>
+          <a:fillRef idx="1">
+            <a:schemeClr val="accent3"/>
+          </a:fillRef>
+          <a:effectRef idx="0">
+            <a:schemeClr val="accent3"/>
+          </a:effectRef>
+          <a:fontRef idx="minor">
+            <a:schemeClr val="lt1"/>
+          </a:fontRef>
+        </p:style>
+        <p:txBody>
+          <a:bodyPr rtlCol="0" anchor="ctr"/>
+          <a:lstStyle/>
+          <a:p>
+            <a:pPr algn="ctr"/>
+            <a:endParaRPr lang="nl-NL"/>
           </a:p>
         </p:txBody>
       </p:sp>
     </p:spTree>
     <p:extLst>
       <p:ext uri="{BB962C8B-B14F-4D97-AF65-F5344CB8AC3E}">
-        <p14:creationId xmlns:p14="http://schemas.microsoft.com/office/powerpoint/2010/main" val="1034291690"/>
+        <p14:creationId xmlns:p14="http://schemas.microsoft.com/office/powerpoint/2010/main" val="1854056291"/>
       </p:ext>
     </p:extLst>
   </p:cSld>
@@ -8713,6 +9045,209 @@
                                   </p:childTnLst>
                                 </p:cTn>
                               </p:par>
+                              <p:par>
+                                <p:cTn id="127" presetID="1" presetClass="entr" presetSubtype="0" fill="hold" grpId="0" nodeType="withEffect">
+                                  <p:stCondLst>
+                                    <p:cond delay="0"/>
+                                  </p:stCondLst>
+                                  <p:childTnLst>
+                                    <p:set>
+                                      <p:cBhvr>
+                                        <p:cTn id="128" dur="1" fill="hold">
+                                          <p:stCondLst>
+                                            <p:cond delay="0"/>
+                                          </p:stCondLst>
+                                        </p:cTn>
+                                        <p:tgtEl>
+                                          <p:spTgt spid="8"/>
+                                        </p:tgtEl>
+                                        <p:attrNameLst>
+                                          <p:attrName>style.visibility</p:attrName>
+                                        </p:attrNameLst>
+                                      </p:cBhvr>
+                                      <p:to>
+                                        <p:strVal val="visible"/>
+                                      </p:to>
+                                    </p:set>
+                                  </p:childTnLst>
+                                </p:cTn>
+                              </p:par>
+                            </p:childTnLst>
+                          </p:cTn>
+                        </p:par>
+                        <p:par>
+                          <p:cTn id="129" fill="hold">
+                            <p:stCondLst>
+                              <p:cond delay="1500"/>
+                            </p:stCondLst>
+                            <p:childTnLst>
+                              <p:par>
+                                <p:cTn id="130" presetID="10" presetClass="entr" presetSubtype="0" fill="hold" nodeType="afterEffect">
+                                  <p:stCondLst>
+                                    <p:cond delay="0"/>
+                                  </p:stCondLst>
+                                  <p:childTnLst>
+                                    <p:set>
+                                      <p:cBhvr>
+                                        <p:cTn id="131" dur="1" fill="hold">
+                                          <p:stCondLst>
+                                            <p:cond delay="0"/>
+                                          </p:stCondLst>
+                                        </p:cTn>
+                                        <p:tgtEl>
+                                          <p:spTgt spid="57"/>
+                                        </p:tgtEl>
+                                        <p:attrNameLst>
+                                          <p:attrName>style.visibility</p:attrName>
+                                        </p:attrNameLst>
+                                      </p:cBhvr>
+                                      <p:to>
+                                        <p:strVal val="visible"/>
+                                      </p:to>
+                                    </p:set>
+                                    <p:animEffect transition="in" filter="fade">
+                                      <p:cBhvr>
+                                        <p:cTn id="132" dur="500"/>
+                                        <p:tgtEl>
+                                          <p:spTgt spid="57"/>
+                                        </p:tgtEl>
+                                      </p:cBhvr>
+                                    </p:animEffect>
+                                  </p:childTnLst>
+                                </p:cTn>
+                              </p:par>
+                            </p:childTnLst>
+                          </p:cTn>
+                        </p:par>
+                        <p:par>
+                          <p:cTn id="133" fill="hold">
+                            <p:stCondLst>
+                              <p:cond delay="2000"/>
+                            </p:stCondLst>
+                            <p:childTnLst>
+                              <p:par>
+                                <p:cTn id="134" presetID="10" presetClass="entr" presetSubtype="0" fill="hold" nodeType="afterEffect">
+                                  <p:stCondLst>
+                                    <p:cond delay="0"/>
+                                  </p:stCondLst>
+                                  <p:childTnLst>
+                                    <p:set>
+                                      <p:cBhvr>
+                                        <p:cTn id="135" dur="1" fill="hold">
+                                          <p:stCondLst>
+                                            <p:cond delay="0"/>
+                                          </p:stCondLst>
+                                        </p:cTn>
+                                        <p:tgtEl>
+                                          <p:spTgt spid="59"/>
+                                        </p:tgtEl>
+                                        <p:attrNameLst>
+                                          <p:attrName>style.visibility</p:attrName>
+                                        </p:attrNameLst>
+                                      </p:cBhvr>
+                                      <p:to>
+                                        <p:strVal val="visible"/>
+                                      </p:to>
+                                    </p:set>
+                                    <p:animEffect transition="in" filter="fade">
+                                      <p:cBhvr>
+                                        <p:cTn id="136" dur="500"/>
+                                        <p:tgtEl>
+                                          <p:spTgt spid="59"/>
+                                        </p:tgtEl>
+                                      </p:cBhvr>
+                                    </p:animEffect>
+                                  </p:childTnLst>
+                                </p:cTn>
+                              </p:par>
+                            </p:childTnLst>
+                          </p:cTn>
+                        </p:par>
+                        <p:par>
+                          <p:cTn id="137" fill="hold">
+                            <p:stCondLst>
+                              <p:cond delay="2500"/>
+                            </p:stCondLst>
+                            <p:childTnLst>
+                              <p:par>
+                                <p:cTn id="138" presetID="10" presetClass="entr" presetSubtype="0" fill="hold" nodeType="afterEffect">
+                                  <p:stCondLst>
+                                    <p:cond delay="0"/>
+                                  </p:stCondLst>
+                                  <p:childTnLst>
+                                    <p:set>
+                                      <p:cBhvr>
+                                        <p:cTn id="139" dur="1" fill="hold">
+                                          <p:stCondLst>
+                                            <p:cond delay="0"/>
+                                          </p:stCondLst>
+                                        </p:cTn>
+                                        <p:tgtEl>
+                                          <p:spTgt spid="61"/>
+                                        </p:tgtEl>
+                                        <p:attrNameLst>
+                                          <p:attrName>style.visibility</p:attrName>
+                                        </p:attrNameLst>
+                                      </p:cBhvr>
+                                      <p:to>
+                                        <p:strVal val="visible"/>
+                                      </p:to>
+                                    </p:set>
+                                    <p:animEffect transition="in" filter="fade">
+                                      <p:cBhvr>
+                                        <p:cTn id="140" dur="500"/>
+                                        <p:tgtEl>
+                                          <p:spTgt spid="61"/>
+                                        </p:tgtEl>
+                                      </p:cBhvr>
+                                    </p:animEffect>
+                                  </p:childTnLst>
+                                </p:cTn>
+                              </p:par>
+                            </p:childTnLst>
+                          </p:cTn>
+                        </p:par>
+                        <p:par>
+                          <p:cTn id="141" fill="hold">
+                            <p:stCondLst>
+                              <p:cond delay="3000"/>
+                            </p:stCondLst>
+                            <p:childTnLst>
+                              <p:par>
+                                <p:cTn id="142" presetID="10" presetClass="entr" presetSubtype="0" fill="hold" nodeType="afterEffect">
+                                  <p:stCondLst>
+                                    <p:cond delay="0"/>
+                                  </p:stCondLst>
+                                  <p:childTnLst>
+                                    <p:set>
+                                      <p:cBhvr>
+                                        <p:cTn id="143" dur="1" fill="hold">
+                                          <p:stCondLst>
+                                            <p:cond delay="0"/>
+                                          </p:stCondLst>
+                                        </p:cTn>
+                                        <p:tgtEl>
+                                          <p:spTgt spid="62"/>
+                                        </p:tgtEl>
+                                        <p:attrNameLst>
+                                          <p:attrName>style.visibility</p:attrName>
+                                        </p:attrNameLst>
+                                      </p:cBhvr>
+                                      <p:to>
+                                        <p:strVal val="visible"/>
+                                      </p:to>
+                                    </p:set>
+                                    <p:animEffect transition="in" filter="fade">
+                                      <p:cBhvr>
+                                        <p:cTn id="144" dur="500"/>
+                                        <p:tgtEl>
+                                          <p:spTgt spid="62"/>
+                                        </p:tgtEl>
+                                      </p:cBhvr>
+                                    </p:animEffect>
+                                  </p:childTnLst>
+                                </p:cTn>
+                              </p:par>
                             </p:childTnLst>
                           </p:cTn>
                         </p:par>
@@ -8741,11 +9276,12 @@
       </p:par>
     </p:tnLst>
     <p:bldLst>
+      <p:bldP spid="41" grpId="0" animBg="1"/>
+      <p:bldP spid="46" grpId="0" animBg="1"/>
       <p:bldP spid="34" grpId="0" animBg="1"/>
       <p:bldP spid="35" grpId="0" animBg="1"/>
       <p:bldP spid="36" grpId="0" animBg="1"/>
       <p:bldP spid="39" grpId="0"/>
-      <p:bldP spid="49" grpId="0" animBg="1"/>
       <p:bldP spid="50" grpId="0" animBg="1"/>
       <p:bldP spid="51" grpId="0" animBg="1"/>
       <p:bldP spid="52" grpId="0"/>
@@ -8761,7 +9297,6 @@
       <p:bldP spid="37" grpId="0"/>
       <p:bldP spid="38" grpId="0"/>
       <p:bldP spid="40" grpId="0"/>
-      <p:bldP spid="41" grpId="0" animBg="1"/>
       <p:bldP spid="42" grpId="0" animBg="1"/>
       <p:bldP spid="43" grpId="0" animBg="1"/>
       <p:bldP spid="44" grpId="0"/>
@@ -8772,7 +9307,8 @@
       <p:bldP spid="54" grpId="0" animBg="1"/>
       <p:bldP spid="55" grpId="0" animBg="1"/>
       <p:bldP spid="56" grpId="0"/>
-      <p:bldP spid="46" grpId="0" animBg="1"/>
+      <p:bldP spid="8" grpId="0" animBg="1"/>
+      <p:bldP spid="49" grpId="0" animBg="1"/>
     </p:bldLst>
   </p:timing>
 </p:sld>
@@ -8824,8 +9360,13 @@
             </a:pPr>
             <a:r>
               <a:rPr lang="nl-NL" dirty="0"/>
-              <a:t>Technologie per service vrij te kiezen</a:t>
-            </a:r>
+              <a:t>Technology per service free of </a:t>
+            </a:r>
+            <a:r>
+              <a:rPr lang="nl-NL" dirty="0" err="1"/>
+              <a:t>choice</a:t>
+            </a:r>
+            <a:endParaRPr lang="nl-NL" dirty="0"/>
           </a:p>
           <a:p>
             <a:pPr>
@@ -8834,9 +9375,30 @@
               </a:spcAft>
             </a:pPr>
             <a:r>
+              <a:rPr lang="en-US" dirty="0"/>
+              <a:t>F</a:t>
+            </a:r>
+            <a:r>
+              <a:rPr lang="nl-NL" dirty="0" err="1"/>
+              <a:t>unctions</a:t>
+            </a:r>
+            <a:r>
               <a:rPr lang="nl-NL" dirty="0"/>
-              <a:t>Losse functies nu schaalbaar</a:t>
-            </a:r>
+              <a:t> are </a:t>
+            </a:r>
+            <a:r>
+              <a:rPr lang="nl-NL" dirty="0" err="1"/>
+              <a:t>independently</a:t>
+            </a:r>
+            <a:r>
+              <a:rPr lang="nl-NL" dirty="0"/>
+              <a:t> </a:t>
+            </a:r>
+            <a:r>
+              <a:rPr lang="nl-NL" dirty="0" err="1"/>
+              <a:t>scalable</a:t>
+            </a:r>
+            <a:endParaRPr lang="nl-NL" dirty="0"/>
           </a:p>
           <a:p>
             <a:pPr>
@@ -8850,7 +9412,23 @@
             </a:r>
             <a:r>
               <a:rPr lang="nl-NL" dirty="0"/>
-              <a:t> en nieuwe features sneller live</a:t>
+              <a:t> </a:t>
+            </a:r>
+            <a:r>
+              <a:rPr lang="nl-NL" dirty="0" err="1"/>
+              <a:t>and</a:t>
+            </a:r>
+            <a:r>
+              <a:rPr lang="nl-NL" dirty="0"/>
+              <a:t> new features are </a:t>
+            </a:r>
+            <a:r>
+              <a:rPr lang="nl-NL" dirty="0" err="1"/>
+              <a:t>faster</a:t>
+            </a:r>
+            <a:r>
+              <a:rPr lang="nl-NL" dirty="0"/>
+              <a:t> live</a:t>
             </a:r>
           </a:p>
           <a:p>
@@ -8861,8 +9439,21 @@
             </a:pPr>
             <a:r>
               <a:rPr lang="nl-NL" dirty="0"/>
-              <a:t>Onderhoud gedurende openstelling</a:t>
-            </a:r>
+              <a:t>Maintenance </a:t>
+            </a:r>
+            <a:r>
+              <a:rPr lang="nl-NL" dirty="0" err="1"/>
+              <a:t>during</a:t>
+            </a:r>
+            <a:r>
+              <a:rPr lang="nl-NL" dirty="0"/>
+              <a:t> service </a:t>
+            </a:r>
+            <a:r>
+              <a:rPr lang="nl-NL" dirty="0" err="1"/>
+              <a:t>hours</a:t>
+            </a:r>
+            <a:endParaRPr lang="nl-NL" dirty="0"/>
           </a:p>
         </p:txBody>
       </p:sp>
@@ -8887,7 +9478,7 @@
                   <a:srgbClr val="009036"/>
                 </a:solidFill>
               </a:rPr>
-              <a:t>2 november 2018</a:t>
+              <a:t>14 november 2018</a:t>
             </a:fld>
             <a:endParaRPr lang="nl-NL" sz="900" cap="all" dirty="0">
               <a:solidFill>
@@ -8950,8 +9541,13 @@
           <a:p>
             <a:r>
               <a:rPr lang="nl-NL" dirty="0"/>
-              <a:t>(Nieuwe) Mogelijkheden</a:t>
-            </a:r>
+              <a:t>(New) </a:t>
+            </a:r>
+            <a:r>
+              <a:rPr lang="nl-NL" dirty="0" err="1"/>
+              <a:t>possibilities</a:t>
+            </a:r>
+            <a:endParaRPr lang="nl-NL" dirty="0"/>
           </a:p>
         </p:txBody>
       </p:sp>
@@ -9151,7 +9747,7 @@
             </a:pPr>
             <a:r>
               <a:rPr lang="nl-NL" dirty="0"/>
-              <a:t>Communicatie via REST</a:t>
+              <a:t>Communication via REST</a:t>
             </a:r>
           </a:p>
           <a:p>
@@ -9162,7 +9758,7 @@
             </a:pPr>
             <a:r>
               <a:rPr lang="nl-NL" dirty="0"/>
-              <a:t>Communicatie via een bus</a:t>
+              <a:t>Communication via a bus</a:t>
             </a:r>
           </a:p>
           <a:p>
@@ -9196,7 +9792,7 @@
                   <a:srgbClr val="009036"/>
                 </a:solidFill>
               </a:rPr>
-              <a:t>2 november 2018</a:t>
+              <a:t>14 november 2018</a:t>
             </a:fld>
             <a:endParaRPr lang="nl-NL" sz="900" cap="all" dirty="0">
               <a:solidFill>
@@ -9463,18 +10059,19 @@
             <p:ph type="title"/>
           </p:nvPr>
         </p:nvSpPr>
-        <p:spPr/>
+        <p:spPr>
+          <a:xfrm>
+            <a:off x="617538" y="473075"/>
+            <a:ext cx="8163164" cy="822443"/>
+          </a:xfrm>
+        </p:spPr>
         <p:txBody>
           <a:bodyPr/>
           <a:lstStyle/>
           <a:p>
             <a:r>
-              <a:rPr lang="en-US" dirty="0" err="1"/>
-              <a:t>Communicatie</a:t>
-            </a:r>
-            <a:r>
               <a:rPr lang="en-US" dirty="0"/>
-              <a:t> via rest</a:t>
+              <a:t>Communication via rest</a:t>
             </a:r>
             <a:endParaRPr lang="nl-NL" dirty="0"/>
           </a:p>
@@ -9504,7 +10101,7 @@
             <a:fld id="{249B52C1-75DC-496B-AF3F-4978B95BB865}" type="datetime4">
               <a:rPr lang="nl-NL" smtClean="0"/>
               <a:pPr/>
-              <a:t>2 november 2018</a:t>
+              <a:t>14 november 2018</a:t>
             </a:fld>
             <a:endParaRPr lang="nl-NL" dirty="0"/>
           </a:p>
@@ -10213,20 +10810,8 @@
           <a:lstStyle/>
           <a:p>
             <a:r>
-              <a:rPr lang="en-US" dirty="0" err="1"/>
-              <a:t>Communicatie</a:t>
-            </a:r>
-            <a:r>
               <a:rPr lang="en-US" dirty="0"/>
-              <a:t> via </a:t>
-            </a:r>
-            <a:r>
-              <a:rPr lang="en-US" dirty="0" err="1"/>
-              <a:t>een</a:t>
-            </a:r>
-            <a:r>
-              <a:rPr lang="en-US" dirty="0"/>
-              <a:t> bus</a:t>
+              <a:t>Communication using a bus</a:t>
             </a:r>
             <a:endParaRPr lang="nl-NL" dirty="0"/>
           </a:p>
@@ -10256,7 +10841,7 @@
             <a:fld id="{249B52C1-75DC-496B-AF3F-4978B95BB865}" type="datetime4">
               <a:rPr lang="nl-NL" smtClean="0"/>
               <a:pPr/>
-              <a:t>2 november 2018</a:t>
+              <a:t>14 november 2018</a:t>
             </a:fld>
             <a:endParaRPr lang="nl-NL" dirty="0"/>
           </a:p>
@@ -11163,7 +11748,7 @@
             </a:pPr>
             <a:r>
               <a:rPr lang="en-US" dirty="0"/>
-              <a:t>On-premise of cloud</a:t>
+              <a:t>On-premise or cloud</a:t>
             </a:r>
           </a:p>
           <a:p>
@@ -11184,10 +11769,9 @@
               </a:spcAft>
             </a:pPr>
             <a:r>
-              <a:rPr lang="en-US" dirty="0" err="1"/>
-              <a:t>Bewaking</a:t>
-            </a:r>
-            <a:endParaRPr lang="en-US" dirty="0"/>
+              <a:rPr lang="en-US" dirty="0"/>
+              <a:t>Monitoring</a:t>
+            </a:r>
           </a:p>
           <a:p>
             <a:pPr lvl="1">
@@ -11197,7 +11781,7 @@
             </a:pPr>
             <a:r>
               <a:rPr lang="en-US" dirty="0"/>
-              <a:t>Performance monitoring</a:t>
+              <a:t>Capacity management</a:t>
             </a:r>
           </a:p>
           <a:p>
@@ -11246,7 +11830,7 @@
                   <a:srgbClr val="009036"/>
                 </a:solidFill>
               </a:rPr>
-              <a:t>2 november 2018</a:t>
+              <a:t>14 november 2018</a:t>
             </a:fld>
             <a:endParaRPr lang="nl-NL" sz="900" cap="all" dirty="0">
               <a:solidFill>

</xml_diff>